<commit_message>
Update Maori quiz documentation.pptx
Powerpoint changed to include a few extra links
</commit_message>
<xml_diff>
--- a/Maori quiz documentation.pptx
+++ b/Maori quiz documentation.pptx
@@ -155,7 +155,7 @@
 <file path=ppt/revisionInfo.xml><?xml version="1.0" encoding="utf-8"?>
 <p1510:revInfo xmlns:a="http://schemas.openxmlformats.org/drawingml/2006/main" xmlns:r="http://schemas.openxmlformats.org/officeDocument/2006/relationships" xmlns:p1510="http://schemas.microsoft.com/office/powerpoint/2015/10/main">
   <p1510:revLst>
-    <p1510:client id="{1A0B50A4-C99D-47EA-9247-60D74C2ECAA7}" v="20" dt="2022-05-02T07:54:56.625"/>
+    <p1510:client id="{1A0B50A4-C99D-47EA-9247-60D74C2ECAA7}" v="24" dt="2022-05-02T08:03:18.952"/>
   </p1510:revLst>
 </p1510:revInfo>
 </file>
@@ -165,7 +165,7 @@
   <pc:docChgLst>
     <pc:chgData name="Thomas Wilson" userId="c8d2c09c-f776-4d90-9411-3be6cc56095c" providerId="ADAL" clId="{1A0B50A4-C99D-47EA-9247-60D74C2ECAA7}"/>
     <pc:docChg chg="undo redo custSel addSld delSld modSld">
-      <pc:chgData name="Thomas Wilson" userId="c8d2c09c-f776-4d90-9411-3be6cc56095c" providerId="ADAL" clId="{1A0B50A4-C99D-47EA-9247-60D74C2ECAA7}" dt="2022-05-02T07:55:54.220" v="921" actId="14100"/>
+      <pc:chgData name="Thomas Wilson" userId="c8d2c09c-f776-4d90-9411-3be6cc56095c" providerId="ADAL" clId="{1A0B50A4-C99D-47EA-9247-60D74C2ECAA7}" dt="2022-05-02T08:05:23.713" v="954" actId="207"/>
       <pc:docMkLst>
         <pc:docMk/>
       </pc:docMkLst>
@@ -193,7 +193,7 @@
         </pc:spChg>
       </pc:sldChg>
       <pc:sldChg chg="modSp mod">
-        <pc:chgData name="Thomas Wilson" userId="c8d2c09c-f776-4d90-9411-3be6cc56095c" providerId="ADAL" clId="{1A0B50A4-C99D-47EA-9247-60D74C2ECAA7}" dt="2022-05-02T07:55:54.220" v="921" actId="14100"/>
+        <pc:chgData name="Thomas Wilson" userId="c8d2c09c-f776-4d90-9411-3be6cc56095c" providerId="ADAL" clId="{1A0B50A4-C99D-47EA-9247-60D74C2ECAA7}" dt="2022-05-02T08:05:23.713" v="954" actId="207"/>
         <pc:sldMkLst>
           <pc:docMk/>
           <pc:sldMk cId="3838895173" sldId="258"/>
@@ -207,7 +207,7 @@
           </ac:spMkLst>
         </pc:spChg>
         <pc:spChg chg="mod">
-          <ac:chgData name="Thomas Wilson" userId="c8d2c09c-f776-4d90-9411-3be6cc56095c" providerId="ADAL" clId="{1A0B50A4-C99D-47EA-9247-60D74C2ECAA7}" dt="2022-05-02T05:27:19.679" v="29" actId="20577"/>
+          <ac:chgData name="Thomas Wilson" userId="c8d2c09c-f776-4d90-9411-3be6cc56095c" providerId="ADAL" clId="{1A0B50A4-C99D-47EA-9247-60D74C2ECAA7}" dt="2022-05-02T08:05:23.713" v="954" actId="207"/>
           <ac:spMkLst>
             <pc:docMk/>
             <pc:sldMk cId="3838895173" sldId="258"/>
@@ -11295,8 +11295,8 @@
           </a:prstGeom>
         </p:spPr>
       </p:pic>
-      <mc:AlternateContent xmlns:mc="http://schemas.openxmlformats.org/markup-compatibility/2006">
-        <mc:Choice xmlns:p14="http://schemas.microsoft.com/office/powerpoint/2010/main" Requires="p14">
+      <mc:AlternateContent xmlns:mc="http://schemas.openxmlformats.org/markup-compatibility/2006" xmlns:p14="http://schemas.microsoft.com/office/powerpoint/2010/main">
+        <mc:Choice Requires="p14">
           <p:contentPart p14:bwMode="auto" r:id="rId50">
             <p14:nvContentPartPr>
               <p14:cNvPr id="10" name="Ink 9">
@@ -11315,7 +11315,7 @@
             </p14:xfrm>
           </p:contentPart>
         </mc:Choice>
-        <mc:Fallback>
+        <mc:Fallback xmlns="">
           <p:pic>
             <p:nvPicPr>
               <p:cNvPr id="10" name="Ink 9">
@@ -11346,8 +11346,8 @@
           </p:pic>
         </mc:Fallback>
       </mc:AlternateContent>
-      <mc:AlternateContent xmlns:mc="http://schemas.openxmlformats.org/markup-compatibility/2006">
-        <mc:Choice xmlns:p14="http://schemas.microsoft.com/office/powerpoint/2010/main" Requires="p14">
+      <mc:AlternateContent xmlns:mc="http://schemas.openxmlformats.org/markup-compatibility/2006" xmlns:p14="http://schemas.microsoft.com/office/powerpoint/2010/main">
+        <mc:Choice Requires="p14">
           <p:contentPart p14:bwMode="auto" r:id="rId52">
             <p14:nvContentPartPr>
               <p14:cNvPr id="12" name="Ink 11">
@@ -11366,7 +11366,7 @@
             </p14:xfrm>
           </p:contentPart>
         </mc:Choice>
-        <mc:Fallback>
+        <mc:Fallback xmlns="">
           <p:pic>
             <p:nvPicPr>
               <p:cNvPr id="12" name="Ink 11">
@@ -11397,8 +11397,8 @@
           </p:pic>
         </mc:Fallback>
       </mc:AlternateContent>
-      <mc:AlternateContent xmlns:mc="http://schemas.openxmlformats.org/markup-compatibility/2006">
-        <mc:Choice xmlns:p14="http://schemas.microsoft.com/office/powerpoint/2010/main" Requires="p14">
+      <mc:AlternateContent xmlns:mc="http://schemas.openxmlformats.org/markup-compatibility/2006" xmlns:p14="http://schemas.microsoft.com/office/powerpoint/2010/main">
+        <mc:Choice Requires="p14">
           <p:contentPart p14:bwMode="auto" r:id="rId54">
             <p14:nvContentPartPr>
               <p14:cNvPr id="14" name="Ink 13">
@@ -11417,7 +11417,7 @@
             </p14:xfrm>
           </p:contentPart>
         </mc:Choice>
-        <mc:Fallback>
+        <mc:Fallback xmlns="">
           <p:pic>
             <p:nvPicPr>
               <p:cNvPr id="14" name="Ink 13">
@@ -11448,8 +11448,8 @@
           </p:pic>
         </mc:Fallback>
       </mc:AlternateContent>
-      <mc:AlternateContent xmlns:mc="http://schemas.openxmlformats.org/markup-compatibility/2006">
-        <mc:Choice xmlns:p14="http://schemas.microsoft.com/office/powerpoint/2010/main" Requires="p14">
+      <mc:AlternateContent xmlns:mc="http://schemas.openxmlformats.org/markup-compatibility/2006" xmlns:p14="http://schemas.microsoft.com/office/powerpoint/2010/main">
+        <mc:Choice Requires="p14">
           <p:contentPart p14:bwMode="auto" r:id="rId56">
             <p14:nvContentPartPr>
               <p14:cNvPr id="16" name="Ink 15">
@@ -11468,7 +11468,7 @@
             </p14:xfrm>
           </p:contentPart>
         </mc:Choice>
-        <mc:Fallback>
+        <mc:Fallback xmlns="">
           <p:pic>
             <p:nvPicPr>
               <p:cNvPr id="16" name="Ink 15">
@@ -11499,8 +11499,8 @@
           </p:pic>
         </mc:Fallback>
       </mc:AlternateContent>
-      <mc:AlternateContent xmlns:mc="http://schemas.openxmlformats.org/markup-compatibility/2006">
-        <mc:Choice xmlns:p14="http://schemas.microsoft.com/office/powerpoint/2010/main" Requires="p14">
+      <mc:AlternateContent xmlns:mc="http://schemas.openxmlformats.org/markup-compatibility/2006" xmlns:p14="http://schemas.microsoft.com/office/powerpoint/2010/main">
+        <mc:Choice Requires="p14">
           <p:contentPart p14:bwMode="auto" r:id="rId58">
             <p14:nvContentPartPr>
               <p14:cNvPr id="40" name="Ink 39">
@@ -11519,7 +11519,7 @@
             </p14:xfrm>
           </p:contentPart>
         </mc:Choice>
-        <mc:Fallback>
+        <mc:Fallback xmlns="">
           <p:pic>
             <p:nvPicPr>
               <p:cNvPr id="40" name="Ink 39">
@@ -11550,8 +11550,8 @@
           </p:pic>
         </mc:Fallback>
       </mc:AlternateContent>
-      <mc:AlternateContent xmlns:mc="http://schemas.openxmlformats.org/markup-compatibility/2006">
-        <mc:Choice xmlns:p14="http://schemas.microsoft.com/office/powerpoint/2010/main" Requires="p14">
+      <mc:AlternateContent xmlns:mc="http://schemas.openxmlformats.org/markup-compatibility/2006" xmlns:p14="http://schemas.microsoft.com/office/powerpoint/2010/main">
+        <mc:Choice Requires="p14">
           <p:contentPart p14:bwMode="auto" r:id="rId60">
             <p14:nvContentPartPr>
               <p14:cNvPr id="41" name="Ink 40">
@@ -11570,7 +11570,7 @@
             </p14:xfrm>
           </p:contentPart>
         </mc:Choice>
-        <mc:Fallback>
+        <mc:Fallback xmlns="">
           <p:pic>
             <p:nvPicPr>
               <p:cNvPr id="41" name="Ink 40">
@@ -11601,8 +11601,8 @@
           </p:pic>
         </mc:Fallback>
       </mc:AlternateContent>
-      <mc:AlternateContent xmlns:mc="http://schemas.openxmlformats.org/markup-compatibility/2006">
-        <mc:Choice xmlns:p14="http://schemas.microsoft.com/office/powerpoint/2010/main" Requires="p14">
+      <mc:AlternateContent xmlns:mc="http://schemas.openxmlformats.org/markup-compatibility/2006" xmlns:p14="http://schemas.microsoft.com/office/powerpoint/2010/main">
+        <mc:Choice Requires="p14">
           <p:contentPart p14:bwMode="auto" r:id="rId62">
             <p14:nvContentPartPr>
               <p14:cNvPr id="42" name="Ink 41">
@@ -11621,7 +11621,7 @@
             </p14:xfrm>
           </p:contentPart>
         </mc:Choice>
-        <mc:Fallback>
+        <mc:Fallback xmlns="">
           <p:pic>
             <p:nvPicPr>
               <p:cNvPr id="42" name="Ink 41">
@@ -11652,8 +11652,8 @@
           </p:pic>
         </mc:Fallback>
       </mc:AlternateContent>
-      <mc:AlternateContent xmlns:mc="http://schemas.openxmlformats.org/markup-compatibility/2006">
-        <mc:Choice xmlns:p14="http://schemas.microsoft.com/office/powerpoint/2010/main" Requires="p14">
+      <mc:AlternateContent xmlns:mc="http://schemas.openxmlformats.org/markup-compatibility/2006" xmlns:p14="http://schemas.microsoft.com/office/powerpoint/2010/main">
+        <mc:Choice Requires="p14">
           <p:contentPart p14:bwMode="auto" r:id="rId64">
             <p14:nvContentPartPr>
               <p14:cNvPr id="43" name="Ink 42">
@@ -11672,7 +11672,7 @@
             </p14:xfrm>
           </p:contentPart>
         </mc:Choice>
-        <mc:Fallback>
+        <mc:Fallback xmlns="">
           <p:pic>
             <p:nvPicPr>
               <p:cNvPr id="43" name="Ink 42">
@@ -11703,8 +11703,8 @@
           </p:pic>
         </mc:Fallback>
       </mc:AlternateContent>
-      <mc:AlternateContent xmlns:mc="http://schemas.openxmlformats.org/markup-compatibility/2006">
-        <mc:Choice xmlns:p14="http://schemas.microsoft.com/office/powerpoint/2010/main" Requires="p14">
+      <mc:AlternateContent xmlns:mc="http://schemas.openxmlformats.org/markup-compatibility/2006" xmlns:p14="http://schemas.microsoft.com/office/powerpoint/2010/main">
+        <mc:Choice Requires="p14">
           <p:contentPart p14:bwMode="auto" r:id="rId66">
             <p14:nvContentPartPr>
               <p14:cNvPr id="44" name="Ink 43">
@@ -11723,7 +11723,7 @@
             </p14:xfrm>
           </p:contentPart>
         </mc:Choice>
-        <mc:Fallback>
+        <mc:Fallback xmlns="">
           <p:pic>
             <p:nvPicPr>
               <p:cNvPr id="44" name="Ink 43">
@@ -11754,8 +11754,8 @@
           </p:pic>
         </mc:Fallback>
       </mc:AlternateContent>
-      <mc:AlternateContent xmlns:mc="http://schemas.openxmlformats.org/markup-compatibility/2006">
-        <mc:Choice xmlns:p14="http://schemas.microsoft.com/office/powerpoint/2010/main" Requires="p14">
+      <mc:AlternateContent xmlns:mc="http://schemas.openxmlformats.org/markup-compatibility/2006" xmlns:p14="http://schemas.microsoft.com/office/powerpoint/2010/main">
+        <mc:Choice Requires="p14">
           <p:contentPart p14:bwMode="auto" r:id="rId68">
             <p14:nvContentPartPr>
               <p14:cNvPr id="45" name="Ink 44">
@@ -11774,7 +11774,7 @@
             </p14:xfrm>
           </p:contentPart>
         </mc:Choice>
-        <mc:Fallback>
+        <mc:Fallback xmlns="">
           <p:pic>
             <p:nvPicPr>
               <p:cNvPr id="45" name="Ink 44">
@@ -11805,8 +11805,8 @@
           </p:pic>
         </mc:Fallback>
       </mc:AlternateContent>
-      <mc:AlternateContent xmlns:mc="http://schemas.openxmlformats.org/markup-compatibility/2006">
-        <mc:Choice xmlns:p14="http://schemas.microsoft.com/office/powerpoint/2010/main" Requires="p14">
+      <mc:AlternateContent xmlns:mc="http://schemas.openxmlformats.org/markup-compatibility/2006" xmlns:p14="http://schemas.microsoft.com/office/powerpoint/2010/main">
+        <mc:Choice Requires="p14">
           <p:contentPart p14:bwMode="auto" r:id="rId70">
             <p14:nvContentPartPr>
               <p14:cNvPr id="46" name="Ink 45">
@@ -11825,7 +11825,7 @@
             </p14:xfrm>
           </p:contentPart>
         </mc:Choice>
-        <mc:Fallback>
+        <mc:Fallback xmlns="">
           <p:pic>
             <p:nvPicPr>
               <p:cNvPr id="46" name="Ink 45">
@@ -11856,8 +11856,8 @@
           </p:pic>
         </mc:Fallback>
       </mc:AlternateContent>
-      <mc:AlternateContent xmlns:mc="http://schemas.openxmlformats.org/markup-compatibility/2006">
-        <mc:Choice xmlns:p14="http://schemas.microsoft.com/office/powerpoint/2010/main" Requires="p14">
+      <mc:AlternateContent xmlns:mc="http://schemas.openxmlformats.org/markup-compatibility/2006" xmlns:p14="http://schemas.microsoft.com/office/powerpoint/2010/main">
+        <mc:Choice Requires="p14">
           <p:contentPart p14:bwMode="auto" r:id="rId72">
             <p14:nvContentPartPr>
               <p14:cNvPr id="47" name="Ink 46">
@@ -11876,7 +11876,7 @@
             </p14:xfrm>
           </p:contentPart>
         </mc:Choice>
-        <mc:Fallback>
+        <mc:Fallback xmlns="">
           <p:pic>
             <p:nvPicPr>
               <p:cNvPr id="47" name="Ink 46">
@@ -12947,8 +12947,8 @@
           </a:prstGeom>
         </p:spPr>
       </p:pic>
-      <mc:AlternateContent xmlns:mc="http://schemas.openxmlformats.org/markup-compatibility/2006">
-        <mc:Choice xmlns:p14="http://schemas.microsoft.com/office/powerpoint/2010/main" Requires="p14">
+      <mc:AlternateContent xmlns:mc="http://schemas.openxmlformats.org/markup-compatibility/2006" xmlns:p14="http://schemas.microsoft.com/office/powerpoint/2010/main">
+        <mc:Choice Requires="p14">
           <p:contentPart p14:bwMode="auto" r:id="rId18">
             <p14:nvContentPartPr>
               <p14:cNvPr id="26" name="Ink 25">
@@ -12967,7 +12967,7 @@
             </p14:xfrm>
           </p:contentPart>
         </mc:Choice>
-        <mc:Fallback>
+        <mc:Fallback xmlns="">
           <p:pic>
             <p:nvPicPr>
               <p:cNvPr id="26" name="Ink 25">
@@ -12998,8 +12998,8 @@
           </p:pic>
         </mc:Fallback>
       </mc:AlternateContent>
-      <mc:AlternateContent xmlns:mc="http://schemas.openxmlformats.org/markup-compatibility/2006">
-        <mc:Choice xmlns:p14="http://schemas.microsoft.com/office/powerpoint/2010/main" Requires="p14">
+      <mc:AlternateContent xmlns:mc="http://schemas.openxmlformats.org/markup-compatibility/2006" xmlns:p14="http://schemas.microsoft.com/office/powerpoint/2010/main">
+        <mc:Choice Requires="p14">
           <p:contentPart p14:bwMode="auto" r:id="rId20">
             <p14:nvContentPartPr>
               <p14:cNvPr id="27" name="Ink 26">
@@ -13018,7 +13018,7 @@
             </p14:xfrm>
           </p:contentPart>
         </mc:Choice>
-        <mc:Fallback>
+        <mc:Fallback xmlns="">
           <p:pic>
             <p:nvPicPr>
               <p:cNvPr id="27" name="Ink 26">
@@ -13049,8 +13049,8 @@
           </p:pic>
         </mc:Fallback>
       </mc:AlternateContent>
-      <mc:AlternateContent xmlns:mc="http://schemas.openxmlformats.org/markup-compatibility/2006">
-        <mc:Choice xmlns:p14="http://schemas.microsoft.com/office/powerpoint/2010/main" Requires="p14">
+      <mc:AlternateContent xmlns:mc="http://schemas.openxmlformats.org/markup-compatibility/2006" xmlns:p14="http://schemas.microsoft.com/office/powerpoint/2010/main">
+        <mc:Choice Requires="p14">
           <p:contentPart p14:bwMode="auto" r:id="rId22">
             <p14:nvContentPartPr>
               <p14:cNvPr id="28" name="Ink 27">
@@ -13069,7 +13069,7 @@
             </p14:xfrm>
           </p:contentPart>
         </mc:Choice>
-        <mc:Fallback>
+        <mc:Fallback xmlns="">
           <p:pic>
             <p:nvPicPr>
               <p:cNvPr id="28" name="Ink 27">
@@ -13100,8 +13100,8 @@
           </p:pic>
         </mc:Fallback>
       </mc:AlternateContent>
-      <mc:AlternateContent xmlns:mc="http://schemas.openxmlformats.org/markup-compatibility/2006">
-        <mc:Choice xmlns:p14="http://schemas.microsoft.com/office/powerpoint/2010/main" Requires="p14">
+      <mc:AlternateContent xmlns:mc="http://schemas.openxmlformats.org/markup-compatibility/2006" xmlns:p14="http://schemas.microsoft.com/office/powerpoint/2010/main">
+        <mc:Choice Requires="p14">
           <p:contentPart p14:bwMode="auto" r:id="rId24">
             <p14:nvContentPartPr>
               <p14:cNvPr id="29" name="Ink 28">
@@ -13120,7 +13120,7 @@
             </p14:xfrm>
           </p:contentPart>
         </mc:Choice>
-        <mc:Fallback>
+        <mc:Fallback xmlns="">
           <p:pic>
             <p:nvPicPr>
               <p:cNvPr id="29" name="Ink 28">
@@ -13151,8 +13151,8 @@
           </p:pic>
         </mc:Fallback>
       </mc:AlternateContent>
-      <mc:AlternateContent xmlns:mc="http://schemas.openxmlformats.org/markup-compatibility/2006">
-        <mc:Choice xmlns:p14="http://schemas.microsoft.com/office/powerpoint/2010/main" Requires="p14">
+      <mc:AlternateContent xmlns:mc="http://schemas.openxmlformats.org/markup-compatibility/2006" xmlns:p14="http://schemas.microsoft.com/office/powerpoint/2010/main">
+        <mc:Choice Requires="p14">
           <p:contentPart p14:bwMode="auto" r:id="rId26">
             <p14:nvContentPartPr>
               <p14:cNvPr id="30" name="Ink 29">
@@ -13171,7 +13171,7 @@
             </p14:xfrm>
           </p:contentPart>
         </mc:Choice>
-        <mc:Fallback>
+        <mc:Fallback xmlns="">
           <p:pic>
             <p:nvPicPr>
               <p:cNvPr id="30" name="Ink 29">
@@ -13202,8 +13202,8 @@
           </p:pic>
         </mc:Fallback>
       </mc:AlternateContent>
-      <mc:AlternateContent xmlns:mc="http://schemas.openxmlformats.org/markup-compatibility/2006">
-        <mc:Choice xmlns:p14="http://schemas.microsoft.com/office/powerpoint/2010/main" Requires="p14">
+      <mc:AlternateContent xmlns:mc="http://schemas.openxmlformats.org/markup-compatibility/2006" xmlns:p14="http://schemas.microsoft.com/office/powerpoint/2010/main">
+        <mc:Choice Requires="p14">
           <p:contentPart p14:bwMode="auto" r:id="rId28">
             <p14:nvContentPartPr>
               <p14:cNvPr id="31" name="Ink 30">
@@ -13222,7 +13222,7 @@
             </p14:xfrm>
           </p:contentPart>
         </mc:Choice>
-        <mc:Fallback>
+        <mc:Fallback xmlns="">
           <p:pic>
             <p:nvPicPr>
               <p:cNvPr id="31" name="Ink 30">
@@ -13253,8 +13253,8 @@
           </p:pic>
         </mc:Fallback>
       </mc:AlternateContent>
-      <mc:AlternateContent xmlns:mc="http://schemas.openxmlformats.org/markup-compatibility/2006">
-        <mc:Choice xmlns:p14="http://schemas.microsoft.com/office/powerpoint/2010/main" Requires="p14">
+      <mc:AlternateContent xmlns:mc="http://schemas.openxmlformats.org/markup-compatibility/2006" xmlns:p14="http://schemas.microsoft.com/office/powerpoint/2010/main">
+        <mc:Choice Requires="p14">
           <p:contentPart p14:bwMode="auto" r:id="rId30">
             <p14:nvContentPartPr>
               <p14:cNvPr id="32" name="Ink 31">
@@ -13273,7 +13273,7 @@
             </p14:xfrm>
           </p:contentPart>
         </mc:Choice>
-        <mc:Fallback>
+        <mc:Fallback xmlns="">
           <p:pic>
             <p:nvPicPr>
               <p:cNvPr id="32" name="Ink 31">
@@ -13324,8 +13324,8 @@
             <a:chExt cx="5790960" cy="2770920"/>
           </a:xfrm>
         </p:grpSpPr>
-        <mc:AlternateContent xmlns:mc="http://schemas.openxmlformats.org/markup-compatibility/2006">
-          <mc:Choice xmlns:p14="http://schemas.microsoft.com/office/powerpoint/2010/main" Requires="p14">
+        <mc:AlternateContent xmlns:mc="http://schemas.openxmlformats.org/markup-compatibility/2006" xmlns:p14="http://schemas.microsoft.com/office/powerpoint/2010/main">
+          <mc:Choice Requires="p14">
             <p:contentPart p14:bwMode="auto" r:id="rId32">
               <p14:nvContentPartPr>
                 <p14:cNvPr id="34" name="Ink 33">
@@ -13344,7 +13344,7 @@
               </p14:xfrm>
             </p:contentPart>
           </mc:Choice>
-          <mc:Fallback>
+          <mc:Fallback xmlns="">
             <p:pic>
               <p:nvPicPr>
                 <p:cNvPr id="34" name="Ink 33">
@@ -13375,8 +13375,8 @@
             </p:pic>
           </mc:Fallback>
         </mc:AlternateContent>
-        <mc:AlternateContent xmlns:mc="http://schemas.openxmlformats.org/markup-compatibility/2006">
-          <mc:Choice xmlns:p14="http://schemas.microsoft.com/office/powerpoint/2010/main" Requires="p14">
+        <mc:AlternateContent xmlns:mc="http://schemas.openxmlformats.org/markup-compatibility/2006" xmlns:p14="http://schemas.microsoft.com/office/powerpoint/2010/main">
+          <mc:Choice Requires="p14">
             <p:contentPart p14:bwMode="auto" r:id="rId34">
               <p14:nvContentPartPr>
                 <p14:cNvPr id="35" name="Ink 34">
@@ -13395,7 +13395,7 @@
               </p14:xfrm>
             </p:contentPart>
           </mc:Choice>
-          <mc:Fallback>
+          <mc:Fallback xmlns="">
             <p:pic>
               <p:nvPicPr>
                 <p:cNvPr id="35" name="Ink 34">
@@ -15290,6 +15290,20 @@
               </a:rPr>
               <a:t>Link to GitHub Repository: </a:t>
             </a:r>
+            <a:r>
+              <a:rPr lang="en-NZ" sz="2000" b="1" dirty="0">
+                <a:solidFill>
+                  <a:srgbClr val="274E13"/>
+                </a:solidFill>
+                <a:hlinkClick r:id="rId2"/>
+              </a:rPr>
+              <a:t>https://github.com/twschool/Assessment</a:t>
+            </a:r>
+            <a:endParaRPr lang="en-NZ" sz="2000" b="1" dirty="0">
+              <a:solidFill>
+                <a:srgbClr val="274E13"/>
+              </a:solidFill>
+            </a:endParaRPr>
           </a:p>
           <a:p>
             <a:pPr marL="0" indent="0">
@@ -15312,27 +15326,26 @@
                   <a:srgbClr val="274E13"/>
                 </a:solidFill>
               </a:rPr>
-              <a:t>Links to Trello board / project management tools:</a:t>
+              <a:t>Links to Trello board / project management tools: </a:t>
             </a:r>
-          </a:p>
-          <a:p>
-            <a:pPr marL="0" indent="0">
-              <a:lnSpc>
-                <a:spcPct val="100000"/>
-              </a:lnSpc>
-              <a:spcBef>
-                <a:spcPts val="0"/>
-              </a:spcBef>
-              <a:buClr>
-                <a:schemeClr val="dk1"/>
-              </a:buClr>
-              <a:buSzPts val="1100"/>
-              <a:buFont typeface="Arial"/>
-              <a:buNone/>
-            </a:pPr>
+            <a:r>
+              <a:rPr lang="en-NZ" sz="2000" b="1" dirty="0">
+                <a:solidFill>
+                  <a:schemeClr val="accent1"/>
+                </a:solidFill>
+                <a:hlinkClick r:id="rId3">
+                  <a:extLst>
+                    <a:ext uri="{A12FA001-AC4F-418D-AE19-62706E023703}">
+                      <ahyp:hlinkClr xmlns:ahyp="http://schemas.microsoft.com/office/drawing/2018/hyperlinkcolor" val="tx"/>
+                    </a:ext>
+                  </a:extLst>
+                </a:hlinkClick>
+              </a:rPr>
+              <a:t>Māori quiz | Trello</a:t>
+            </a:r>
             <a:endParaRPr lang="en-NZ" sz="2000" b="1" dirty="0">
               <a:solidFill>
-                <a:srgbClr val="274E13"/>
+                <a:schemeClr val="accent1"/>
               </a:solidFill>
             </a:endParaRPr>
           </a:p>

</xml_diff>

<commit_message>
Still no idea why this needs a seperate commit
Still no idea why this needs a seperate commit idk what the problem is lol
</commit_message>
<xml_diff>
--- a/Maori quiz documentation.pptx
+++ b/Maori quiz documentation.pptx
@@ -165,7 +165,7 @@
   <pc:docChgLst>
     <pc:chgData name="Thomas Wilson" userId="c8d2c09c-f776-4d90-9411-3be6cc56095c" providerId="ADAL" clId="{1A0B50A4-C99D-47EA-9247-60D74C2ECAA7}"/>
     <pc:docChg chg="undo redo custSel addSld delSld modSld">
-      <pc:chgData name="Thomas Wilson" userId="c8d2c09c-f776-4d90-9411-3be6cc56095c" providerId="ADAL" clId="{1A0B50A4-C99D-47EA-9247-60D74C2ECAA7}" dt="2022-05-02T08:05:23.713" v="954" actId="207"/>
+      <pc:chgData name="Thomas Wilson" userId="c8d2c09c-f776-4d90-9411-3be6cc56095c" providerId="ADAL" clId="{1A0B50A4-C99D-47EA-9247-60D74C2ECAA7}" dt="2022-05-02T21:04:36.315" v="993" actId="20577"/>
       <pc:docMkLst>
         <pc:docMk/>
       </pc:docMkLst>
@@ -568,6 +568,21 @@
             <ac:inkMk id="10" creationId="{5433A9E3-0070-4BA1-A9D7-D393F2C71408}"/>
           </ac:inkMkLst>
         </pc:inkChg>
+      </pc:sldChg>
+      <pc:sldChg chg="modSp mod">
+        <pc:chgData name="Thomas Wilson" userId="c8d2c09c-f776-4d90-9411-3be6cc56095c" providerId="ADAL" clId="{1A0B50A4-C99D-47EA-9247-60D74C2ECAA7}" dt="2022-05-02T21:04:36.315" v="993" actId="20577"/>
+        <pc:sldMkLst>
+          <pc:docMk/>
+          <pc:sldMk cId="4081516222" sldId="277"/>
+        </pc:sldMkLst>
+        <pc:graphicFrameChg chg="modGraphic">
+          <ac:chgData name="Thomas Wilson" userId="c8d2c09c-f776-4d90-9411-3be6cc56095c" providerId="ADAL" clId="{1A0B50A4-C99D-47EA-9247-60D74C2ECAA7}" dt="2022-05-02T21:04:36.315" v="993" actId="20577"/>
+          <ac:graphicFrameMkLst>
+            <pc:docMk/>
+            <pc:sldMk cId="4081516222" sldId="277"/>
+            <ac:graphicFrameMk id="5" creationId="{98F4BDB5-BB58-4AC0-837B-0A3E74266B65}"/>
+          </ac:graphicFrameMkLst>
+        </pc:graphicFrameChg>
       </pc:sldChg>
       <pc:sldChg chg="add del">
         <pc:chgData name="Thomas Wilson" userId="c8d2c09c-f776-4d90-9411-3be6cc56095c" providerId="ADAL" clId="{1A0B50A4-C99D-47EA-9247-60D74C2ECAA7}" dt="2022-05-02T07:38:57.083" v="845" actId="47"/>
@@ -2484,7 +2499,7 @@
           <a:p>
             <a:fld id="{F37D28C0-BEB6-42B0-A203-EEE1023219C4}" type="datetimeFigureOut">
               <a:rPr lang="en-NZ" smtClean="0"/>
-              <a:t>2/05/2022</a:t>
+              <a:t>3/05/2022</a:t>
             </a:fld>
             <a:endParaRPr lang="en-NZ"/>
           </a:p>
@@ -6680,7 +6695,7 @@
           <a:p>
             <a:fld id="{9C4A4F43-1C06-40E6-8F87-8B286982E50E}" type="datetimeFigureOut">
               <a:rPr lang="en-NZ" smtClean="0"/>
-              <a:t>2/05/2022</a:t>
+              <a:t>3/05/2022</a:t>
             </a:fld>
             <a:endParaRPr lang="en-NZ" dirty="0"/>
           </a:p>
@@ -6880,7 +6895,7 @@
           <a:p>
             <a:fld id="{9C4A4F43-1C06-40E6-8F87-8B286982E50E}" type="datetimeFigureOut">
               <a:rPr lang="en-NZ" smtClean="0"/>
-              <a:t>2/05/2022</a:t>
+              <a:t>3/05/2022</a:t>
             </a:fld>
             <a:endParaRPr lang="en-NZ" dirty="0"/>
           </a:p>
@@ -7090,7 +7105,7 @@
           <a:p>
             <a:fld id="{9C4A4F43-1C06-40E6-8F87-8B286982E50E}" type="datetimeFigureOut">
               <a:rPr lang="en-NZ" smtClean="0"/>
-              <a:t>2/05/2022</a:t>
+              <a:t>3/05/2022</a:t>
             </a:fld>
             <a:endParaRPr lang="en-NZ" dirty="0"/>
           </a:p>
@@ -7649,7 +7664,7 @@
           <a:p>
             <a:fld id="{9C4A4F43-1C06-40E6-8F87-8B286982E50E}" type="datetimeFigureOut">
               <a:rPr lang="en-NZ" smtClean="0"/>
-              <a:t>2/05/2022</a:t>
+              <a:t>3/05/2022</a:t>
             </a:fld>
             <a:endParaRPr lang="en-NZ" dirty="0"/>
           </a:p>
@@ -7925,7 +7940,7 @@
           <a:p>
             <a:fld id="{9C4A4F43-1C06-40E6-8F87-8B286982E50E}" type="datetimeFigureOut">
               <a:rPr lang="en-NZ" smtClean="0"/>
-              <a:t>2/05/2022</a:t>
+              <a:t>3/05/2022</a:t>
             </a:fld>
             <a:endParaRPr lang="en-NZ" dirty="0"/>
           </a:p>
@@ -8193,7 +8208,7 @@
           <a:p>
             <a:fld id="{9C4A4F43-1C06-40E6-8F87-8B286982E50E}" type="datetimeFigureOut">
               <a:rPr lang="en-NZ" smtClean="0"/>
-              <a:t>2/05/2022</a:t>
+              <a:t>3/05/2022</a:t>
             </a:fld>
             <a:endParaRPr lang="en-NZ" dirty="0"/>
           </a:p>
@@ -8608,7 +8623,7 @@
           <a:p>
             <a:fld id="{9C4A4F43-1C06-40E6-8F87-8B286982E50E}" type="datetimeFigureOut">
               <a:rPr lang="en-NZ" smtClean="0"/>
-              <a:t>2/05/2022</a:t>
+              <a:t>3/05/2022</a:t>
             </a:fld>
             <a:endParaRPr lang="en-NZ" dirty="0"/>
           </a:p>
@@ -8750,7 +8765,7 @@
           <a:p>
             <a:fld id="{9C4A4F43-1C06-40E6-8F87-8B286982E50E}" type="datetimeFigureOut">
               <a:rPr lang="en-NZ" smtClean="0"/>
-              <a:t>2/05/2022</a:t>
+              <a:t>3/05/2022</a:t>
             </a:fld>
             <a:endParaRPr lang="en-NZ" dirty="0"/>
           </a:p>
@@ -8863,7 +8878,7 @@
           <a:p>
             <a:fld id="{9C4A4F43-1C06-40E6-8F87-8B286982E50E}" type="datetimeFigureOut">
               <a:rPr lang="en-NZ" smtClean="0"/>
-              <a:t>2/05/2022</a:t>
+              <a:t>3/05/2022</a:t>
             </a:fld>
             <a:endParaRPr lang="en-NZ" dirty="0"/>
           </a:p>
@@ -9176,7 +9191,7 @@
           <a:p>
             <a:fld id="{9C4A4F43-1C06-40E6-8F87-8B286982E50E}" type="datetimeFigureOut">
               <a:rPr lang="en-NZ" smtClean="0"/>
-              <a:t>2/05/2022</a:t>
+              <a:t>3/05/2022</a:t>
             </a:fld>
             <a:endParaRPr lang="en-NZ" dirty="0"/>
           </a:p>
@@ -9465,7 +9480,7 @@
           <a:p>
             <a:fld id="{9C4A4F43-1C06-40E6-8F87-8B286982E50E}" type="datetimeFigureOut">
               <a:rPr lang="en-NZ" smtClean="0"/>
-              <a:t>2/05/2022</a:t>
+              <a:t>3/05/2022</a:t>
             </a:fld>
             <a:endParaRPr lang="en-NZ" dirty="0"/>
           </a:p>
@@ -9708,7 +9723,7 @@
           <a:p>
             <a:fld id="{9C4A4F43-1C06-40E6-8F87-8B286982E50E}" type="datetimeFigureOut">
               <a:rPr lang="en-NZ" smtClean="0"/>
-              <a:t>2/05/2022</a:t>
+              <a:t>3/05/2022</a:t>
             </a:fld>
             <a:endParaRPr lang="en-NZ" dirty="0"/>
           </a:p>
@@ -12039,7 +12054,7 @@
           <p:nvPr>
             <p:extLst>
               <p:ext uri="{D42A27DB-BD31-4B8C-83A1-F6EECF244321}">
-                <p14:modId xmlns:p14="http://schemas.microsoft.com/office/powerpoint/2010/main" val="1610573675"/>
+                <p14:modId xmlns:p14="http://schemas.microsoft.com/office/powerpoint/2010/main" val="2442392129"/>
               </p:ext>
             </p:extLst>
           </p:nvPr>
@@ -12101,10 +12116,9 @@
                         <a:buNone/>
                       </a:pPr>
                       <a:r>
-                        <a:rPr lang="en-NZ" sz="2400" dirty="0"/>
-                        <a:t>yes_no_v1.py</a:t>
+                        <a:rPr lang="en-US" sz="2400" dirty="0"/>
+                        <a:t>generate_random_options_v1.py</a:t>
                       </a:r>
-                      <a:endParaRPr lang="en-US" sz="2400" dirty="0"/>
                     </a:p>
                   </a:txBody>
                   <a:tcPr marL="121900" marR="121900" marT="121900" marB="121900"/>

</xml_diff>

<commit_message>
More testing done for the paperwork
Testing has been done
</commit_message>
<xml_diff>
--- a/Maori quiz documentation.pptx
+++ b/Maori quiz documentation.pptx
@@ -20,12 +20,12 @@
     <p:sldId id="292" r:id="rId11"/>
     <p:sldId id="269" r:id="rId12"/>
     <p:sldId id="304" r:id="rId13"/>
-    <p:sldId id="277" r:id="rId14"/>
-    <p:sldId id="276" r:id="rId15"/>
-    <p:sldId id="300" r:id="rId16"/>
-    <p:sldId id="281" r:id="rId17"/>
-    <p:sldId id="301" r:id="rId18"/>
-    <p:sldId id="283" r:id="rId19"/>
+    <p:sldId id="306" r:id="rId14"/>
+    <p:sldId id="277" r:id="rId15"/>
+    <p:sldId id="276" r:id="rId16"/>
+    <p:sldId id="300" r:id="rId17"/>
+    <p:sldId id="281" r:id="rId18"/>
+    <p:sldId id="301" r:id="rId19"/>
     <p:sldId id="285" r:id="rId20"/>
     <p:sldId id="287" r:id="rId21"/>
     <p:sldId id="288" r:id="rId22"/>
@@ -155,7 +155,7 @@
 <file path=ppt/revisionInfo.xml><?xml version="1.0" encoding="utf-8"?>
 <p1510:revInfo xmlns:a="http://schemas.openxmlformats.org/drawingml/2006/main" xmlns:r="http://schemas.openxmlformats.org/officeDocument/2006/relationships" xmlns:p1510="http://schemas.microsoft.com/office/powerpoint/2015/10/main">
   <p1510:revLst>
-    <p1510:client id="{1A0B50A4-C99D-47EA-9247-60D74C2ECAA7}" v="24" dt="2022-05-02T08:03:18.952"/>
+    <p1510:client id="{1A0B50A4-C99D-47EA-9247-60D74C2ECAA7}" v="58" dt="2022-05-08T23:38:38.450"/>
   </p1510:revLst>
 </p1510:revInfo>
 </file>
@@ -164,8 +164,8 @@
 <pc:chgInfo xmlns:a="http://schemas.openxmlformats.org/drawingml/2006/main" xmlns:r="http://schemas.openxmlformats.org/officeDocument/2006/relationships" xmlns:ac="http://schemas.microsoft.com/office/drawing/2013/main/command" xmlns:pc="http://schemas.microsoft.com/office/powerpoint/2013/main/command">
   <pc:docChgLst>
     <pc:chgData name="Thomas Wilson" userId="c8d2c09c-f776-4d90-9411-3be6cc56095c" providerId="ADAL" clId="{1A0B50A4-C99D-47EA-9247-60D74C2ECAA7}"/>
-    <pc:docChg chg="undo redo custSel addSld delSld modSld">
-      <pc:chgData name="Thomas Wilson" userId="c8d2c09c-f776-4d90-9411-3be6cc56095c" providerId="ADAL" clId="{1A0B50A4-C99D-47EA-9247-60D74C2ECAA7}" dt="2022-05-02T21:04:36.315" v="993" actId="20577"/>
+    <pc:docChg chg="undo redo custSel addSld delSld modSld sldOrd">
+      <pc:chgData name="Thomas Wilson" userId="c8d2c09c-f776-4d90-9411-3be6cc56095c" providerId="ADAL" clId="{1A0B50A4-C99D-47EA-9247-60D74C2ECAA7}" dt="2022-05-08T23:40:07.334" v="2590" actId="20577"/>
       <pc:docMkLst>
         <pc:docMk/>
       </pc:docMkLst>
@@ -569,14 +569,22 @@
           </ac:inkMkLst>
         </pc:inkChg>
       </pc:sldChg>
-      <pc:sldChg chg="modSp mod">
-        <pc:chgData name="Thomas Wilson" userId="c8d2c09c-f776-4d90-9411-3be6cc56095c" providerId="ADAL" clId="{1A0B50A4-C99D-47EA-9247-60D74C2ECAA7}" dt="2022-05-02T21:04:36.315" v="993" actId="20577"/>
+      <pc:sldChg chg="modSp mod ord">
+        <pc:chgData name="Thomas Wilson" userId="c8d2c09c-f776-4d90-9411-3be6cc56095c" providerId="ADAL" clId="{1A0B50A4-C99D-47EA-9247-60D74C2ECAA7}" dt="2022-05-08T23:38:51.098" v="2522" actId="20577"/>
         <pc:sldMkLst>
           <pc:docMk/>
           <pc:sldMk cId="4081516222" sldId="277"/>
         </pc:sldMkLst>
-        <pc:graphicFrameChg chg="modGraphic">
-          <ac:chgData name="Thomas Wilson" userId="c8d2c09c-f776-4d90-9411-3be6cc56095c" providerId="ADAL" clId="{1A0B50A4-C99D-47EA-9247-60D74C2ECAA7}" dt="2022-05-02T21:04:36.315" v="993" actId="20577"/>
+        <pc:spChg chg="mod">
+          <ac:chgData name="Thomas Wilson" userId="c8d2c09c-f776-4d90-9411-3be6cc56095c" providerId="ADAL" clId="{1A0B50A4-C99D-47EA-9247-60D74C2ECAA7}" dt="2022-05-08T23:19:33.687" v="1928" actId="20577"/>
+          <ac:spMkLst>
+            <pc:docMk/>
+            <pc:sldMk cId="4081516222" sldId="277"/>
+            <ac:spMk id="2" creationId="{1CC5D32F-7C18-4D00-8D54-2FB046F0A206}"/>
+          </ac:spMkLst>
+        </pc:spChg>
+        <pc:graphicFrameChg chg="mod modGraphic">
+          <ac:chgData name="Thomas Wilson" userId="c8d2c09c-f776-4d90-9411-3be6cc56095c" providerId="ADAL" clId="{1A0B50A4-C99D-47EA-9247-60D74C2ECAA7}" dt="2022-05-08T23:38:51.098" v="2522" actId="20577"/>
           <ac:graphicFrameMkLst>
             <pc:docMk/>
             <pc:sldMk cId="4081516222" sldId="277"/>
@@ -654,11 +662,49 @@
           </ac:picMkLst>
         </pc:picChg>
       </pc:sldChg>
+      <pc:sldChg chg="addSp delSp modSp mod">
+        <pc:chgData name="Thomas Wilson" userId="c8d2c09c-f776-4d90-9411-3be6cc56095c" providerId="ADAL" clId="{1A0B50A4-C99D-47EA-9247-60D74C2ECAA7}" dt="2022-05-08T23:24:33.673" v="2106" actId="20577"/>
+        <pc:sldMkLst>
+          <pc:docMk/>
+          <pc:sldMk cId="1495764827" sldId="281"/>
+        </pc:sldMkLst>
+        <pc:spChg chg="mod">
+          <ac:chgData name="Thomas Wilson" userId="c8d2c09c-f776-4d90-9411-3be6cc56095c" providerId="ADAL" clId="{1A0B50A4-C99D-47EA-9247-60D74C2ECAA7}" dt="2022-05-08T23:21:39.425" v="1959" actId="20577"/>
+          <ac:spMkLst>
+            <pc:docMk/>
+            <pc:sldMk cId="1495764827" sldId="281"/>
+            <ac:spMk id="91" creationId="{00000000-0000-0000-0000-000000000000}"/>
+          </ac:spMkLst>
+        </pc:spChg>
+        <pc:graphicFrameChg chg="add del mod">
+          <ac:chgData name="Thomas Wilson" userId="c8d2c09c-f776-4d90-9411-3be6cc56095c" providerId="ADAL" clId="{1A0B50A4-C99D-47EA-9247-60D74C2ECAA7}" dt="2022-05-08T23:24:00.253" v="2059" actId="478"/>
+          <ac:graphicFrameMkLst>
+            <pc:docMk/>
+            <pc:sldMk cId="1495764827" sldId="281"/>
+            <ac:graphicFrameMk id="4" creationId="{F8036549-060F-30C8-F859-DD4FA4133F47}"/>
+          </ac:graphicFrameMkLst>
+        </pc:graphicFrameChg>
+        <pc:graphicFrameChg chg="mod modGraphic">
+          <ac:chgData name="Thomas Wilson" userId="c8d2c09c-f776-4d90-9411-3be6cc56095c" providerId="ADAL" clId="{1A0B50A4-C99D-47EA-9247-60D74C2ECAA7}" dt="2022-05-08T23:24:33.673" v="2106" actId="20577"/>
+          <ac:graphicFrameMkLst>
+            <pc:docMk/>
+            <pc:sldMk cId="1495764827" sldId="281"/>
+            <ac:graphicFrameMk id="92" creationId="{00000000-0000-0000-0000-000000000000}"/>
+          </ac:graphicFrameMkLst>
+        </pc:graphicFrameChg>
+      </pc:sldChg>
       <pc:sldChg chg="add del">
         <pc:chgData name="Thomas Wilson" userId="c8d2c09c-f776-4d90-9411-3be6cc56095c" providerId="ADAL" clId="{1A0B50A4-C99D-47EA-9247-60D74C2ECAA7}" dt="2022-05-02T07:38:53.256" v="843" actId="47"/>
         <pc:sldMkLst>
           <pc:docMk/>
           <pc:sldMk cId="2372213549" sldId="282"/>
+        </pc:sldMkLst>
+      </pc:sldChg>
+      <pc:sldChg chg="add del">
+        <pc:chgData name="Thomas Wilson" userId="c8d2c09c-f776-4d90-9411-3be6cc56095c" providerId="ADAL" clId="{1A0B50A4-C99D-47EA-9247-60D74C2ECAA7}" dt="2022-05-08T23:36:42.294" v="2392" actId="47"/>
+        <pc:sldMkLst>
+          <pc:docMk/>
+          <pc:sldMk cId="1978771168" sldId="283"/>
         </pc:sldMkLst>
       </pc:sldChg>
       <pc:sldChg chg="addSp delSp modSp mod">
@@ -796,13 +842,13 @@
         </pc:picChg>
       </pc:sldChg>
       <pc:sldChg chg="addSp delSp modSp mod">
-        <pc:chgData name="Thomas Wilson" userId="c8d2c09c-f776-4d90-9411-3be6cc56095c" providerId="ADAL" clId="{1A0B50A4-C99D-47EA-9247-60D74C2ECAA7}" dt="2022-05-02T07:12:11.854" v="756" actId="1076"/>
+        <pc:chgData name="Thomas Wilson" userId="c8d2c09c-f776-4d90-9411-3be6cc56095c" providerId="ADAL" clId="{1A0B50A4-C99D-47EA-9247-60D74C2ECAA7}" dt="2022-05-05T00:27:04.949" v="1012" actId="20577"/>
         <pc:sldMkLst>
           <pc:docMk/>
           <pc:sldMk cId="2442620444" sldId="292"/>
         </pc:sldMkLst>
         <pc:spChg chg="mod">
-          <ac:chgData name="Thomas Wilson" userId="c8d2c09c-f776-4d90-9411-3be6cc56095c" providerId="ADAL" clId="{1A0B50A4-C99D-47EA-9247-60D74C2ECAA7}" dt="2022-05-02T07:09:16.534" v="622" actId="1076"/>
+          <ac:chgData name="Thomas Wilson" userId="c8d2c09c-f776-4d90-9411-3be6cc56095c" providerId="ADAL" clId="{1A0B50A4-C99D-47EA-9247-60D74C2ECAA7}" dt="2022-05-05T00:27:04.949" v="1012" actId="20577"/>
           <ac:spMkLst>
             <pc:docMk/>
             <pc:sldMk cId="2442620444" sldId="292"/>
@@ -1098,7 +1144,238 @@
         </pc:inkChg>
       </pc:sldChg>
       <pc:sldChg chg="addSp delSp modSp mod">
-        <pc:chgData name="Thomas Wilson" userId="c8d2c09c-f776-4d90-9411-3be6cc56095c" providerId="ADAL" clId="{1A0B50A4-C99D-47EA-9247-60D74C2ECAA7}" dt="2022-05-02T07:54:56.625" v="912"/>
+        <pc:chgData name="Thomas Wilson" userId="c8d2c09c-f776-4d90-9411-3be6cc56095c" providerId="ADAL" clId="{1A0B50A4-C99D-47EA-9247-60D74C2ECAA7}" dt="2022-05-08T23:35:49.318" v="2389" actId="14100"/>
+        <pc:sldMkLst>
+          <pc:docMk/>
+          <pc:sldMk cId="1484285873" sldId="301"/>
+        </pc:sldMkLst>
+        <pc:spChg chg="add mod">
+          <ac:chgData name="Thomas Wilson" userId="c8d2c09c-f776-4d90-9411-3be6cc56095c" providerId="ADAL" clId="{1A0B50A4-C99D-47EA-9247-60D74C2ECAA7}" dt="2022-05-08T23:30:54.433" v="2182" actId="1582"/>
+          <ac:spMkLst>
+            <pc:docMk/>
+            <pc:sldMk cId="1484285873" sldId="301"/>
+            <ac:spMk id="33" creationId="{90BD2A9D-1E99-A818-EE5F-783BB18013FF}"/>
+          </ac:spMkLst>
+        </pc:spChg>
+        <pc:spChg chg="add mod">
+          <ac:chgData name="Thomas Wilson" userId="c8d2c09c-f776-4d90-9411-3be6cc56095c" providerId="ADAL" clId="{1A0B50A4-C99D-47EA-9247-60D74C2ECAA7}" dt="2022-05-08T23:31:06.780" v="2186" actId="14100"/>
+          <ac:spMkLst>
+            <pc:docMk/>
+            <pc:sldMk cId="1484285873" sldId="301"/>
+            <ac:spMk id="35" creationId="{09F804AC-02F3-753D-76DF-11BF868F8F84}"/>
+          </ac:spMkLst>
+        </pc:spChg>
+        <pc:spChg chg="add mod">
+          <ac:chgData name="Thomas Wilson" userId="c8d2c09c-f776-4d90-9411-3be6cc56095c" providerId="ADAL" clId="{1A0B50A4-C99D-47EA-9247-60D74C2ECAA7}" dt="2022-05-08T23:31:51.141" v="2209" actId="208"/>
+          <ac:spMkLst>
+            <pc:docMk/>
+            <pc:sldMk cId="1484285873" sldId="301"/>
+            <ac:spMk id="36" creationId="{5761F43B-D8F3-0D7E-7F4B-F83CB5C72E9D}"/>
+          </ac:spMkLst>
+        </pc:spChg>
+        <pc:spChg chg="add mod">
+          <ac:chgData name="Thomas Wilson" userId="c8d2c09c-f776-4d90-9411-3be6cc56095c" providerId="ADAL" clId="{1A0B50A4-C99D-47EA-9247-60D74C2ECAA7}" dt="2022-05-08T23:32:05.940" v="2248" actId="208"/>
+          <ac:spMkLst>
+            <pc:docMk/>
+            <pc:sldMk cId="1484285873" sldId="301"/>
+            <ac:spMk id="37" creationId="{2D8BE697-B566-5B97-3D58-456E504BCA60}"/>
+          </ac:spMkLst>
+        </pc:spChg>
+        <pc:spChg chg="add mod">
+          <ac:chgData name="Thomas Wilson" userId="c8d2c09c-f776-4d90-9411-3be6cc56095c" providerId="ADAL" clId="{1A0B50A4-C99D-47EA-9247-60D74C2ECAA7}" dt="2022-05-08T23:32:22.195" v="2274" actId="208"/>
+          <ac:spMkLst>
+            <pc:docMk/>
+            <pc:sldMk cId="1484285873" sldId="301"/>
+            <ac:spMk id="38" creationId="{201B81A2-982E-3713-4CAE-61B88A4FA73F}"/>
+          </ac:spMkLst>
+        </pc:spChg>
+        <pc:spChg chg="add mod">
+          <ac:chgData name="Thomas Wilson" userId="c8d2c09c-f776-4d90-9411-3be6cc56095c" providerId="ADAL" clId="{1A0B50A4-C99D-47EA-9247-60D74C2ECAA7}" dt="2022-05-08T23:34:17.873" v="2343" actId="208"/>
+          <ac:spMkLst>
+            <pc:docMk/>
+            <pc:sldMk cId="1484285873" sldId="301"/>
+            <ac:spMk id="39" creationId="{3050306E-4F9D-88E1-7D26-9ECD992D7463}"/>
+          </ac:spMkLst>
+        </pc:spChg>
+        <pc:spChg chg="add mod">
+          <ac:chgData name="Thomas Wilson" userId="c8d2c09c-f776-4d90-9411-3be6cc56095c" providerId="ADAL" clId="{1A0B50A4-C99D-47EA-9247-60D74C2ECAA7}" dt="2022-05-08T23:34:56.568" v="2348" actId="14100"/>
+          <ac:spMkLst>
+            <pc:docMk/>
+            <pc:sldMk cId="1484285873" sldId="301"/>
+            <ac:spMk id="40" creationId="{89C01790-183D-D3F0-95FB-CF3BC9C499EC}"/>
+          </ac:spMkLst>
+        </pc:spChg>
+        <pc:spChg chg="add mod">
+          <ac:chgData name="Thomas Wilson" userId="c8d2c09c-f776-4d90-9411-3be6cc56095c" providerId="ADAL" clId="{1A0B50A4-C99D-47EA-9247-60D74C2ECAA7}" dt="2022-05-08T23:33:12.645" v="2316" actId="208"/>
+          <ac:spMkLst>
+            <pc:docMk/>
+            <pc:sldMk cId="1484285873" sldId="301"/>
+            <ac:spMk id="41" creationId="{FD00E08C-6D9A-951E-4376-F300A4AFFC64}"/>
+          </ac:spMkLst>
+        </pc:spChg>
+        <pc:spChg chg="add mod">
+          <ac:chgData name="Thomas Wilson" userId="c8d2c09c-f776-4d90-9411-3be6cc56095c" providerId="ADAL" clId="{1A0B50A4-C99D-47EA-9247-60D74C2ECAA7}" dt="2022-05-08T23:33:26.718" v="2324" actId="1036"/>
+          <ac:spMkLst>
+            <pc:docMk/>
+            <pc:sldMk cId="1484285873" sldId="301"/>
+            <ac:spMk id="42" creationId="{CE26A189-3AD7-757E-D619-B68D39ED16A5}"/>
+          </ac:spMkLst>
+        </pc:spChg>
+        <pc:spChg chg="add del mod">
+          <ac:chgData name="Thomas Wilson" userId="c8d2c09c-f776-4d90-9411-3be6cc56095c" providerId="ADAL" clId="{1A0B50A4-C99D-47EA-9247-60D74C2ECAA7}" dt="2022-05-08T23:34:12.843" v="2342" actId="208"/>
+          <ac:spMkLst>
+            <pc:docMk/>
+            <pc:sldMk cId="1484285873" sldId="301"/>
+            <ac:spMk id="43" creationId="{40A4E50A-2E59-5E06-CF8F-91B125A5D73D}"/>
+          </ac:spMkLst>
+        </pc:spChg>
+        <pc:spChg chg="add mod">
+          <ac:chgData name="Thomas Wilson" userId="c8d2c09c-f776-4d90-9411-3be6cc56095c" providerId="ADAL" clId="{1A0B50A4-C99D-47EA-9247-60D74C2ECAA7}" dt="2022-05-08T23:35:20.571" v="2388" actId="1076"/>
+          <ac:spMkLst>
+            <pc:docMk/>
+            <pc:sldMk cId="1484285873" sldId="301"/>
+            <ac:spMk id="45" creationId="{48E298AC-B3D0-620B-86C0-07C3F207570E}"/>
+          </ac:spMkLst>
+        </pc:spChg>
+        <pc:spChg chg="mod">
+          <ac:chgData name="Thomas Wilson" userId="c8d2c09c-f776-4d90-9411-3be6cc56095c" providerId="ADAL" clId="{1A0B50A4-C99D-47EA-9247-60D74C2ECAA7}" dt="2022-05-08T23:27:13.492" v="2117" actId="122"/>
+          <ac:spMkLst>
+            <pc:docMk/>
+            <pc:sldMk cId="1484285873" sldId="301"/>
+            <ac:spMk id="91" creationId="{00000000-0000-0000-0000-000000000000}"/>
+          </ac:spMkLst>
+        </pc:spChg>
+        <pc:grpChg chg="del">
+          <ac:chgData name="Thomas Wilson" userId="c8d2c09c-f776-4d90-9411-3be6cc56095c" providerId="ADAL" clId="{1A0B50A4-C99D-47EA-9247-60D74C2ECAA7}" dt="2022-05-08T23:27:07.163" v="2113" actId="478"/>
+          <ac:grpSpMkLst>
+            <pc:docMk/>
+            <pc:sldMk cId="1484285873" sldId="301"/>
+            <ac:grpSpMk id="11" creationId="{32CB23A6-3ACD-4A49-A2D5-87D362B3F17D}"/>
+          </ac:grpSpMkLst>
+        </pc:grpChg>
+        <pc:grpChg chg="del">
+          <ac:chgData name="Thomas Wilson" userId="c8d2c09c-f776-4d90-9411-3be6cc56095c" providerId="ADAL" clId="{1A0B50A4-C99D-47EA-9247-60D74C2ECAA7}" dt="2022-05-08T23:27:08.334" v="2114" actId="478"/>
+          <ac:grpSpMkLst>
+            <pc:docMk/>
+            <pc:sldMk cId="1484285873" sldId="301"/>
+            <ac:grpSpMk id="16" creationId="{3D100484-01BD-4074-9CC1-688E2B06BC77}"/>
+          </ac:grpSpMkLst>
+        </pc:grpChg>
+        <pc:graphicFrameChg chg="add del mod modGraphic">
+          <ac:chgData name="Thomas Wilson" userId="c8d2c09c-f776-4d90-9411-3be6cc56095c" providerId="ADAL" clId="{1A0B50A4-C99D-47EA-9247-60D74C2ECAA7}" dt="2022-05-08T23:27:43.417" v="2124" actId="478"/>
+          <ac:graphicFrameMkLst>
+            <pc:docMk/>
+            <pc:sldMk cId="1484285873" sldId="301"/>
+            <ac:graphicFrameMk id="17" creationId="{BA8C6491-4A57-E64D-6D98-4A3954684931}"/>
+          </ac:graphicFrameMkLst>
+        </pc:graphicFrameChg>
+        <pc:picChg chg="del">
+          <ac:chgData name="Thomas Wilson" userId="c8d2c09c-f776-4d90-9411-3be6cc56095c" providerId="ADAL" clId="{1A0B50A4-C99D-47EA-9247-60D74C2ECAA7}" dt="2022-05-08T23:27:09.794" v="2116" actId="478"/>
+          <ac:picMkLst>
+            <pc:docMk/>
+            <pc:sldMk cId="1484285873" sldId="301"/>
+            <ac:picMk id="3" creationId="{81CEF5AF-EA11-4949-A095-2921AC8486BA}"/>
+          </ac:picMkLst>
+        </pc:picChg>
+        <pc:picChg chg="add mod">
+          <ac:chgData name="Thomas Wilson" userId="c8d2c09c-f776-4d90-9411-3be6cc56095c" providerId="ADAL" clId="{1A0B50A4-C99D-47EA-9247-60D74C2ECAA7}" dt="2022-05-08T23:33:31.535" v="2327" actId="1076"/>
+          <ac:picMkLst>
+            <pc:docMk/>
+            <pc:sldMk cId="1484285873" sldId="301"/>
+            <ac:picMk id="4" creationId="{30BE1D6A-14EE-0EEA-C209-6BBF64EFF7C3}"/>
+          </ac:picMkLst>
+        </pc:picChg>
+        <pc:picChg chg="del">
+          <ac:chgData name="Thomas Wilson" userId="c8d2c09c-f776-4d90-9411-3be6cc56095c" providerId="ADAL" clId="{1A0B50A4-C99D-47EA-9247-60D74C2ECAA7}" dt="2022-05-08T23:26:47.605" v="2107" actId="478"/>
+          <ac:picMkLst>
+            <pc:docMk/>
+            <pc:sldMk cId="1484285873" sldId="301"/>
+            <ac:picMk id="5" creationId="{5344551E-2CD0-4938-8DB8-1610DF95E52A}"/>
+          </ac:picMkLst>
+        </pc:picChg>
+        <pc:picChg chg="del">
+          <ac:chgData name="Thomas Wilson" userId="c8d2c09c-f776-4d90-9411-3be6cc56095c" providerId="ADAL" clId="{1A0B50A4-C99D-47EA-9247-60D74C2ECAA7}" dt="2022-05-08T23:26:49.753" v="2108" actId="478"/>
+          <ac:picMkLst>
+            <pc:docMk/>
+            <pc:sldMk cId="1484285873" sldId="301"/>
+            <ac:picMk id="7" creationId="{27212B1C-F446-462A-954E-27276F3C6C88}"/>
+          </ac:picMkLst>
+        </pc:picChg>
+        <pc:picChg chg="add del mod">
+          <ac:chgData name="Thomas Wilson" userId="c8d2c09c-f776-4d90-9411-3be6cc56095c" providerId="ADAL" clId="{1A0B50A4-C99D-47EA-9247-60D74C2ECAA7}" dt="2022-05-08T23:28:28.653" v="2134" actId="478"/>
+          <ac:picMkLst>
+            <pc:docMk/>
+            <pc:sldMk cId="1484285873" sldId="301"/>
+            <ac:picMk id="18" creationId="{5C3C3EEF-C556-AF8C-BE80-50BE1C4AA1D7}"/>
+          </ac:picMkLst>
+        </pc:picChg>
+        <pc:inkChg chg="del">
+          <ac:chgData name="Thomas Wilson" userId="c8d2c09c-f776-4d90-9411-3be6cc56095c" providerId="ADAL" clId="{1A0B50A4-C99D-47EA-9247-60D74C2ECAA7}" dt="2022-05-08T23:27:06.055" v="2112" actId="478"/>
+          <ac:inkMkLst>
+            <pc:docMk/>
+            <pc:sldMk cId="1484285873" sldId="301"/>
+            <ac:inkMk id="8" creationId="{87052391-E576-41A0-AF79-D9BE42B8B4B5}"/>
+          </ac:inkMkLst>
+        </pc:inkChg>
+        <pc:inkChg chg="del">
+          <ac:chgData name="Thomas Wilson" userId="c8d2c09c-f776-4d90-9411-3be6cc56095c" providerId="ADAL" clId="{1A0B50A4-C99D-47EA-9247-60D74C2ECAA7}" dt="2022-05-08T23:27:09.397" v="2115" actId="478"/>
+          <ac:inkMkLst>
+            <pc:docMk/>
+            <pc:sldMk cId="1484285873" sldId="301"/>
+            <ac:inkMk id="13" creationId="{0BCA063C-B321-486B-9887-778B48750497}"/>
+          </ac:inkMkLst>
+        </pc:inkChg>
+        <pc:cxnChg chg="add mod">
+          <ac:chgData name="Thomas Wilson" userId="c8d2c09c-f776-4d90-9411-3be6cc56095c" providerId="ADAL" clId="{1A0B50A4-C99D-47EA-9247-60D74C2ECAA7}" dt="2022-05-08T23:34:06.139" v="2341" actId="208"/>
+          <ac:cxnSpMkLst>
+            <pc:docMk/>
+            <pc:sldMk cId="1484285873" sldId="301"/>
+            <ac:cxnSpMk id="20" creationId="{7A33561A-F8F9-E5E8-BC63-70F6B3B586F5}"/>
+          </ac:cxnSpMkLst>
+        </pc:cxnChg>
+        <pc:cxnChg chg="add mod">
+          <ac:chgData name="Thomas Wilson" userId="c8d2c09c-f776-4d90-9411-3be6cc56095c" providerId="ADAL" clId="{1A0B50A4-C99D-47EA-9247-60D74C2ECAA7}" dt="2022-05-08T23:29:23.663" v="2142" actId="208"/>
+          <ac:cxnSpMkLst>
+            <pc:docMk/>
+            <pc:sldMk cId="1484285873" sldId="301"/>
+            <ac:cxnSpMk id="23" creationId="{30FE448C-D987-D0A3-06CA-E4181EF5F958}"/>
+          </ac:cxnSpMkLst>
+        </pc:cxnChg>
+        <pc:cxnChg chg="add mod">
+          <ac:chgData name="Thomas Wilson" userId="c8d2c09c-f776-4d90-9411-3be6cc56095c" providerId="ADAL" clId="{1A0B50A4-C99D-47EA-9247-60D74C2ECAA7}" dt="2022-05-08T23:29:50.116" v="2147" actId="208"/>
+          <ac:cxnSpMkLst>
+            <pc:docMk/>
+            <pc:sldMk cId="1484285873" sldId="301"/>
+            <ac:cxnSpMk id="25" creationId="{44D91E13-F992-A37F-5444-D9EBC0F29B66}"/>
+          </ac:cxnSpMkLst>
+        </pc:cxnChg>
+        <pc:cxnChg chg="add mod">
+          <ac:chgData name="Thomas Wilson" userId="c8d2c09c-f776-4d90-9411-3be6cc56095c" providerId="ADAL" clId="{1A0B50A4-C99D-47EA-9247-60D74C2ECAA7}" dt="2022-05-08T23:30:08.316" v="2151" actId="208"/>
+          <ac:cxnSpMkLst>
+            <pc:docMk/>
+            <pc:sldMk cId="1484285873" sldId="301"/>
+            <ac:cxnSpMk id="29" creationId="{6CCEEE92-FE14-B1FC-6689-0DD58BAB2BAB}"/>
+          </ac:cxnSpMkLst>
+        </pc:cxnChg>
+        <pc:cxnChg chg="add del mod">
+          <ac:chgData name="Thomas Wilson" userId="c8d2c09c-f776-4d90-9411-3be6cc56095c" providerId="ADAL" clId="{1A0B50A4-C99D-47EA-9247-60D74C2ECAA7}" dt="2022-05-08T23:30:28.295" v="2176" actId="478"/>
+          <ac:cxnSpMkLst>
+            <pc:docMk/>
+            <pc:sldMk cId="1484285873" sldId="301"/>
+            <ac:cxnSpMk id="31" creationId="{C9C223EE-101E-B40E-95DF-F0DB4389F9A5}"/>
+          </ac:cxnSpMkLst>
+        </pc:cxnChg>
+        <pc:cxnChg chg="add mod">
+          <ac:chgData name="Thomas Wilson" userId="c8d2c09c-f776-4d90-9411-3be6cc56095c" providerId="ADAL" clId="{1A0B50A4-C99D-47EA-9247-60D74C2ECAA7}" dt="2022-05-08T23:35:49.318" v="2389" actId="14100"/>
+          <ac:cxnSpMkLst>
+            <pc:docMk/>
+            <pc:sldMk cId="1484285873" sldId="301"/>
+            <ac:cxnSpMk id="44" creationId="{B7D5C335-DD64-780E-74C4-A022A1D4889D}"/>
+          </ac:cxnSpMkLst>
+        </pc:cxnChg>
+      </pc:sldChg>
+      <pc:sldChg chg="addSp delSp modSp mod ord">
+        <pc:chgData name="Thomas Wilson" userId="c8d2c09c-f776-4d90-9411-3be6cc56095c" providerId="ADAL" clId="{1A0B50A4-C99D-47EA-9247-60D74C2ECAA7}" dt="2022-05-05T00:26:44.721" v="996" actId="20578"/>
         <pc:sldMkLst>
           <pc:docMk/>
           <pc:sldMk cId="2077189908" sldId="304"/>
@@ -1431,6 +1708,61 @@
             <ac:inkMk id="47" creationId="{CBE4CB14-5B85-4A60-96FB-038DDA18D5F1}"/>
           </ac:inkMkLst>
         </pc:inkChg>
+      </pc:sldChg>
+      <pc:sldChg chg="addSp delSp modSp add mod ord">
+        <pc:chgData name="Thomas Wilson" userId="c8d2c09c-f776-4d90-9411-3be6cc56095c" providerId="ADAL" clId="{1A0B50A4-C99D-47EA-9247-60D74C2ECAA7}" dt="2022-05-08T23:40:07.334" v="2590" actId="20577"/>
+        <pc:sldMkLst>
+          <pc:docMk/>
+          <pc:sldMk cId="1522177698" sldId="306"/>
+        </pc:sldMkLst>
+        <pc:spChg chg="add mod">
+          <ac:chgData name="Thomas Wilson" userId="c8d2c09c-f776-4d90-9411-3be6cc56095c" providerId="ADAL" clId="{1A0B50A4-C99D-47EA-9247-60D74C2ECAA7}" dt="2022-05-08T23:17:07.003" v="1734" actId="20577"/>
+          <ac:spMkLst>
+            <pc:docMk/>
+            <pc:sldMk cId="1522177698" sldId="306"/>
+            <ac:spMk id="9" creationId="{9EB38105-441C-49B5-7AC6-4CA98C61335C}"/>
+          </ac:spMkLst>
+        </pc:spChg>
+        <pc:spChg chg="add mod">
+          <ac:chgData name="Thomas Wilson" userId="c8d2c09c-f776-4d90-9411-3be6cc56095c" providerId="ADAL" clId="{1A0B50A4-C99D-47EA-9247-60D74C2ECAA7}" dt="2022-05-08T23:16:48.573" v="1732" actId="20577"/>
+          <ac:spMkLst>
+            <pc:docMk/>
+            <pc:sldMk cId="1522177698" sldId="306"/>
+            <ac:spMk id="10" creationId="{EB08DE0F-F138-75C4-032E-B3D1FF36F6D5}"/>
+          </ac:spMkLst>
+        </pc:spChg>
+        <pc:graphicFrameChg chg="add del modGraphic">
+          <ac:chgData name="Thomas Wilson" userId="c8d2c09c-f776-4d90-9411-3be6cc56095c" providerId="ADAL" clId="{1A0B50A4-C99D-47EA-9247-60D74C2ECAA7}" dt="2022-05-08T23:40:07.334" v="2590" actId="20577"/>
+          <ac:graphicFrameMkLst>
+            <pc:docMk/>
+            <pc:sldMk cId="1522177698" sldId="306"/>
+            <ac:graphicFrameMk id="5" creationId="{98F4BDB5-BB58-4AC0-837B-0A3E74266B65}"/>
+          </ac:graphicFrameMkLst>
+        </pc:graphicFrameChg>
+        <pc:graphicFrameChg chg="add del mod modGraphic">
+          <ac:chgData name="Thomas Wilson" userId="c8d2c09c-f776-4d90-9411-3be6cc56095c" providerId="ADAL" clId="{1A0B50A4-C99D-47EA-9247-60D74C2ECAA7}" dt="2022-05-08T23:14:48.187" v="1573" actId="478"/>
+          <ac:graphicFrameMkLst>
+            <pc:docMk/>
+            <pc:sldMk cId="1522177698" sldId="306"/>
+            <ac:graphicFrameMk id="8" creationId="{BA79AD6B-1F50-5262-E005-8577F156886B}"/>
+          </ac:graphicFrameMkLst>
+        </pc:graphicFrameChg>
+        <pc:picChg chg="add mod">
+          <ac:chgData name="Thomas Wilson" userId="c8d2c09c-f776-4d90-9411-3be6cc56095c" providerId="ADAL" clId="{1A0B50A4-C99D-47EA-9247-60D74C2ECAA7}" dt="2022-05-08T23:14:12.299" v="1550" actId="14100"/>
+          <ac:picMkLst>
+            <pc:docMk/>
+            <pc:sldMk cId="1522177698" sldId="306"/>
+            <ac:picMk id="4" creationId="{52C6B0E6-9533-2558-80B0-FECBF0CA473D}"/>
+          </ac:picMkLst>
+        </pc:picChg>
+        <pc:picChg chg="add mod">
+          <ac:chgData name="Thomas Wilson" userId="c8d2c09c-f776-4d90-9411-3be6cc56095c" providerId="ADAL" clId="{1A0B50A4-C99D-47EA-9247-60D74C2ECAA7}" dt="2022-05-08T23:14:14.972" v="1551" actId="14100"/>
+          <ac:picMkLst>
+            <pc:docMk/>
+            <pc:sldMk cId="1522177698" sldId="306"/>
+            <ac:picMk id="7" creationId="{439F4E37-A228-D211-E154-BB9F448B316D}"/>
+          </ac:picMkLst>
+        </pc:picChg>
       </pc:sldChg>
     </pc:docChg>
   </pc:docChgLst>
@@ -2041,15 +2373,15 @@
           <inkml:channelProperty channel="F" name="resolution" value="0" units="1/dev"/>
         </inkml:channelProperties>
       </inkml:inkSource>
-      <inkml:timestamp xml:id="ts0" timeString="2022-04-20T00:17:36.940"/>
+      <inkml:timestamp xml:id="ts0" timeString="2022-04-20T00:17:51.843"/>
     </inkml:context>
     <inkml:brush xml:id="br0">
       <inkml:brushProperty name="width" value="0.05" units="cm"/>
       <inkml:brushProperty name="height" value="0.05" units="cm"/>
-      <inkml:brushProperty name="color" value="#33CCFF"/>
+      <inkml:brushProperty name="color" value="#FFC114"/>
     </inkml:brush>
   </inkml:definitions>
-  <inkml:trace contextRef="#ctx0" brushRef="#br0">1173 85 24575,'-30'2'0,"0"1"0,-49 11 0,-21 3 0,54-10 0,-56 15 0,40-8 0,35-6 0,-1 1 0,2 1 0,-35 18 0,-34 13 0,72-33 0,1 2 0,0 0 0,1 1 0,0 1 0,1 1 0,0 1 0,2 1 0,-1 0 0,-30 35 0,26-23 0,-30 46 0,-16 19 0,59-81 0,1 2 0,1-1 0,1 1 0,-1 0 0,2 1 0,0-1 0,1 1 0,-5 18 0,-1 11 0,-7 66 0,10-6 0,8 162 0,3-104 0,2-11 0,6 0 0,7 0 0,54 214 0,-55-270 0,-12-57 0,14 44 0,29 96 0,-27-92 0,4 0 0,65 145 0,33 38 0,-112-240 0,-1-1 0,10 44 0,10 28 0,-19-68 0,2 0 0,1 0 0,29 44 0,-28-52 0,1 0 0,1-1 0,0-1 0,2-1 0,0 0 0,40 30 0,21 0 0,2-4 0,2-4 0,100 36 0,-96-41 0,-28-14 0,2-3 0,0-2 0,76 11 0,194 13 0,-234-32 0,152 7 0,-241-15 0,1 0 0,0 0 0,-1 1 0,0 1 0,0-1 0,0 1 0,14 9 0,-13-7 0,1 0 0,-1-1 0,1-1 0,0 0 0,15 4 0,132 10 0,-127-16 0,874 33 0,19-35 0,-432-3 0,-231 4 0,714-25 0,-111-68 0,-739 71 0,-79 12 0,0 1 0,1 3 0,88 1 0,-9 28 0,218-16 0,-215-10 0,347-4-392,1375-12-1958,47 13 5017,-1858 4-2632,74-9 0,-55 3-30,234-31-5,141-17-338,679-63-1028,24 55 508,-1106 62 882,483 13 2514,-485-7-2538,-1 1 0,45 15 0,24 7 0,-28-17 0,-1-3 0,74-1 0,137-12 0,-275 4 0,50-1 0,0-3 0,0-2 0,-1-2 0,0-3 0,0-2 0,80-33 0,-103 33 0,0-1 0,-2-1 0,0-1 0,0-1 0,-2-2 0,0-1 0,-2-1 0,0-1 0,-2-1 0,0-1 0,-2 0 0,26-44 0,6-26 0,-5-3 0,43-128 0,48-220 0,-127 406 0,53-220 0,-58 228 0,-2 1 0,-1-1 0,-2 1 0,-1-1 0,-1 0 0,-7-40 0,0 43 0,-19-53 0,16 54 0,1-1 0,-5-30 0,4-19 0,4 0 0,6-145 0,3 105 0,0-679 0,-1 787 0,-2 0 0,0-1 0,0 1 0,0 0 0,-1 0 0,-1 0 0,-4-12 0,5 18 0,0 0 0,0 0 0,0 0 0,0 1 0,-1-1 0,0 1 0,1 0 0,-1 0 0,0 0 0,-1 0 0,1 0 0,0 0 0,-1 1 0,0 0 0,1 0 0,-1 0 0,0 0 0,0 0 0,0 1 0,-6-2 0,-31-3 0,-1 2 0,1 1 0,-1 2 0,-56 7 0,3-2 0,0-1 0,-41 1 0,-164-16 0,13-38 0,175 28 0,-359-98 0,396 94 0,32 10 0,-1 2 0,-1 2 0,-57-8 0,-246-27 0,-106-12 0,-1591-19-2283,1529 121 2189,302-20 1627,157-19-1120,-80-6 1,90 1-397,-1086-57-578,-388-9-288,1027 69 1741,146 1-374,-48-2-793,-1997 109-1270,1754-99 3018,396-13-1126,-2047 2-347,1477 44 0,715-31 0,-1 0 0,-101 0 0,143-10 0,-83 14 0,-40 3 0,19-20-1365,127-1-5461</inkml:trace>
+  <inkml:trace contextRef="#ctx0" brushRef="#br0">0 1 24575,'0'0'-8191</inkml:trace>
 </inkml:ink>
 </file>
 
@@ -2078,174 +2410,6 @@
     </inkml:brush>
   </inkml:definitions>
   <inkml:trace contextRef="#ctx0" brushRef="#br0">1 1 24575,'0'0'-8191</inkml:trace>
-</inkml:ink>
-</file>
-
-<file path=ppt/ink/ink30.xml><?xml version="1.0" encoding="utf-8"?>
-<inkml:ink xmlns:inkml="http://www.w3.org/2003/InkML">
-  <inkml:definitions>
-    <inkml:context xml:id="ctx0">
-      <inkml:inkSource xml:id="inkSrc0">
-        <inkml:traceFormat>
-          <inkml:channel name="X" type="integer" min="-2.14748E9" max="2.14748E9" units="cm"/>
-          <inkml:channel name="Y" type="integer" min="-2.14748E9" max="2.14748E9" units="cm"/>
-          <inkml:channel name="F" type="integer" max="32767" units="dev"/>
-        </inkml:traceFormat>
-        <inkml:channelProperties>
-          <inkml:channelProperty channel="X" name="resolution" value="1000" units="1/cm"/>
-          <inkml:channelProperty channel="Y" name="resolution" value="1000" units="1/cm"/>
-          <inkml:channelProperty channel="F" name="resolution" value="0" units="1/dev"/>
-        </inkml:channelProperties>
-      </inkml:inkSource>
-      <inkml:timestamp xml:id="ts0" timeString="2022-04-20T00:17:44.740"/>
-    </inkml:context>
-    <inkml:brush xml:id="br0">
-      <inkml:brushProperty name="width" value="0.05" units="cm"/>
-      <inkml:brushProperty name="height" value="0.05" units="cm"/>
-      <inkml:brushProperty name="color" value="#33CCFF"/>
-    </inkml:brush>
-  </inkml:definitions>
-  <inkml:trace contextRef="#ctx0" brushRef="#br0">2382 1784 24575,'-259'-20'0,"14"0"0,177 19 0,-408 4 0,457-3 0,1 2 0,0 0 0,-1 2 0,1 0 0,0 0 0,1 2 0,-1 0 0,1 1 0,-19 11 0,25-10 0,-1 0 0,1 0 0,1 1 0,-1 1 0,2-1 0,-1 2 0,1-1 0,1 1 0,0 1 0,0-1 0,2 1 0,-11 24 0,1 2 0,-212 463 0,212-466 0,2 1 0,-14 48 0,-10 30 0,-77 233 0,63-174 0,37-118 0,2 1 0,2 1 0,3 0 0,3 0 0,2 77 0,3-11 0,4 673 0,6-592 0,73 399 0,66 17 0,-137-584 0,84 309 0,-92-315 0,0 0 0,-2 1 0,-1-1 0,-1 1 0,-2-1 0,-9 53 0,-58 175 0,51-199 0,-70 187 0,3-11 0,62-163 0,4 1 0,2 1 0,3 0 0,4 1 0,0 83 0,17 74 0,11 0 0,9-1 0,68 267 0,-67-321 0,2 8 0,60 187 0,-77-319 0,27 66 0,-17-54 0,-12-35 0,2 0 0,1-1 0,1 0 0,1-1 0,1-1 0,2-1 0,35 40 0,-12-24 0,2-2 0,2-1 0,62 39 0,-67-51 0,2-1 0,1-3 0,1-2 0,1-2 0,1-1 0,0-3 0,55 10 0,526 94 0,-455-96 0,176 0 0,175-24 0,-230-2 0,-66-16 0,-53 1 0,156-25 0,-227 25 0,201-9 0,-121 28 0,1626 2 0,-1541-13 0,-221 5 0,-1-2 0,0-2 0,69-23 0,-27 6 0,93-17 0,21-4 0,215-60 0,-103 19 0,-199 61 0,-89 22 0,-2 0 0,1-2 0,-1 0 0,0-2 0,45-22 0,26-30 0,-2-5 0,-4-4 0,-2-3 0,-4-4 0,-3-4 0,125-163 0,-134 144 0,100-187 0,24-119 0,-7-25 0,-32-6 0,-142 381 0,-4-1 0,7-76 0,-12 77 0,0 29 0,0-1 0,20-50 0,-10 32 0,95-274 0,73-245 0,-149 441 0,65-273 0,-94 349 0,-2 0 0,-4-96 0,1-11 0,1 133 0,2 0 0,6-23 0,7-45 0,3-67 0,-8 74 0,1-90 0,-11 3 0,0-235 0,10-237-618,11-316-2019,22-1418 639,-44 2334 2440,0 28-5,0 1 1,0-1-1,-2 1 0,0-1 1,0 1-1,-1 0 1,-1-1-1,0 1 0,-1 0 1,-11-24-1,-47-87-437,36 67 0,-4 0 0,-42-61 0,67 112 0,0 1 0,-1-1 0,1 1 0,-1 0 0,-1 1 0,1 0 0,0 0 0,-1 0 0,0 0 0,0 1 0,0 0 0,0 1 0,-1 0 0,1 0 0,0 0 0,-1 1 0,0 0 0,-9 1 0,-10-1 0,0 2 0,0 1 0,-52 10 0,-116 43 0,-1073 309-990,727-242 758,-466 121 265,936-222 166,0 3-1,2 3 0,2 3 0,0 3 0,-97 65 0,136-73-198,23-20 0,-1 0 0,1 0 0,-1 0 0,0-1 0,0 0 0,0 0 0,-1 0 0,-10 4 0,-5-2 0,0-1 0,-38 4 0,-511 47 0,351-39 0,-513 44-766,532-45 78,-2091 181-3451,-2 104 1332,1953-243 3389,308-53 515,21-2-461,0-1 1,0 0 0,0-1-1,0 0 1,0-1 0,-16-2 0,65-7 1627,-24 9-2491,1 0-1,-1 0 1,0 2-1,1 0 1,19 5-1,-4 1-6598</inkml:trace>
-</inkml:ink>
-</file>
-
-<file path=ppt/ink/ink31.xml><?xml version="1.0" encoding="utf-8"?>
-<inkml:ink xmlns:inkml="http://www.w3.org/2003/InkML">
-  <inkml:definitions>
-    <inkml:context xml:id="ctx0">
-      <inkml:inkSource xml:id="inkSrc0">
-        <inkml:traceFormat>
-          <inkml:channel name="X" type="integer" min="-2.14748E9" max="2.14748E9" units="cm"/>
-          <inkml:channel name="Y" type="integer" min="-2.14748E9" max="2.14748E9" units="cm"/>
-          <inkml:channel name="F" type="integer" max="32767" units="dev"/>
-        </inkml:traceFormat>
-        <inkml:channelProperties>
-          <inkml:channelProperty channel="X" name="resolution" value="1000" units="1/cm"/>
-          <inkml:channelProperty channel="Y" name="resolution" value="1000" units="1/cm"/>
-          <inkml:channelProperty channel="F" name="resolution" value="0" units="1/dev"/>
-        </inkml:channelProperties>
-      </inkml:inkSource>
-      <inkml:timestamp xml:id="ts0" timeString="2022-04-20T00:17:46.940"/>
-    </inkml:context>
-    <inkml:brush xml:id="br0">
-      <inkml:brushProperty name="width" value="0.05" units="cm"/>
-      <inkml:brushProperty name="height" value="0.05" units="cm"/>
-      <inkml:brushProperty name="color" value="#33CCFF"/>
-    </inkml:brush>
-  </inkml:definitions>
-  <inkml:trace contextRef="#ctx0" brushRef="#br0">0 204 24575,'9'-7'0,"-1"0"0,1 0 0,0 1 0,0 0 0,1 0 0,0 1 0,0 0 0,0 1 0,1 0 0,19-4 0,7 1 0,71-4 0,-15 3 0,331-48 0,-362 47 0,86-13 0,232-4 0,-262 27-1365,-84-1-5461</inkml:trace>
-</inkml:ink>
-</file>
-
-<file path=ppt/ink/ink32.xml><?xml version="1.0" encoding="utf-8"?>
-<inkml:ink xmlns:inkml="http://www.w3.org/2003/InkML">
-  <inkml:definitions>
-    <inkml:context xml:id="ctx0">
-      <inkml:inkSource xml:id="inkSrc0">
-        <inkml:traceFormat>
-          <inkml:channel name="X" type="integer" min="-2.14748E9" max="2.14748E9" units="cm"/>
-          <inkml:channel name="Y" type="integer" min="-2.14748E9" max="2.14748E9" units="cm"/>
-          <inkml:channel name="F" type="integer" max="32767" units="dev"/>
-        </inkml:traceFormat>
-        <inkml:channelProperties>
-          <inkml:channelProperty channel="X" name="resolution" value="1000" units="1/cm"/>
-          <inkml:channelProperty channel="Y" name="resolution" value="1000" units="1/cm"/>
-          <inkml:channelProperty channel="F" name="resolution" value="0" units="1/dev"/>
-        </inkml:channelProperties>
-      </inkml:inkSource>
-      <inkml:timestamp xml:id="ts0" timeString="2022-04-20T00:17:51.843"/>
-    </inkml:context>
-    <inkml:brush xml:id="br0">
-      <inkml:brushProperty name="width" value="0.05" units="cm"/>
-      <inkml:brushProperty name="height" value="0.05" units="cm"/>
-      <inkml:brushProperty name="color" value="#FFC114"/>
-    </inkml:brush>
-  </inkml:definitions>
-  <inkml:trace contextRef="#ctx0" brushRef="#br0">0 1 24575,'0'0'-8191</inkml:trace>
-</inkml:ink>
-</file>
-
-<file path=ppt/ink/ink33.xml><?xml version="1.0" encoding="utf-8"?>
-<inkml:ink xmlns:inkml="http://www.w3.org/2003/InkML">
-  <inkml:definitions>
-    <inkml:context xml:id="ctx0">
-      <inkml:inkSource xml:id="inkSrc0">
-        <inkml:traceFormat>
-          <inkml:channel name="X" type="integer" min="-2.14748E9" max="2.14748E9" units="cm"/>
-          <inkml:channel name="Y" type="integer" min="-2.14748E9" max="2.14748E9" units="cm"/>
-          <inkml:channel name="F" type="integer" max="32767" units="dev"/>
-        </inkml:traceFormat>
-        <inkml:channelProperties>
-          <inkml:channelProperty channel="X" name="resolution" value="1000" units="1/cm"/>
-          <inkml:channelProperty channel="Y" name="resolution" value="1000" units="1/cm"/>
-          <inkml:channelProperty channel="F" name="resolution" value="0" units="1/dev"/>
-        </inkml:channelProperties>
-      </inkml:inkSource>
-      <inkml:timestamp xml:id="ts0" timeString="2022-04-20T00:17:58.235"/>
-    </inkml:context>
-    <inkml:brush xml:id="br0">
-      <inkml:brushProperty name="width" value="0.05" units="cm"/>
-      <inkml:brushProperty name="height" value="0.05" units="cm"/>
-      <inkml:brushProperty name="color" value="#FFC114"/>
-    </inkml:brush>
-  </inkml:definitions>
-  <inkml:trace contextRef="#ctx0" brushRef="#br0">1011 324 24575,'-142'-3'0,"44"0"0,-157 16 0,227-9 0,0 2 0,0 0 0,1 2 0,0 2 0,1 0 0,-1 1 0,2 2 0,0 1 0,1 0 0,0 2 0,1 1 0,1 1 0,0 1 0,2 0 0,0 2 0,-28 39 0,39-46 0,2 1 0,0 0 0,0 0 0,1 1 0,1-1 0,-4 23 0,2 2 0,-3 58 0,5-9 0,10 116 0,0-153 0,3-1 0,1 0 0,27 83 0,-26-104 0,12 39 0,4-2 0,2 0 0,42 72 0,-33-74 0,-19-32 0,30 40 0,-39-61 0,0-1 0,1 0 0,1-1 0,-1 0 0,2-1 0,-1 0 0,14 7 0,28 13 0,65 26 0,670 259-141,-457-186-378,797 274 387,-1090-393 231,0-1 1,0-2-1,1-2 0,-1-2 1,1-1-1,44-5 1,14 2-4,150 0-96,541 2-411,464-4-390,-590-31 1003,-501 15 867,-74 8-1098,133-2-1,316 17 30,-55 11-377,502 34-1539,506 15 1329,-1473-63 499,384-6 3056,-386 4-2968,0 0 0,0-1 0,0-1 0,0-1 0,-1 0 0,0 0 0,0-2 0,0 1 0,0-2 0,-1 0 0,-1 0 0,1-1 0,-1 0 0,-1-1 0,0 0 0,10-14 0,15-21 0,-2-1 0,47-91 0,-52 87 0,420-876 0,-434 892 0,-2-1 0,11-49 0,-20 70 0,-1 0 0,-1 0 0,0 0 0,-1 0 0,0 0 0,-1 0 0,-1 0 0,0 1 0,-6-19 0,-13-29 0,-48-93 0,11 28 0,43 88 0,-2 0 0,-1 1 0,-2 1 0,-2 1 0,-1 1 0,-2 1 0,-1 1 0,-2 1 0,0 2 0,-2 1 0,-46-33 0,-100-44 0,56 38 0,32 17 0,-176-71 0,-102-7 0,345 121 0,-280-81 0,86 28 0,194 53 0,-1 1 0,-37-4 0,52 9 0,0 1 0,0 0 0,-1 0 0,1 1 0,0 0 0,-1 0 0,1 0 0,0 1 0,0 0 0,0 1 0,1 0 0,-9 4 0,-50 35 0,46-28 0,-1-1 0,0-1 0,-37 16 0,8-11 0,0-3 0,-1-1 0,0-3 0,-68 6 0,-216-3 0,-25 3 0,-299 71 0,636-83 0,1-2 0,-1-1 0,0 0 0,0-2 0,0 0 0,0-2 0,-37-9 0,-49-17 0,-2 3 0,0 6 0,-184-10 0,-402 26 0,353 7 0,0 14 0,119-2 0,-416 43 0,167-23 0,-2-36 0,180-1 0,-1712 2 0,1993 0 0,1-1 0,0 0 0,-1-1 0,1 0 0,0-1 0,0-1 0,0 0 0,0 0 0,1-1 0,0-1 0,0 0 0,0-1 0,-12-9 0,10 4 0,-2 1 0,0 0 0,0 1 0,0 1 0,-1 0 0,-1 1 0,1 1 0,-1 1 0,-1 0 0,1 1 0,-1 1 0,-29-2 0,-30 6-1365,43 0-5461</inkml:trace>
-</inkml:ink>
-</file>
-
-<file path=ppt/ink/ink34.xml><?xml version="1.0" encoding="utf-8"?>
-<inkml:ink xmlns:inkml="http://www.w3.org/2003/InkML">
-  <inkml:definitions>
-    <inkml:context xml:id="ctx0">
-      <inkml:inkSource xml:id="inkSrc0">
-        <inkml:traceFormat>
-          <inkml:channel name="X" type="integer" min="-2.14748E9" max="2.14748E9" units="cm"/>
-          <inkml:channel name="Y" type="integer" min="-2.14748E9" max="2.14748E9" units="cm"/>
-          <inkml:channel name="F" type="integer" max="32767" units="dev"/>
-        </inkml:traceFormat>
-        <inkml:channelProperties>
-          <inkml:channelProperty channel="X" name="resolution" value="1000" units="1/cm"/>
-          <inkml:channelProperty channel="Y" name="resolution" value="1000" units="1/cm"/>
-          <inkml:channelProperty channel="F" name="resolution" value="0" units="1/dev"/>
-        </inkml:channelProperties>
-      </inkml:inkSource>
-      <inkml:timestamp xml:id="ts0" timeString="2022-04-20T00:18:05.519"/>
-    </inkml:context>
-    <inkml:brush xml:id="br0">
-      <inkml:brushProperty name="width" value="0.05" units="cm"/>
-      <inkml:brushProperty name="height" value="0.05" units="cm"/>
-      <inkml:brushProperty name="color" value="#FFC114"/>
-    </inkml:brush>
-  </inkml:definitions>
-  <inkml:trace contextRef="#ctx0" brushRef="#br0">1902 482 24575,'-488'0'0,"466"2"0,0 1 0,0 1 0,0 1 0,0 1 0,1 1 0,0 1 0,0 0 0,1 2 0,-24 14 0,7-4 0,-51 18 0,30-16 0,37-13 0,-1 0 0,-1-2 0,1 0 0,-35 4 0,1-4 0,-1 2 0,1 3 0,1 2 0,-78 31 0,2 24 0,100-57 0,1 1 0,0 2 0,1 1 0,0 1 0,1 1 0,-29 26 0,46-33 0,-1 0 0,2 0 0,-1 1 0,2 1 0,0-1 0,0 2 0,1-1 0,1 1 0,0 0 0,1 1 0,0-1 0,1 1 0,1 0 0,1 1 0,-3 18 0,3 30 0,5 92 0,2-51 0,-1-57 0,3-1 0,1 1 0,22 71 0,6 30 0,-18-65 0,-8-48 0,-2 1 0,2 42 0,-7-59 0,1 0 0,1 0 0,1 0 0,1 0 0,15 35 0,2 6 0,-17-39 0,-1 0 0,-1 1 0,-1-1 0,0 45 0,3 37 0,181 1695 0,-185-1778 0,-2-10 0,1-1 0,0 0 0,1 1 0,0-1 0,0 0 0,6 14 0,-7-22 0,0-1 0,0 1 0,1 0 0,-1 0 0,1-1 0,-1 1 0,1 0 0,-1-1 0,1 0 0,0 1 0,0-1 0,0 0 0,-1 0 0,1 0 0,0 0 0,1 0 0,-1-1 0,0 1 0,0 0 0,0-1 0,0 0 0,0 1 0,1-1 0,-1 0 0,0 0 0,0 0 0,0-1 0,1 1 0,-1 0 0,0-1 0,0 0 0,0 1 0,0-1 0,0 0 0,3-1 0,11-5 0,-1 0 0,26-15 0,12-7 0,648-268-68,-601 259-14,1027-325-670,-1011 338 977,0 6 1,2 4 0,228 3-1,-307 12-225,323-2 0,-266-3 0,167-32 0,51-26 0,-217 43 0,1 4 0,147-4 0,-182 17 0,-1-3 0,101-24 0,66-7 0,-52 18 0,267-62 0,-357 58 0,-49 11 0,1 3 0,72-9 0,-9 10 0,181-39 0,-230 36 0,1 3 0,1 2 0,92 1 0,-102 2 0,0-1 0,81-19 0,2 0 0,502-66 0,-554 78 0,-36 7 0,-1-3 0,1-1 0,-1-1 0,50-21 0,388-181 0,-438 191 0,-2-1 0,0-1 0,54-45 0,-8 6 0,-51 36 0,0-1 0,-2-1 0,0-2 0,44-56 0,84-143 0,-135 189 0,29-71 0,-34 69 0,42-71 0,-47 86 0,0-1 0,-2 0 0,-1-1 0,-1 0 0,-2 0 0,0-1 0,4-54 0,-8 51 0,-1 0 0,-2 0 0,-1-1 0,-1 1 0,-2 0 0,-1 0 0,-16-52 0,-4 12 0,-3 1 0,-40-73 0,39 86 0,-6-14 0,-68-103 0,88 153 0,-1 1 0,-1 1 0,-1 1 0,0 0 0,-2 1 0,0 1 0,-1 1 0,-41-23 0,-74-26 0,-279-92 0,277 117 0,0 6 0,-2 6 0,-166-11 0,58 16 0,-370-47 0,402 24 0,-46-7 0,238 51 0,-1 1 0,1 1 0,0 1 0,-38 6 0,-95 28 0,104-22 0,-517 78 0,290-69 0,-145 21 0,310-28 0,-1-5 0,-124-6 0,192-2 0,-96 17 0,45-4 0,81-13 0,-381 41 0,230-27 0,-167 8 0,203-27 0,-120 5 0,195 7 0,0 2 0,-71 23 0,56-14 0,15-2 0,37-11 0,0-1 0,0 0 0,-25 2 0,11-2 0,-1 1 0,-60 20 0,58-14 0,-74 13 0,-26 5-1365,111-25-5461</inkml:trace>
-</inkml:ink>
-</file>
-
-<file path=ppt/ink/ink35.xml><?xml version="1.0" encoding="utf-8"?>
-<inkml:ink xmlns:inkml="http://www.w3.org/2003/InkML">
-  <inkml:definitions>
-    <inkml:context xml:id="ctx0">
-      <inkml:inkSource xml:id="inkSrc0">
-        <inkml:traceFormat>
-          <inkml:channel name="X" type="integer" min="-2.14748E9" max="2.14748E9" units="cm"/>
-          <inkml:channel name="Y" type="integer" min="-2.14748E9" max="2.14748E9" units="cm"/>
-          <inkml:channel name="F" type="integer" max="32767" units="dev"/>
-        </inkml:traceFormat>
-        <inkml:channelProperties>
-          <inkml:channelProperty channel="X" name="resolution" value="1000" units="1/cm"/>
-          <inkml:channelProperty channel="Y" name="resolution" value="1000" units="1/cm"/>
-          <inkml:channelProperty channel="F" name="resolution" value="0" units="1/dev"/>
-        </inkml:channelProperties>
-      </inkml:inkSource>
-      <inkml:timestamp xml:id="ts0" timeString="2022-04-20T00:18:08.373"/>
-    </inkml:context>
-    <inkml:brush xml:id="br0">
-      <inkml:brushProperty name="width" value="0.05" units="cm"/>
-      <inkml:brushProperty name="height" value="0.05" units="cm"/>
-      <inkml:brushProperty name="color" value="#FFC114"/>
-    </inkml:brush>
-  </inkml:definitions>
-  <inkml:trace contextRef="#ctx0" brushRef="#br0">1 0 24575,'44'5'0,"-20"1"0,383 87 0,-20-9-398,1594 366-1241,-642-29 3676,-1290-403-2037,30 11 0,116 59 0,-174-78 0,0 0 0,1-1 0,0-2 0,1 0 0,26 4 0,120 10 0,-31-5 0,357 76 0,-89 3 0,-123-25 0,169 7 0,-391-68 0,108 11 0,-96-13 0,0 2 0,132 36 0,-40-1 0,180 25 0,62 14 0,-257-51 25,-90-20-489,0 1 1,72 28 0,-88-22-6363</inkml:trace>
 </inkml:ink>
 </file>
 
@@ -2499,7 +2663,7 @@
           <a:p>
             <a:fld id="{F37D28C0-BEB6-42B0-A203-EEE1023219C4}" type="datetimeFigureOut">
               <a:rPr lang="en-NZ" smtClean="0"/>
-              <a:t>3/05/2022</a:t>
+              <a:t>9/05/2022</a:t>
             </a:fld>
             <a:endParaRPr lang="en-NZ"/>
           </a:p>
@@ -2855,6 +3019,108 @@
 </file>
 
 <file path=ppt/notesSlides/notesSlide10.xml><?xml version="1.0" encoding="utf-8"?>
+<p:notes xmlns:a="http://schemas.openxmlformats.org/drawingml/2006/main" xmlns:r="http://schemas.openxmlformats.org/officeDocument/2006/relationships" xmlns:p="http://schemas.openxmlformats.org/presentationml/2006/main">
+  <p:cSld>
+    <p:spTree>
+      <p:nvGrpSpPr>
+        <p:cNvPr id="1" name=""/>
+        <p:cNvGrpSpPr/>
+        <p:nvPr/>
+      </p:nvGrpSpPr>
+      <p:grpSpPr>
+        <a:xfrm>
+          <a:off x="0" y="0"/>
+          <a:ext cx="0" cy="0"/>
+          <a:chOff x="0" y="0"/>
+          <a:chExt cx="0" cy="0"/>
+        </a:xfrm>
+      </p:grpSpPr>
+      <p:sp>
+        <p:nvSpPr>
+          <p:cNvPr id="2" name="Slide Image Placeholder 1"/>
+          <p:cNvSpPr>
+            <a:spLocks noGrp="1" noRot="1" noChangeAspect="1"/>
+          </p:cNvSpPr>
+          <p:nvPr>
+            <p:ph type="sldImg"/>
+          </p:nvPr>
+        </p:nvSpPr>
+        <p:spPr/>
+      </p:sp>
+      <p:sp>
+        <p:nvSpPr>
+          <p:cNvPr id="3" name="Notes Placeholder 2"/>
+          <p:cNvSpPr>
+            <a:spLocks noGrp="1"/>
+          </p:cNvSpPr>
+          <p:nvPr>
+            <p:ph type="body" idx="1"/>
+          </p:nvPr>
+        </p:nvSpPr>
+        <p:spPr/>
+        <p:txBody>
+          <a:bodyPr/>
+          <a:lstStyle/>
+          <a:p>
+            <a:r>
+              <a:rPr lang="en-NZ" i="1" dirty="0"/>
+              <a:t>NOTE: Trialling needs to happen for </a:t>
+            </a:r>
+            <a:r>
+              <a:rPr lang="en-NZ" b="1" i="1" dirty="0"/>
+              <a:t>at least 2 </a:t>
+            </a:r>
+            <a:r>
+              <a:rPr lang="en-NZ" i="1" dirty="0"/>
+              <a:t>of your components but is not necessary for ALL components.</a:t>
+            </a:r>
+          </a:p>
+          <a:p>
+            <a:r>
+              <a:rPr lang="en" i="1" dirty="0"/>
+              <a:t>Trialling is not the same as testing. Trialling is about finding different ways of building the same component. Show evidence of  your trialling  here. Select one of your trials for further development and give reasons for your choice. </a:t>
+            </a:r>
+            <a:endParaRPr lang="en-NZ" dirty="0"/>
+          </a:p>
+        </p:txBody>
+      </p:sp>
+      <p:sp>
+        <p:nvSpPr>
+          <p:cNvPr id="4" name="Slide Number Placeholder 3"/>
+          <p:cNvSpPr>
+            <a:spLocks noGrp="1"/>
+          </p:cNvSpPr>
+          <p:nvPr>
+            <p:ph type="sldNum" sz="quarter" idx="5"/>
+          </p:nvPr>
+        </p:nvSpPr>
+        <p:spPr/>
+        <p:txBody>
+          <a:bodyPr/>
+          <a:lstStyle/>
+          <a:p>
+            <a:fld id="{D89B2B17-F4B1-4A14-AF99-5A366D45E74A}" type="slidenum">
+              <a:rPr lang="en-NZ" smtClean="0"/>
+              <a:t>14</a:t>
+            </a:fld>
+            <a:endParaRPr lang="en-NZ"/>
+          </a:p>
+        </p:txBody>
+      </p:sp>
+    </p:spTree>
+    <p:extLst>
+      <p:ext uri="{BB962C8B-B14F-4D97-AF65-F5344CB8AC3E}">
+        <p14:creationId xmlns:p14="http://schemas.microsoft.com/office/powerpoint/2010/main" val="1740307943"/>
+      </p:ext>
+    </p:extLst>
+  </p:cSld>
+  <p:clrMapOvr>
+    <a:masterClrMapping/>
+  </p:clrMapOvr>
+</p:notes>
+</file>
+
+<file path=ppt/notesSlides/notesSlide11.xml><?xml version="1.0" encoding="utf-8"?>
 <p:notes xmlns:a="http://schemas.openxmlformats.org/drawingml/2006/main" xmlns:r="http://schemas.openxmlformats.org/officeDocument/2006/relationships" xmlns:p="http://schemas.openxmlformats.org/presentationml/2006/main" showMasterSp="0" showMasterPhAnim="0">
   <p:cSld>
     <p:spTree>
@@ -2986,7 +3252,7 @@
 </p:notes>
 </file>
 
-<file path=ppt/notesSlides/notesSlide11.xml><?xml version="1.0" encoding="utf-8"?>
+<file path=ppt/notesSlides/notesSlide12.xml><?xml version="1.0" encoding="utf-8"?>
 <p:notes xmlns:a="http://schemas.openxmlformats.org/drawingml/2006/main" xmlns:r="http://schemas.openxmlformats.org/officeDocument/2006/relationships" xmlns:p="http://schemas.openxmlformats.org/presentationml/2006/main">
   <p:cSld>
     <p:spTree>
@@ -3066,7 +3332,7 @@
           <a:p>
             <a:fld id="{D89B2B17-F4B1-4A14-AF99-5A366D45E74A}" type="slidenum">
               <a:rPr lang="en-NZ" smtClean="0"/>
-              <a:t>15</a:t>
+              <a:t>16</a:t>
             </a:fld>
             <a:endParaRPr lang="en-NZ"/>
           </a:p>
@@ -3076,138 +3342,6 @@
     <p:extLst>
       <p:ext uri="{BB962C8B-B14F-4D97-AF65-F5344CB8AC3E}">
         <p14:creationId xmlns:p14="http://schemas.microsoft.com/office/powerpoint/2010/main" val="3123894398"/>
-      </p:ext>
-    </p:extLst>
-  </p:cSld>
-  <p:clrMapOvr>
-    <a:masterClrMapping/>
-  </p:clrMapOvr>
-</p:notes>
-</file>
-
-<file path=ppt/notesSlides/notesSlide12.xml><?xml version="1.0" encoding="utf-8"?>
-<p:notes xmlns:a="http://schemas.openxmlformats.org/drawingml/2006/main" xmlns:r="http://schemas.openxmlformats.org/officeDocument/2006/relationships" xmlns:p="http://schemas.openxmlformats.org/presentationml/2006/main" showMasterSp="0" showMasterPhAnim="0">
-  <p:cSld>
-    <p:spTree>
-      <p:nvGrpSpPr>
-        <p:cNvPr id="1" name="Shape 87"/>
-        <p:cNvGrpSpPr/>
-        <p:nvPr/>
-      </p:nvGrpSpPr>
-      <p:grpSpPr>
-        <a:xfrm>
-          <a:off x="0" y="0"/>
-          <a:ext cx="0" cy="0"/>
-          <a:chOff x="0" y="0"/>
-          <a:chExt cx="0" cy="0"/>
-        </a:xfrm>
-      </p:grpSpPr>
-      <p:sp>
-        <p:nvSpPr>
-          <p:cNvPr id="88" name="Google Shape;88;g5f5670a123_0_30:notes"/>
-          <p:cNvSpPr>
-            <a:spLocks noGrp="1" noRot="1" noChangeAspect="1"/>
-          </p:cNvSpPr>
-          <p:nvPr>
-            <p:ph type="sldImg" idx="2"/>
-          </p:nvPr>
-        </p:nvSpPr>
-        <p:spPr>
-          <a:xfrm>
-            <a:off x="381000" y="685800"/>
-            <a:ext cx="6096000" cy="3429000"/>
-          </a:xfrm>
-          <a:custGeom>
-            <a:avLst/>
-            <a:gdLst/>
-            <a:ahLst/>
-            <a:cxnLst/>
-            <a:rect l="l" t="t" r="r" b="b"/>
-            <a:pathLst>
-              <a:path w="120000" h="120000" extrusionOk="0">
-                <a:moveTo>
-                  <a:pt x="0" y="0"/>
-                </a:moveTo>
-                <a:lnTo>
-                  <a:pt x="120000" y="0"/>
-                </a:lnTo>
-                <a:lnTo>
-                  <a:pt x="120000" y="120000"/>
-                </a:lnTo>
-                <a:lnTo>
-                  <a:pt x="0" y="120000"/>
-                </a:lnTo>
-                <a:close/>
-              </a:path>
-            </a:pathLst>
-          </a:custGeom>
-        </p:spPr>
-      </p:sp>
-      <p:sp>
-        <p:nvSpPr>
-          <p:cNvPr id="89" name="Google Shape;89;g5f5670a123_0_30:notes"/>
-          <p:cNvSpPr txBox="1">
-            <a:spLocks noGrp="1"/>
-          </p:cNvSpPr>
-          <p:nvPr>
-            <p:ph type="body" idx="1"/>
-          </p:nvPr>
-        </p:nvSpPr>
-        <p:spPr>
-          <a:xfrm>
-            <a:off x="685800" y="4343400"/>
-            <a:ext cx="5486400" cy="4114800"/>
-          </a:xfrm>
-          <a:prstGeom prst="rect">
-            <a:avLst/>
-          </a:prstGeom>
-        </p:spPr>
-        <p:txBody>
-          <a:bodyPr spcFirstLastPara="1" wrap="square" lIns="91425" tIns="91425" rIns="91425" bIns="91425" anchor="t" anchorCtr="0">
-            <a:noAutofit/>
-          </a:bodyPr>
-          <a:lstStyle/>
-          <a:p>
-            <a:pPr marL="0" marR="0" lvl="0" indent="0" algn="l" defTabSz="914400" rtl="0" eaLnBrk="1" fontAlgn="auto" latinLnBrk="0" hangingPunct="1">
-              <a:lnSpc>
-                <a:spcPct val="100000"/>
-              </a:lnSpc>
-              <a:spcBef>
-                <a:spcPts val="0"/>
-              </a:spcBef>
-              <a:spcAft>
-                <a:spcPts val="0"/>
-              </a:spcAft>
-              <a:buClrTx/>
-              <a:buSzTx/>
-              <a:buFontTx/>
-              <a:buNone/>
-              <a:tabLst/>
-              <a:defRPr/>
-            </a:pPr>
-            <a:r>
-              <a:rPr lang="en-NZ" dirty="0"/>
-              <a:t>Additional rows can be added by clicking in the last cell and then using the Tab key </a:t>
-            </a:r>
-          </a:p>
-          <a:p>
-            <a:pPr marL="0" lvl="0" indent="0" algn="l" rtl="0">
-              <a:spcBef>
-                <a:spcPts val="0"/>
-              </a:spcBef>
-              <a:spcAft>
-                <a:spcPts val="0"/>
-              </a:spcAft>
-              <a:buNone/>
-            </a:pPr>
-            <a:endParaRPr dirty="0"/>
-          </a:p>
-        </p:txBody>
-      </p:sp>
-    </p:spTree>
-    <p:extLst>
-      <p:ext uri="{BB962C8B-B14F-4D97-AF65-F5344CB8AC3E}">
-        <p14:creationId xmlns:p14="http://schemas.microsoft.com/office/powerpoint/2010/main" val="3626996055"/>
       </p:ext>
     </p:extLst>
   </p:cSld>
@@ -3339,7 +3473,7 @@
     </p:spTree>
     <p:extLst>
       <p:ext uri="{BB962C8B-B14F-4D97-AF65-F5344CB8AC3E}">
-        <p14:creationId xmlns:p14="http://schemas.microsoft.com/office/powerpoint/2010/main" val="1589944675"/>
+        <p14:creationId xmlns:p14="http://schemas.microsoft.com/office/powerpoint/2010/main" val="3626996055"/>
       </p:ext>
     </p:extLst>
   </p:cSld>
@@ -3350,11 +3484,11 @@
 </file>
 
 <file path=ppt/notesSlides/notesSlide14.xml><?xml version="1.0" encoding="utf-8"?>
-<p:notes xmlns:a="http://schemas.openxmlformats.org/drawingml/2006/main" xmlns:r="http://schemas.openxmlformats.org/officeDocument/2006/relationships" xmlns:p="http://schemas.openxmlformats.org/presentationml/2006/main">
+<p:notes xmlns:a="http://schemas.openxmlformats.org/drawingml/2006/main" xmlns:r="http://schemas.openxmlformats.org/officeDocument/2006/relationships" xmlns:p="http://schemas.openxmlformats.org/presentationml/2006/main" showMasterSp="0" showMasterPhAnim="0">
   <p:cSld>
     <p:spTree>
       <p:nvGrpSpPr>
-        <p:cNvPr id="1" name=""/>
+        <p:cNvPr id="1" name="Shape 87"/>
         <p:cNvGrpSpPr/>
         <p:nvPr/>
       </p:nvGrpSpPr>
@@ -3368,80 +3502,110 @@
       </p:grpSpPr>
       <p:sp>
         <p:nvSpPr>
-          <p:cNvPr id="2" name="Slide Image Placeholder 1"/>
+          <p:cNvPr id="88" name="Google Shape;88;g5f5670a123_0_30:notes"/>
           <p:cNvSpPr>
             <a:spLocks noGrp="1" noRot="1" noChangeAspect="1"/>
           </p:cNvSpPr>
           <p:nvPr>
-            <p:ph type="sldImg"/>
+            <p:ph type="sldImg" idx="2"/>
           </p:nvPr>
         </p:nvSpPr>
-        <p:spPr/>
+        <p:spPr>
+          <a:xfrm>
+            <a:off x="381000" y="685800"/>
+            <a:ext cx="6096000" cy="3429000"/>
+          </a:xfrm>
+          <a:custGeom>
+            <a:avLst/>
+            <a:gdLst/>
+            <a:ahLst/>
+            <a:cxnLst/>
+            <a:rect l="l" t="t" r="r" b="b"/>
+            <a:pathLst>
+              <a:path w="120000" h="120000" extrusionOk="0">
+                <a:moveTo>
+                  <a:pt x="0" y="0"/>
+                </a:moveTo>
+                <a:lnTo>
+                  <a:pt x="120000" y="0"/>
+                </a:lnTo>
+                <a:lnTo>
+                  <a:pt x="120000" y="120000"/>
+                </a:lnTo>
+                <a:lnTo>
+                  <a:pt x="0" y="120000"/>
+                </a:lnTo>
+                <a:close/>
+              </a:path>
+            </a:pathLst>
+          </a:custGeom>
+        </p:spPr>
       </p:sp>
       <p:sp>
         <p:nvSpPr>
-          <p:cNvPr id="3" name="Notes Placeholder 2"/>
-          <p:cNvSpPr>
+          <p:cNvPr id="89" name="Google Shape;89;g5f5670a123_0_30:notes"/>
+          <p:cNvSpPr txBox="1">
             <a:spLocks noGrp="1"/>
           </p:cNvSpPr>
           <p:nvPr>
             <p:ph type="body" idx="1"/>
           </p:nvPr>
         </p:nvSpPr>
-        <p:spPr/>
+        <p:spPr>
+          <a:xfrm>
+            <a:off x="685800" y="4343400"/>
+            <a:ext cx="5486400" cy="4114800"/>
+          </a:xfrm>
+          <a:prstGeom prst="rect">
+            <a:avLst/>
+          </a:prstGeom>
+        </p:spPr>
         <p:txBody>
-          <a:bodyPr/>
+          <a:bodyPr spcFirstLastPara="1" wrap="square" lIns="91425" tIns="91425" rIns="91425" bIns="91425" anchor="t" anchorCtr="0">
+            <a:noAutofit/>
+          </a:bodyPr>
           <a:lstStyle/>
           <a:p>
+            <a:pPr marL="0" marR="0" lvl="0" indent="0" algn="l" defTabSz="914400" rtl="0" eaLnBrk="1" fontAlgn="auto" latinLnBrk="0" hangingPunct="1">
+              <a:lnSpc>
+                <a:spcPct val="100000"/>
+              </a:lnSpc>
+              <a:spcBef>
+                <a:spcPts val="0"/>
+              </a:spcBef>
+              <a:spcAft>
+                <a:spcPts val="0"/>
+              </a:spcAft>
+              <a:buClrTx/>
+              <a:buSzTx/>
+              <a:buFontTx/>
+              <a:buNone/>
+              <a:tabLst/>
+              <a:defRPr/>
+            </a:pPr>
             <a:r>
-              <a:rPr lang="en-NZ" i="1" dirty="0"/>
-              <a:t>NOTE: Trialling needs to happen for </a:t>
+              <a:rPr lang="en-NZ" dirty="0"/>
+              <a:t>Additional rows can be added by clicking in the last cell and then using the Tab key </a:t>
             </a:r>
-            <a:r>
-              <a:rPr lang="en-NZ" b="1" i="1" dirty="0"/>
-              <a:t>at least 2 </a:t>
-            </a:r>
-            <a:r>
-              <a:rPr lang="en-NZ" i="1" dirty="0"/>
-              <a:t>of your components but is not necessary for ALL components.</a:t>
-            </a:r>
-          </a:p>
-          <a:p>
-            <a:r>
-              <a:rPr lang="en" i="1" dirty="0"/>
-              <a:t>Trialling is not the same as testing. Trialling is about finding different ways of building the same component. Show evidence of  your trialling  here. Select one of your trials for further development and give reasons for your choice. </a:t>
-            </a:r>
-            <a:endParaRPr lang="en-NZ" dirty="0"/>
-          </a:p>
-        </p:txBody>
-      </p:sp>
-      <p:sp>
-        <p:nvSpPr>
-          <p:cNvPr id="4" name="Slide Number Placeholder 3"/>
-          <p:cNvSpPr>
-            <a:spLocks noGrp="1"/>
-          </p:cNvSpPr>
-          <p:nvPr>
-            <p:ph type="sldNum" sz="quarter" idx="5"/>
-          </p:nvPr>
-        </p:nvSpPr>
-        <p:spPr/>
-        <p:txBody>
-          <a:bodyPr/>
-          <a:lstStyle/>
-          <a:p>
-            <a:fld id="{D89B2B17-F4B1-4A14-AF99-5A366D45E74A}" type="slidenum">
-              <a:rPr lang="en-NZ" smtClean="0"/>
-              <a:t>18</a:t>
-            </a:fld>
-            <a:endParaRPr lang="en-NZ"/>
+          </a:p>
+          <a:p>
+            <a:pPr marL="0" lvl="0" indent="0" algn="l" rtl="0">
+              <a:spcBef>
+                <a:spcPts val="0"/>
+              </a:spcBef>
+              <a:spcAft>
+                <a:spcPts val="0"/>
+              </a:spcAft>
+              <a:buNone/>
+            </a:pPr>
+            <a:endParaRPr dirty="0"/>
           </a:p>
         </p:txBody>
       </p:sp>
     </p:spTree>
     <p:extLst>
       <p:ext uri="{BB962C8B-B14F-4D97-AF65-F5344CB8AC3E}">
-        <p14:creationId xmlns:p14="http://schemas.microsoft.com/office/powerpoint/2010/main" val="1629437123"/>
+        <p14:creationId xmlns:p14="http://schemas.microsoft.com/office/powerpoint/2010/main" val="1589944675"/>
       </p:ext>
     </p:extLst>
   </p:cSld>
@@ -6536,7 +6700,7 @@
     </p:spTree>
     <p:extLst>
       <p:ext uri="{BB962C8B-B14F-4D97-AF65-F5344CB8AC3E}">
-        <p14:creationId xmlns:p14="http://schemas.microsoft.com/office/powerpoint/2010/main" val="1740307943"/>
+        <p14:creationId xmlns:p14="http://schemas.microsoft.com/office/powerpoint/2010/main" val="3016366126"/>
       </p:ext>
     </p:extLst>
   </p:cSld>
@@ -6695,7 +6859,7 @@
           <a:p>
             <a:fld id="{9C4A4F43-1C06-40E6-8F87-8B286982E50E}" type="datetimeFigureOut">
               <a:rPr lang="en-NZ" smtClean="0"/>
-              <a:t>3/05/2022</a:t>
+              <a:t>9/05/2022</a:t>
             </a:fld>
             <a:endParaRPr lang="en-NZ" dirty="0"/>
           </a:p>
@@ -6895,7 +7059,7 @@
           <a:p>
             <a:fld id="{9C4A4F43-1C06-40E6-8F87-8B286982E50E}" type="datetimeFigureOut">
               <a:rPr lang="en-NZ" smtClean="0"/>
-              <a:t>3/05/2022</a:t>
+              <a:t>9/05/2022</a:t>
             </a:fld>
             <a:endParaRPr lang="en-NZ" dirty="0"/>
           </a:p>
@@ -7105,7 +7269,7 @@
           <a:p>
             <a:fld id="{9C4A4F43-1C06-40E6-8F87-8B286982E50E}" type="datetimeFigureOut">
               <a:rPr lang="en-NZ" smtClean="0"/>
-              <a:t>3/05/2022</a:t>
+              <a:t>9/05/2022</a:t>
             </a:fld>
             <a:endParaRPr lang="en-NZ" dirty="0"/>
           </a:p>
@@ -7664,7 +7828,7 @@
           <a:p>
             <a:fld id="{9C4A4F43-1C06-40E6-8F87-8B286982E50E}" type="datetimeFigureOut">
               <a:rPr lang="en-NZ" smtClean="0"/>
-              <a:t>3/05/2022</a:t>
+              <a:t>9/05/2022</a:t>
             </a:fld>
             <a:endParaRPr lang="en-NZ" dirty="0"/>
           </a:p>
@@ -7940,7 +8104,7 @@
           <a:p>
             <a:fld id="{9C4A4F43-1C06-40E6-8F87-8B286982E50E}" type="datetimeFigureOut">
               <a:rPr lang="en-NZ" smtClean="0"/>
-              <a:t>3/05/2022</a:t>
+              <a:t>9/05/2022</a:t>
             </a:fld>
             <a:endParaRPr lang="en-NZ" dirty="0"/>
           </a:p>
@@ -8208,7 +8372,7 @@
           <a:p>
             <a:fld id="{9C4A4F43-1C06-40E6-8F87-8B286982E50E}" type="datetimeFigureOut">
               <a:rPr lang="en-NZ" smtClean="0"/>
-              <a:t>3/05/2022</a:t>
+              <a:t>9/05/2022</a:t>
             </a:fld>
             <a:endParaRPr lang="en-NZ" dirty="0"/>
           </a:p>
@@ -8623,7 +8787,7 @@
           <a:p>
             <a:fld id="{9C4A4F43-1C06-40E6-8F87-8B286982E50E}" type="datetimeFigureOut">
               <a:rPr lang="en-NZ" smtClean="0"/>
-              <a:t>3/05/2022</a:t>
+              <a:t>9/05/2022</a:t>
             </a:fld>
             <a:endParaRPr lang="en-NZ" dirty="0"/>
           </a:p>
@@ -8765,7 +8929,7 @@
           <a:p>
             <a:fld id="{9C4A4F43-1C06-40E6-8F87-8B286982E50E}" type="datetimeFigureOut">
               <a:rPr lang="en-NZ" smtClean="0"/>
-              <a:t>3/05/2022</a:t>
+              <a:t>9/05/2022</a:t>
             </a:fld>
             <a:endParaRPr lang="en-NZ" dirty="0"/>
           </a:p>
@@ -8878,7 +9042,7 @@
           <a:p>
             <a:fld id="{9C4A4F43-1C06-40E6-8F87-8B286982E50E}" type="datetimeFigureOut">
               <a:rPr lang="en-NZ" smtClean="0"/>
-              <a:t>3/05/2022</a:t>
+              <a:t>9/05/2022</a:t>
             </a:fld>
             <a:endParaRPr lang="en-NZ" dirty="0"/>
           </a:p>
@@ -9191,7 +9355,7 @@
           <a:p>
             <a:fld id="{9C4A4F43-1C06-40E6-8F87-8B286982E50E}" type="datetimeFigureOut">
               <a:rPr lang="en-NZ" smtClean="0"/>
-              <a:t>3/05/2022</a:t>
+              <a:t>9/05/2022</a:t>
             </a:fld>
             <a:endParaRPr lang="en-NZ" dirty="0"/>
           </a:p>
@@ -9480,7 +9644,7 @@
           <a:p>
             <a:fld id="{9C4A4F43-1C06-40E6-8F87-8B286982E50E}" type="datetimeFigureOut">
               <a:rPr lang="en-NZ" smtClean="0"/>
-              <a:t>3/05/2022</a:t>
+              <a:t>9/05/2022</a:t>
             </a:fld>
             <a:endParaRPr lang="en-NZ" dirty="0"/>
           </a:p>
@@ -9723,7 +9887,7 @@
           <a:p>
             <a:fld id="{9C4A4F43-1C06-40E6-8F87-8B286982E50E}" type="datetimeFigureOut">
               <a:rPr lang="en-NZ" smtClean="0"/>
-              <a:t>3/05/2022</a:t>
+              <a:t>9/05/2022</a:t>
             </a:fld>
             <a:endParaRPr lang="en-NZ" dirty="0"/>
           </a:p>
@@ -10298,7 +10462,11 @@
             <a:pPr algn="ctr"/>
             <a:r>
               <a:rPr lang="en-US" dirty="0"/>
-              <a:t>Component 5 - Statement formatter</a:t>
+              <a:t>Component 5 –</a:t>
+            </a:r>
+            <a:r>
+              <a:rPr lang="en-US"/>
+              <a:t>Ending Screen</a:t>
             </a:r>
             <a:endParaRPr lang="en-NZ" dirty="0"/>
           </a:p>
@@ -12054,14 +12222,14 @@
           <p:nvPr>
             <p:extLst>
               <p:ext uri="{D42A27DB-BD31-4B8C-83A1-F6EECF244321}">
-                <p14:modId xmlns:p14="http://schemas.microsoft.com/office/powerpoint/2010/main" val="2442392129"/>
+                <p14:modId xmlns:p14="http://schemas.microsoft.com/office/powerpoint/2010/main" val="4239579603"/>
               </p:ext>
             </p:extLst>
           </p:nvPr>
         </p:nvGraphicFramePr>
         <p:xfrm>
-          <a:off x="415600" y="1284849"/>
-          <a:ext cx="11360800" cy="4510960"/>
+          <a:off x="246743" y="1284849"/>
+          <a:ext cx="11785600" cy="2255480"/>
         </p:xfrm>
         <a:graphic>
           <a:graphicData uri="http://schemas.openxmlformats.org/drawingml/2006/table">
@@ -12070,14 +12238,329 @@
                 <a:noFill/>
               </a:tblPr>
               <a:tblGrid>
-                <a:gridCol w="5680400">
+                <a:gridCol w="4542971">
                   <a:extLst>
                     <a:ext uri="{9D8B030D-6E8A-4147-A177-3AD203B41FA5}">
                       <a16:colId xmlns:a16="http://schemas.microsoft.com/office/drawing/2014/main" val="20000"/>
                     </a:ext>
                   </a:extLst>
                 </a:gridCol>
-                <a:gridCol w="5680400">
+                <a:gridCol w="7242629">
+                  <a:extLst>
+                    <a:ext uri="{9D8B030D-6E8A-4147-A177-3AD203B41FA5}">
+                      <a16:colId xmlns:a16="http://schemas.microsoft.com/office/drawing/2014/main" val="20001"/>
+                    </a:ext>
+                  </a:extLst>
+                </a:gridCol>
+              </a:tblGrid>
+              <a:tr h="609560">
+                <a:tc>
+                  <a:txBody>
+                    <a:bodyPr/>
+                    <a:lstStyle/>
+                    <a:p>
+                      <a:pPr marL="0" lvl="0" indent="0" algn="l" rtl="0">
+                        <a:spcBef>
+                          <a:spcPts val="0"/>
+                        </a:spcBef>
+                        <a:spcAft>
+                          <a:spcPts val="0"/>
+                        </a:spcAft>
+                        <a:buNone/>
+                      </a:pPr>
+                      <a:r>
+                        <a:rPr lang="en-US" sz="2400" dirty="0"/>
+                        <a:t>Different methods trial</a:t>
+                      </a:r>
+                    </a:p>
+                    <a:p>
+                      <a:pPr marL="0" lvl="0" indent="0" algn="l" rtl="0">
+                        <a:spcBef>
+                          <a:spcPts val="0"/>
+                        </a:spcBef>
+                        <a:spcAft>
+                          <a:spcPts val="0"/>
+                        </a:spcAft>
+                        <a:buNone/>
+                      </a:pPr>
+                      <a:r>
+                        <a:rPr lang="en-NZ" sz="2400" dirty="0"/>
+                        <a:t>yes_no_check_v2.py</a:t>
+                      </a:r>
+                      <a:endParaRPr lang="en-US" sz="2400" dirty="0"/>
+                    </a:p>
+                  </a:txBody>
+                  <a:tcPr marL="121900" marR="121900" marT="121900" marB="121900"/>
+                </a:tc>
+                <a:tc>
+                  <a:txBody>
+                    <a:bodyPr/>
+                    <a:lstStyle/>
+                    <a:p>
+                      <a:pPr marL="0" lvl="0" indent="0" algn="l" rtl="0">
+                        <a:spcBef>
+                          <a:spcPts val="0"/>
+                        </a:spcBef>
+                        <a:spcAft>
+                          <a:spcPts val="0"/>
+                        </a:spcAft>
+                        <a:buNone/>
+                      </a:pPr>
+                      <a:r>
+                        <a:rPr lang="en-US" sz="2200" dirty="0"/>
+                        <a:t>Trialed having different ways to use a while loop (see images below) method 1 and method 2 can both do the same thing. I chose method 2 because there was less lines of code and the computer didn’t need to check a variable every time it looped which made the code more efficient and the more </a:t>
+                      </a:r>
+                      <a:r>
+                        <a:rPr lang="en-US" sz="2200"/>
+                        <a:t>obvious choice.</a:t>
+                      </a:r>
+                      <a:endParaRPr sz="2200" dirty="0"/>
+                    </a:p>
+                  </a:txBody>
+                  <a:tcPr marL="121900" marR="121900" marT="121900" marB="121900"/>
+                </a:tc>
+                <a:extLst>
+                  <a:ext uri="{0D108BD9-81ED-4DB2-BD59-A6C34878D82A}">
+                    <a16:rowId xmlns:a16="http://schemas.microsoft.com/office/drawing/2014/main" val="1961748599"/>
+                  </a:ext>
+                </a:extLst>
+              </a:tr>
+            </a:tbl>
+          </a:graphicData>
+        </a:graphic>
+      </p:graphicFrame>
+      <p:pic>
+        <p:nvPicPr>
+          <p:cNvPr id="4" name="Picture 3">
+            <a:extLst>
+              <a:ext uri="{FF2B5EF4-FFF2-40B4-BE49-F238E27FC236}">
+                <a16:creationId xmlns:a16="http://schemas.microsoft.com/office/drawing/2014/main" id="{52C6B0E6-9533-2558-80B0-FECBF0CA473D}"/>
+              </a:ext>
+            </a:extLst>
+          </p:cNvPr>
+          <p:cNvPicPr>
+            <a:picLocks noChangeAspect="1"/>
+          </p:cNvPicPr>
+          <p:nvPr/>
+        </p:nvPicPr>
+        <p:blipFill>
+          <a:blip r:embed="rId3"/>
+          <a:stretch>
+            <a:fillRect/>
+          </a:stretch>
+        </p:blipFill>
+        <p:spPr>
+          <a:xfrm>
+            <a:off x="246744" y="3957608"/>
+            <a:ext cx="3773714" cy="2900392"/>
+          </a:xfrm>
+          <a:prstGeom prst="rect">
+            <a:avLst/>
+          </a:prstGeom>
+        </p:spPr>
+      </p:pic>
+      <p:pic>
+        <p:nvPicPr>
+          <p:cNvPr id="7" name="Picture 6">
+            <a:extLst>
+              <a:ext uri="{FF2B5EF4-FFF2-40B4-BE49-F238E27FC236}">
+                <a16:creationId xmlns:a16="http://schemas.microsoft.com/office/drawing/2014/main" id="{439F4E37-A228-D211-E154-BB9F448B316D}"/>
+              </a:ext>
+            </a:extLst>
+          </p:cNvPr>
+          <p:cNvPicPr>
+            <a:picLocks noChangeAspect="1"/>
+          </p:cNvPicPr>
+          <p:nvPr/>
+        </p:nvPicPr>
+        <p:blipFill>
+          <a:blip r:embed="rId4"/>
+          <a:stretch>
+            <a:fillRect/>
+          </a:stretch>
+        </p:blipFill>
+        <p:spPr>
+          <a:xfrm>
+            <a:off x="6378486" y="3957607"/>
+            <a:ext cx="4192386" cy="2900393"/>
+          </a:xfrm>
+          <a:prstGeom prst="rect">
+            <a:avLst/>
+          </a:prstGeom>
+        </p:spPr>
+      </p:pic>
+      <p:sp>
+        <p:nvSpPr>
+          <p:cNvPr id="9" name="TextBox 8">
+            <a:extLst>
+              <a:ext uri="{FF2B5EF4-FFF2-40B4-BE49-F238E27FC236}">
+                <a16:creationId xmlns:a16="http://schemas.microsoft.com/office/drawing/2014/main" id="{9EB38105-441C-49B5-7AC6-4CA98C61335C}"/>
+              </a:ext>
+            </a:extLst>
+          </p:cNvPr>
+          <p:cNvSpPr txBox="1"/>
+          <p:nvPr/>
+        </p:nvSpPr>
+        <p:spPr>
+          <a:xfrm>
+            <a:off x="1436914" y="3588275"/>
+            <a:ext cx="2022092" cy="369332"/>
+          </a:xfrm>
+          <a:prstGeom prst="rect">
+            <a:avLst/>
+          </a:prstGeom>
+          <a:noFill/>
+        </p:spPr>
+        <p:txBody>
+          <a:bodyPr wrap="none" rtlCol="0">
+            <a:spAutoFit/>
+          </a:bodyPr>
+          <a:lstStyle/>
+          <a:p>
+            <a:r>
+              <a:rPr lang="en-NZ" dirty="0"/>
+              <a:t>Method 1 (13 lines)</a:t>
+            </a:r>
+          </a:p>
+        </p:txBody>
+      </p:sp>
+      <p:sp>
+        <p:nvSpPr>
+          <p:cNvPr id="10" name="TextBox 9">
+            <a:extLst>
+              <a:ext uri="{FF2B5EF4-FFF2-40B4-BE49-F238E27FC236}">
+                <a16:creationId xmlns:a16="http://schemas.microsoft.com/office/drawing/2014/main" id="{EB08DE0F-F138-75C4-032E-B3D1FF36F6D5}"/>
+              </a:ext>
+            </a:extLst>
+          </p:cNvPr>
+          <p:cNvSpPr txBox="1"/>
+          <p:nvPr/>
+        </p:nvSpPr>
+        <p:spPr>
+          <a:xfrm>
+            <a:off x="7853650" y="3587502"/>
+            <a:ext cx="2022092" cy="369332"/>
+          </a:xfrm>
+          <a:prstGeom prst="rect">
+            <a:avLst/>
+          </a:prstGeom>
+          <a:noFill/>
+        </p:spPr>
+        <p:txBody>
+          <a:bodyPr wrap="none" rtlCol="0">
+            <a:spAutoFit/>
+          </a:bodyPr>
+          <a:lstStyle/>
+          <a:p>
+            <a:r>
+              <a:rPr lang="en-NZ" dirty="0"/>
+              <a:t>Method 2 (12 lines)</a:t>
+            </a:r>
+          </a:p>
+        </p:txBody>
+      </p:sp>
+    </p:spTree>
+    <p:extLst>
+      <p:ext uri="{BB962C8B-B14F-4D97-AF65-F5344CB8AC3E}">
+        <p14:creationId xmlns:p14="http://schemas.microsoft.com/office/powerpoint/2010/main" val="1522177698"/>
+      </p:ext>
+    </p:extLst>
+  </p:cSld>
+  <p:clrMapOvr>
+    <a:masterClrMapping/>
+  </p:clrMapOvr>
+</p:sld>
+</file>
+
+<file path=ppt/slides/slide14.xml><?xml version="1.0" encoding="utf-8"?>
+<p:sld xmlns:a="http://schemas.openxmlformats.org/drawingml/2006/main" xmlns:r="http://schemas.openxmlformats.org/officeDocument/2006/relationships" xmlns:p="http://schemas.openxmlformats.org/presentationml/2006/main">
+  <p:cSld>
+    <p:spTree>
+      <p:nvGrpSpPr>
+        <p:cNvPr id="1" name=""/>
+        <p:cNvGrpSpPr/>
+        <p:nvPr/>
+      </p:nvGrpSpPr>
+      <p:grpSpPr>
+        <a:xfrm>
+          <a:off x="0" y="0"/>
+          <a:ext cx="0" cy="0"/>
+          <a:chOff x="0" y="0"/>
+          <a:chExt cx="0" cy="0"/>
+        </a:xfrm>
+      </p:grpSpPr>
+      <p:sp>
+        <p:nvSpPr>
+          <p:cNvPr id="2" name="Title 1">
+            <a:extLst>
+              <a:ext uri="{FF2B5EF4-FFF2-40B4-BE49-F238E27FC236}">
+                <a16:creationId xmlns:a16="http://schemas.microsoft.com/office/drawing/2014/main" id="{1CC5D32F-7C18-4D00-8D54-2FB046F0A206}"/>
+              </a:ext>
+            </a:extLst>
+          </p:cNvPr>
+          <p:cNvSpPr>
+            <a:spLocks noGrp="1"/>
+          </p:cNvSpPr>
+          <p:nvPr>
+            <p:ph type="title"/>
+          </p:nvPr>
+        </p:nvSpPr>
+        <p:spPr>
+          <a:xfrm>
+            <a:off x="749300" y="223520"/>
+            <a:ext cx="10515600" cy="806768"/>
+          </a:xfrm>
+        </p:spPr>
+        <p:txBody>
+          <a:bodyPr>
+            <a:normAutofit/>
+          </a:bodyPr>
+          <a:lstStyle/>
+          <a:p>
+            <a:r>
+              <a:rPr lang="en-NZ" sz="4000" dirty="0"/>
+              <a:t>Generate random options- Trialling </a:t>
+            </a:r>
+          </a:p>
+        </p:txBody>
+      </p:sp>
+      <p:graphicFrame>
+        <p:nvGraphicFramePr>
+          <p:cNvPr id="5" name="Google Shape;92;p19">
+            <a:extLst>
+              <a:ext uri="{FF2B5EF4-FFF2-40B4-BE49-F238E27FC236}">
+                <a16:creationId xmlns:a16="http://schemas.microsoft.com/office/drawing/2014/main" id="{98F4BDB5-BB58-4AC0-837B-0A3E74266B65}"/>
+              </a:ext>
+            </a:extLst>
+          </p:cNvPr>
+          <p:cNvGraphicFramePr/>
+          <p:nvPr>
+            <p:extLst>
+              <p:ext uri="{D42A27DB-BD31-4B8C-83A1-F6EECF244321}">
+                <p14:modId xmlns:p14="http://schemas.microsoft.com/office/powerpoint/2010/main" val="1402429309"/>
+              </p:ext>
+            </p:extLst>
+          </p:nvPr>
+        </p:nvGraphicFramePr>
+        <p:xfrm>
+          <a:off x="246743" y="1284849"/>
+          <a:ext cx="11785600" cy="3230800"/>
+        </p:xfrm>
+        <a:graphic>
+          <a:graphicData uri="http://schemas.openxmlformats.org/drawingml/2006/table">
+            <a:tbl>
+              <a:tblPr>
+                <a:noFill/>
+              </a:tblPr>
+              <a:tblGrid>
+                <a:gridCol w="5167086">
+                  <a:extLst>
+                    <a:ext uri="{9D8B030D-6E8A-4147-A177-3AD203B41FA5}">
+                      <a16:colId xmlns:a16="http://schemas.microsoft.com/office/drawing/2014/main" val="20000"/>
+                    </a:ext>
+                  </a:extLst>
+                </a:gridCol>
+                <a:gridCol w="6618514">
                   <a:extLst>
                     <a:ext uri="{9D8B030D-6E8A-4147-A177-3AD203B41FA5}">
                       <a16:colId xmlns:a16="http://schemas.microsoft.com/office/drawing/2014/main" val="20001"/>
@@ -12139,9 +12622,8 @@
                       </a:pPr>
                       <a:r>
                         <a:rPr lang="en-US" sz="2200" dirty="0"/>
-                        <a:t>Trialed having the input inside the main routine to minimize the code in the main routine. This version of the code returned with no information e.g.; return instead of return “Text”.</a:t>
+                        <a:t>Trialed having the code not as a function in this version</a:t>
                       </a:r>
-                      <a:endParaRPr sz="2200" dirty="0"/>
                     </a:p>
                   </a:txBody>
                   <a:tcPr marL="121900" marR="121900" marT="121900" marB="121900"/>
@@ -12173,20 +12655,27 @@
                       </a:r>
                     </a:p>
                     <a:p>
-                      <a:pPr marL="0" lvl="0" indent="0" algn="l" rtl="0">
+                      <a:pPr marL="0" marR="0" lvl="0" indent="0" algn="l" defTabSz="914400" rtl="0" eaLnBrk="1" fontAlgn="auto" latinLnBrk="0" hangingPunct="1">
+                        <a:lnSpc>
+                          <a:spcPct val="100000"/>
+                        </a:lnSpc>
                         <a:spcBef>
                           <a:spcPts val="0"/>
                         </a:spcBef>
                         <a:spcAft>
                           <a:spcPts val="0"/>
                         </a:spcAft>
+                        <a:buClrTx/>
+                        <a:buSzTx/>
+                        <a:buFontTx/>
                         <a:buNone/>
+                        <a:tabLst/>
+                        <a:defRPr/>
                       </a:pPr>
                       <a:r>
-                        <a:rPr lang="en-NZ" sz="2400" dirty="0"/>
-                        <a:t>yes_no_v3.py</a:t>
+                        <a:rPr lang="en-US" sz="2400" dirty="0"/>
+                        <a:t>generate_random_options_v2.py</a:t>
                       </a:r>
-                      <a:endParaRPr lang="en-US" sz="2400" dirty="0"/>
                     </a:p>
                   </a:txBody>
                   <a:tcPr marL="121900" marR="121900" marT="121900" marB="121900"/>
@@ -12196,35 +12685,34 @@
                     <a:bodyPr/>
                     <a:lstStyle/>
                     <a:p>
-                      <a:pPr marL="0" lvl="0" indent="0" algn="l" rtl="0">
+                      <a:pPr marL="0" marR="0" lvl="0" indent="0" algn="l" defTabSz="914400" rtl="0" eaLnBrk="1" fontAlgn="auto" latinLnBrk="0" hangingPunct="1">
+                        <a:lnSpc>
+                          <a:spcPct val="100000"/>
+                        </a:lnSpc>
                         <a:spcBef>
                           <a:spcPts val="0"/>
                         </a:spcBef>
                         <a:spcAft>
                           <a:spcPts val="0"/>
                         </a:spcAft>
+                        <a:buClrTx/>
+                        <a:buSzTx/>
+                        <a:buFontTx/>
                         <a:buNone/>
+                        <a:tabLst/>
+                        <a:defRPr/>
                       </a:pPr>
                       <a:r>
                         <a:rPr lang="en-US" sz="2200" dirty="0"/>
-                        <a:t>I realized the input needed to be in the main routine and not the function, so the input statement was moved to outside the function. This resulted in function having to return 2 values inside a list. This changed the </a:t>
+                        <a:t> In this version (“generate_random_options_v2.py”) I changed the instructions into a function so there was less code in the main routine and so it would be easier for people in the future to change the  instruction code. If the instructions needed to be displayed again the function could be called easily.</a:t>
                       </a:r>
-                      <a:r>
-                        <a:rPr lang="en-US" sz="2200" dirty="0" err="1"/>
-                        <a:t>yes_no</a:t>
-                      </a:r>
-                      <a:r>
-                        <a:rPr lang="en-US" sz="2200" dirty="0"/>
-                        <a:t> function to be multipurpose for different input questions.</a:t>
-                      </a:r>
-                      <a:endParaRPr sz="2200" dirty="0"/>
                     </a:p>
                   </a:txBody>
                   <a:tcPr marL="121900" marR="121900" marT="121900" marB="121900"/>
                 </a:tc>
                 <a:extLst>
                   <a:ext uri="{0D108BD9-81ED-4DB2-BD59-A6C34878D82A}">
-                    <a16:rowId xmlns:a16="http://schemas.microsoft.com/office/drawing/2014/main" val="1961748599"/>
+                    <a16:rowId xmlns:a16="http://schemas.microsoft.com/office/drawing/2014/main" val="3375662832"/>
                   </a:ext>
                 </a:extLst>
               </a:tr>
@@ -12245,7 +12733,7 @@
 </p:sld>
 </file>
 
-<file path=ppt/slides/slide14.xml><?xml version="1.0" encoding="utf-8"?>
+<file path=ppt/slides/slide15.xml><?xml version="1.0" encoding="utf-8"?>
 <p:sld xmlns:a="http://schemas.openxmlformats.org/drawingml/2006/main" xmlns:r="http://schemas.openxmlformats.org/officeDocument/2006/relationships" xmlns:p="http://schemas.openxmlformats.org/presentationml/2006/main">
   <p:cSld>
     <p:spTree>
@@ -12663,7 +13151,7 @@
 </p:sld>
 </file>
 
-<file path=ppt/slides/slide15.xml><?xml version="1.0" encoding="utf-8"?>
+<file path=ppt/slides/slide16.xml><?xml version="1.0" encoding="utf-8"?>
 <p:sld xmlns:a="http://schemas.openxmlformats.org/drawingml/2006/main" xmlns:r="http://schemas.openxmlformats.org/officeDocument/2006/relationships" xmlns:p="http://schemas.openxmlformats.org/presentationml/2006/main">
   <p:cSld>
     <p:spTree>
@@ -13454,501 +13942,6 @@
 </p:sld>
 </file>
 
-<file path=ppt/slides/slide16.xml><?xml version="1.0" encoding="utf-8"?>
-<p:sld xmlns:a="http://schemas.openxmlformats.org/drawingml/2006/main" xmlns:r="http://schemas.openxmlformats.org/officeDocument/2006/relationships" xmlns:p="http://schemas.openxmlformats.org/presentationml/2006/main">
-  <p:cSld>
-    <p:spTree>
-      <p:nvGrpSpPr>
-        <p:cNvPr id="1" name="Shape 90"/>
-        <p:cNvGrpSpPr/>
-        <p:nvPr/>
-      </p:nvGrpSpPr>
-      <p:grpSpPr>
-        <a:xfrm>
-          <a:off x="0" y="0"/>
-          <a:ext cx="0" cy="0"/>
-          <a:chOff x="0" y="0"/>
-          <a:chExt cx="0" cy="0"/>
-        </a:xfrm>
-      </p:grpSpPr>
-      <p:sp>
-        <p:nvSpPr>
-          <p:cNvPr id="91" name="Google Shape;91;p19"/>
-          <p:cNvSpPr txBox="1">
-            <a:spLocks noGrp="1"/>
-          </p:cNvSpPr>
-          <p:nvPr>
-            <p:ph type="title"/>
-          </p:nvPr>
-        </p:nvSpPr>
-        <p:spPr>
-          <a:xfrm>
-            <a:off x="415600" y="217447"/>
-            <a:ext cx="11360800" cy="763600"/>
-          </a:xfrm>
-          <a:prstGeom prst="rect">
-            <a:avLst/>
-          </a:prstGeom>
-        </p:spPr>
-        <p:txBody>
-          <a:bodyPr spcFirstLastPara="1" vert="horz" wrap="square" lIns="121900" tIns="121900" rIns="121900" bIns="121900" rtlCol="0" anchor="t" anchorCtr="0">
-            <a:noAutofit/>
-          </a:bodyPr>
-          <a:lstStyle/>
-          <a:p>
-            <a:r>
-              <a:rPr lang="en" sz="4000" dirty="0"/>
-              <a:t>How much - Test Plan</a:t>
-            </a:r>
-            <a:endParaRPr sz="4000" dirty="0"/>
-          </a:p>
-        </p:txBody>
-      </p:sp>
-      <p:graphicFrame>
-        <p:nvGraphicFramePr>
-          <p:cNvPr id="92" name="Google Shape;92;p19"/>
-          <p:cNvGraphicFramePr/>
-          <p:nvPr>
-            <p:extLst>
-              <p:ext uri="{D42A27DB-BD31-4B8C-83A1-F6EECF244321}">
-                <p14:modId xmlns:p14="http://schemas.microsoft.com/office/powerpoint/2010/main" val="2887683024"/>
-              </p:ext>
-            </p:extLst>
-          </p:nvPr>
-        </p:nvGraphicFramePr>
-        <p:xfrm>
-          <a:off x="548067" y="1690299"/>
-          <a:ext cx="11360800" cy="4632680"/>
-        </p:xfrm>
-        <a:graphic>
-          <a:graphicData uri="http://schemas.openxmlformats.org/drawingml/2006/table">
-            <a:tbl>
-              <a:tblPr>
-                <a:noFill/>
-              </a:tblPr>
-              <a:tblGrid>
-                <a:gridCol w="3762676">
-                  <a:extLst>
-                    <a:ext uri="{9D8B030D-6E8A-4147-A177-3AD203B41FA5}">
-                      <a16:colId xmlns:a16="http://schemas.microsoft.com/office/drawing/2014/main" val="20000"/>
-                    </a:ext>
-                  </a:extLst>
-                </a:gridCol>
-                <a:gridCol w="7598124">
-                  <a:extLst>
-                    <a:ext uri="{9D8B030D-6E8A-4147-A177-3AD203B41FA5}">
-                      <a16:colId xmlns:a16="http://schemas.microsoft.com/office/drawing/2014/main" val="20001"/>
-                    </a:ext>
-                  </a:extLst>
-                </a:gridCol>
-              </a:tblGrid>
-              <a:tr h="609560">
-                <a:tc>
-                  <a:txBody>
-                    <a:bodyPr/>
-                    <a:lstStyle/>
-                    <a:p>
-                      <a:pPr marL="0" lvl="0" indent="0" algn="l" rtl="0">
-                        <a:spcBef>
-                          <a:spcPts val="0"/>
-                        </a:spcBef>
-                        <a:spcAft>
-                          <a:spcPts val="0"/>
-                        </a:spcAft>
-                        <a:buNone/>
-                      </a:pPr>
-                      <a:r>
-                        <a:rPr lang="en" sz="2400" b="1" dirty="0"/>
-                        <a:t>Test Cases - input</a:t>
-                      </a:r>
-                      <a:endParaRPr sz="2400" b="1" dirty="0"/>
-                    </a:p>
-                  </a:txBody>
-                  <a:tcPr marL="121900" marR="121900" marT="121900" marB="121900">
-                    <a:solidFill>
-                      <a:srgbClr val="CCCCCC"/>
-                    </a:solidFill>
-                  </a:tcPr>
-                </a:tc>
-                <a:tc>
-                  <a:txBody>
-                    <a:bodyPr/>
-                    <a:lstStyle/>
-                    <a:p>
-                      <a:pPr marL="0" lvl="0" indent="0" algn="l" rtl="0">
-                        <a:spcBef>
-                          <a:spcPts val="0"/>
-                        </a:spcBef>
-                        <a:spcAft>
-                          <a:spcPts val="0"/>
-                        </a:spcAft>
-                        <a:buNone/>
-                      </a:pPr>
-                      <a:r>
-                        <a:rPr lang="en" sz="2400" b="1" dirty="0"/>
-                        <a:t>Expected output</a:t>
-                      </a:r>
-                      <a:endParaRPr sz="2400" b="1" dirty="0"/>
-                    </a:p>
-                  </a:txBody>
-                  <a:tcPr marL="121900" marR="121900" marT="121900" marB="121900">
-                    <a:solidFill>
-                      <a:srgbClr val="CCCCCC"/>
-                    </a:solidFill>
-                  </a:tcPr>
-                </a:tc>
-                <a:extLst>
-                  <a:ext uri="{0D108BD9-81ED-4DB2-BD59-A6C34878D82A}">
-                    <a16:rowId xmlns:a16="http://schemas.microsoft.com/office/drawing/2014/main" val="10000"/>
-                  </a:ext>
-                </a:extLst>
-              </a:tr>
-              <a:tr h="609560">
-                <a:tc>
-                  <a:txBody>
-                    <a:bodyPr/>
-                    <a:lstStyle/>
-                    <a:p>
-                      <a:pPr marL="0" lvl="0" indent="0" algn="l" rtl="0">
-                        <a:spcBef>
-                          <a:spcPts val="0"/>
-                        </a:spcBef>
-                        <a:spcAft>
-                          <a:spcPts val="0"/>
-                        </a:spcAft>
-                        <a:buNone/>
-                      </a:pPr>
-                      <a:r>
-                        <a:rPr lang="en-US" sz="2400" dirty="0"/>
-                        <a:t>xxii (invalid-string)</a:t>
-                      </a:r>
-                    </a:p>
-                  </a:txBody>
-                  <a:tcPr marL="121900" marR="121900" marT="121900" marB="121900"/>
-                </a:tc>
-                <a:tc>
-                  <a:txBody>
-                    <a:bodyPr/>
-                    <a:lstStyle/>
-                    <a:p>
-                      <a:pPr marL="0" lvl="0" indent="0" algn="l" rtl="0">
-                        <a:spcBef>
-                          <a:spcPts val="0"/>
-                        </a:spcBef>
-                        <a:spcAft>
-                          <a:spcPts val="0"/>
-                        </a:spcAft>
-                        <a:buNone/>
-                      </a:pPr>
-                      <a:r>
-                        <a:rPr lang="en-US" sz="2400" dirty="0"/>
-                        <a:t>&lt;error&gt; Please enter a whole number between 1 and 10</a:t>
-                      </a:r>
-                      <a:endParaRPr sz="2400" dirty="0"/>
-                    </a:p>
-                  </a:txBody>
-                  <a:tcPr marL="121900" marR="121900" marT="121900" marB="121900"/>
-                </a:tc>
-                <a:extLst>
-                  <a:ext uri="{0D108BD9-81ED-4DB2-BD59-A6C34878D82A}">
-                    <a16:rowId xmlns:a16="http://schemas.microsoft.com/office/drawing/2014/main" val="10001"/>
-                  </a:ext>
-                </a:extLst>
-              </a:tr>
-              <a:tr h="609560">
-                <a:tc>
-                  <a:txBody>
-                    <a:bodyPr/>
-                    <a:lstStyle/>
-                    <a:p>
-                      <a:pPr marL="0" lvl="0" indent="0" algn="l" rtl="0">
-                        <a:spcBef>
-                          <a:spcPts val="0"/>
-                        </a:spcBef>
-                        <a:spcAft>
-                          <a:spcPts val="0"/>
-                        </a:spcAft>
-                        <a:buNone/>
-                      </a:pPr>
-                      <a:r>
-                        <a:rPr lang="en-US" sz="2400" dirty="0"/>
-                        <a:t>0.5 (invalid-float)</a:t>
-                      </a:r>
-                    </a:p>
-                  </a:txBody>
-                  <a:tcPr marL="121900" marR="121900" marT="121900" marB="121900"/>
-                </a:tc>
-                <a:tc>
-                  <a:txBody>
-                    <a:bodyPr/>
-                    <a:lstStyle/>
-                    <a:p>
-                      <a:pPr marL="0" lvl="0" indent="0" algn="l" rtl="0">
-                        <a:spcBef>
-                          <a:spcPts val="0"/>
-                        </a:spcBef>
-                        <a:spcAft>
-                          <a:spcPts val="0"/>
-                        </a:spcAft>
-                        <a:buNone/>
-                      </a:pPr>
-                      <a:r>
-                        <a:rPr lang="en-US" sz="2400" dirty="0"/>
-                        <a:t>&lt;error&gt; Please enter a whole number between 1 and 10</a:t>
-                      </a:r>
-                    </a:p>
-                  </a:txBody>
-                  <a:tcPr marL="121900" marR="121900" marT="121900" marB="121900"/>
-                </a:tc>
-                <a:extLst>
-                  <a:ext uri="{0D108BD9-81ED-4DB2-BD59-A6C34878D82A}">
-                    <a16:rowId xmlns:a16="http://schemas.microsoft.com/office/drawing/2014/main" val="1961748599"/>
-                  </a:ext>
-                </a:extLst>
-              </a:tr>
-              <a:tr h="609560">
-                <a:tc>
-                  <a:txBody>
-                    <a:bodyPr/>
-                    <a:lstStyle/>
-                    <a:p>
-                      <a:pPr marL="0" lvl="0" indent="0" algn="l" rtl="0">
-                        <a:spcBef>
-                          <a:spcPts val="0"/>
-                        </a:spcBef>
-                        <a:spcAft>
-                          <a:spcPts val="0"/>
-                        </a:spcAft>
-                        <a:buNone/>
-                      </a:pPr>
-                      <a:r>
-                        <a:rPr lang="en-US" sz="2400" dirty="0"/>
-                        <a:t>0 (invalid – too low)</a:t>
-                      </a:r>
-                    </a:p>
-                  </a:txBody>
-                  <a:tcPr marL="121900" marR="121900" marT="121900" marB="121900"/>
-                </a:tc>
-                <a:tc>
-                  <a:txBody>
-                    <a:bodyPr/>
-                    <a:lstStyle/>
-                    <a:p>
-                      <a:pPr marL="0" lvl="0" indent="0" algn="l" rtl="0">
-                        <a:spcBef>
-                          <a:spcPts val="0"/>
-                        </a:spcBef>
-                        <a:spcAft>
-                          <a:spcPts val="0"/>
-                        </a:spcAft>
-                        <a:buNone/>
-                      </a:pPr>
-                      <a:r>
-                        <a:rPr lang="en-US" sz="2400" dirty="0"/>
-                        <a:t>&lt;error&gt; Please enter a whole number between 1 and 10</a:t>
-                      </a:r>
-                    </a:p>
-                  </a:txBody>
-                  <a:tcPr marL="121900" marR="121900" marT="121900" marB="121900"/>
-                </a:tc>
-                <a:extLst>
-                  <a:ext uri="{0D108BD9-81ED-4DB2-BD59-A6C34878D82A}">
-                    <a16:rowId xmlns:a16="http://schemas.microsoft.com/office/drawing/2014/main" val="694586827"/>
-                  </a:ext>
-                </a:extLst>
-              </a:tr>
-              <a:tr h="609560">
-                <a:tc>
-                  <a:txBody>
-                    <a:bodyPr/>
-                    <a:lstStyle/>
-                    <a:p>
-                      <a:pPr marL="0" lvl="0" indent="0" algn="l" rtl="0">
-                        <a:spcBef>
-                          <a:spcPts val="0"/>
-                        </a:spcBef>
-                        <a:spcAft>
-                          <a:spcPts val="0"/>
-                        </a:spcAft>
-                        <a:buNone/>
-                      </a:pPr>
-                      <a:r>
-                        <a:rPr lang="en-US" sz="2400" dirty="0"/>
-                        <a:t>11 (invalid – too high)</a:t>
-                      </a:r>
-                    </a:p>
-                  </a:txBody>
-                  <a:tcPr marL="121900" marR="121900" marT="121900" marB="121900"/>
-                </a:tc>
-                <a:tc>
-                  <a:txBody>
-                    <a:bodyPr/>
-                    <a:lstStyle/>
-                    <a:p>
-                      <a:pPr marL="0" marR="0" lvl="0" indent="0" algn="l" defTabSz="914400" rtl="0" eaLnBrk="1" fontAlgn="auto" latinLnBrk="0" hangingPunct="1">
-                        <a:lnSpc>
-                          <a:spcPct val="100000"/>
-                        </a:lnSpc>
-                        <a:spcBef>
-                          <a:spcPts val="0"/>
-                        </a:spcBef>
-                        <a:spcAft>
-                          <a:spcPts val="0"/>
-                        </a:spcAft>
-                        <a:buClrTx/>
-                        <a:buSzTx/>
-                        <a:buFontTx/>
-                        <a:buNone/>
-                        <a:tabLst/>
-                        <a:defRPr/>
-                      </a:pPr>
-                      <a:r>
-                        <a:rPr lang="en-US" sz="2400" dirty="0"/>
-                        <a:t>&lt;error&gt; Please enter a whole number between 1 and 10</a:t>
-                      </a:r>
-                    </a:p>
-                    <a:p>
-                      <a:pPr marL="0" lvl="0" indent="0" algn="l" rtl="0">
-                        <a:spcBef>
-                          <a:spcPts val="0"/>
-                        </a:spcBef>
-                        <a:spcAft>
-                          <a:spcPts val="0"/>
-                        </a:spcAft>
-                        <a:buNone/>
-                      </a:pPr>
-                      <a:endParaRPr sz="2400" dirty="0"/>
-                    </a:p>
-                  </a:txBody>
-                  <a:tcPr marL="121900" marR="121900" marT="121900" marB="121900"/>
-                </a:tc>
-                <a:extLst>
-                  <a:ext uri="{0D108BD9-81ED-4DB2-BD59-A6C34878D82A}">
-                    <a16:rowId xmlns:a16="http://schemas.microsoft.com/office/drawing/2014/main" val="998003276"/>
-                  </a:ext>
-                </a:extLst>
-              </a:tr>
-              <a:tr h="609560">
-                <a:tc>
-                  <a:txBody>
-                    <a:bodyPr/>
-                    <a:lstStyle/>
-                    <a:p>
-                      <a:pPr marL="0" lvl="0" indent="0" algn="l" rtl="0">
-                        <a:spcBef>
-                          <a:spcPts val="0"/>
-                        </a:spcBef>
-                        <a:spcAft>
-                          <a:spcPts val="0"/>
-                        </a:spcAft>
-                        <a:buNone/>
-                      </a:pPr>
-                      <a:r>
-                        <a:rPr lang="en-US" sz="2400" dirty="0"/>
-                        <a:t>1 (valid – lower boundary)</a:t>
-                      </a:r>
-                    </a:p>
-                  </a:txBody>
-                  <a:tcPr marL="121900" marR="121900" marT="121900" marB="121900"/>
-                </a:tc>
-                <a:tc>
-                  <a:txBody>
-                    <a:bodyPr/>
-                    <a:lstStyle/>
-                    <a:p>
-                      <a:pPr marL="0" lvl="0" indent="0" algn="l" rtl="0">
-                        <a:spcBef>
-                          <a:spcPts val="0"/>
-                        </a:spcBef>
-                        <a:spcAft>
-                          <a:spcPts val="0"/>
-                        </a:spcAft>
-                        <a:buNone/>
-                      </a:pPr>
-                      <a:r>
-                        <a:rPr lang="en-US" sz="2400" dirty="0"/>
-                        <a:t>Program continues</a:t>
-                      </a:r>
-                      <a:endParaRPr sz="2400" dirty="0"/>
-                    </a:p>
-                  </a:txBody>
-                  <a:tcPr marL="121900" marR="121900" marT="121900" marB="121900"/>
-                </a:tc>
-                <a:extLst>
-                  <a:ext uri="{0D108BD9-81ED-4DB2-BD59-A6C34878D82A}">
-                    <a16:rowId xmlns:a16="http://schemas.microsoft.com/office/drawing/2014/main" val="827233708"/>
-                  </a:ext>
-                </a:extLst>
-              </a:tr>
-              <a:tr h="609560">
-                <a:tc>
-                  <a:txBody>
-                    <a:bodyPr/>
-                    <a:lstStyle/>
-                    <a:p>
-                      <a:pPr marL="0" lvl="0" indent="0" algn="l" rtl="0">
-                        <a:spcBef>
-                          <a:spcPts val="0"/>
-                        </a:spcBef>
-                        <a:spcAft>
-                          <a:spcPts val="0"/>
-                        </a:spcAft>
-                        <a:buNone/>
-                      </a:pPr>
-                      <a:r>
-                        <a:rPr lang="en-US" sz="2400" dirty="0"/>
-                        <a:t>10 (valid – upper boundary)</a:t>
-                      </a:r>
-                    </a:p>
-                  </a:txBody>
-                  <a:tcPr marL="121900" marR="121900" marT="121900" marB="121900"/>
-                </a:tc>
-                <a:tc>
-                  <a:txBody>
-                    <a:bodyPr/>
-                    <a:lstStyle/>
-                    <a:p>
-                      <a:pPr marL="0" lvl="0" indent="0" algn="l" rtl="0">
-                        <a:spcBef>
-                          <a:spcPts val="0"/>
-                        </a:spcBef>
-                        <a:spcAft>
-                          <a:spcPts val="0"/>
-                        </a:spcAft>
-                        <a:buNone/>
-                      </a:pPr>
-                      <a:r>
-                        <a:rPr lang="en-US" sz="2400" dirty="0"/>
-                        <a:t>Program continues</a:t>
-                      </a:r>
-                      <a:endParaRPr sz="2400" dirty="0"/>
-                    </a:p>
-                  </a:txBody>
-                  <a:tcPr marL="121900" marR="121900" marT="121900" marB="121900"/>
-                </a:tc>
-                <a:extLst>
-                  <a:ext uri="{0D108BD9-81ED-4DB2-BD59-A6C34878D82A}">
-                    <a16:rowId xmlns:a16="http://schemas.microsoft.com/office/drawing/2014/main" val="2893372194"/>
-                  </a:ext>
-                </a:extLst>
-              </a:tr>
-            </a:tbl>
-          </a:graphicData>
-        </a:graphic>
-      </p:graphicFrame>
-    </p:spTree>
-    <p:extLst>
-      <p:ext uri="{BB962C8B-B14F-4D97-AF65-F5344CB8AC3E}">
-        <p14:creationId xmlns:p14="http://schemas.microsoft.com/office/powerpoint/2010/main" val="1495764827"/>
-      </p:ext>
-    </p:extLst>
-  </p:cSld>
-  <p:clrMapOvr>
-    <a:masterClrMapping/>
-  </p:clrMapOvr>
-</p:sld>
-</file>
-
 <file path=ppt/slides/slide17.xml><?xml version="1.0" encoding="utf-8"?>
 <p:sld xmlns:a="http://schemas.openxmlformats.org/drawingml/2006/main" xmlns:r="http://schemas.openxmlformats.org/officeDocument/2006/relationships" xmlns:p="http://schemas.openxmlformats.org/presentationml/2006/main">
   <p:cSld>
@@ -13993,279 +13986,618 @@
           <a:p>
             <a:r>
               <a:rPr lang="en" sz="4000" dirty="0"/>
-              <a:t>How much - Test Results</a:t>
+              <a:t>A/B/C/D checker - Test Plan</a:t>
             </a:r>
             <a:endParaRPr sz="4000" dirty="0"/>
           </a:p>
         </p:txBody>
       </p:sp>
-      <p:pic>
-        <p:nvPicPr>
-          <p:cNvPr id="3" name="Picture 2">
-            <a:extLst>
-              <a:ext uri="{FF2B5EF4-FFF2-40B4-BE49-F238E27FC236}">
-                <a16:creationId xmlns:a16="http://schemas.microsoft.com/office/drawing/2014/main" id="{81CEF5AF-EA11-4949-A095-2921AC8486BA}"/>
-              </a:ext>
-            </a:extLst>
-          </p:cNvPr>
-          <p:cNvPicPr>
-            <a:picLocks noChangeAspect="1"/>
-          </p:cNvPicPr>
-          <p:nvPr/>
-        </p:nvPicPr>
-        <p:blipFill>
-          <a:blip r:embed="rId3"/>
-          <a:stretch>
-            <a:fillRect/>
-          </a:stretch>
-        </p:blipFill>
+      <p:graphicFrame>
+        <p:nvGraphicFramePr>
+          <p:cNvPr id="92" name="Google Shape;92;p19"/>
+          <p:cNvGraphicFramePr/>
+          <p:nvPr>
+            <p:extLst>
+              <p:ext uri="{D42A27DB-BD31-4B8C-83A1-F6EECF244321}">
+                <p14:modId xmlns:p14="http://schemas.microsoft.com/office/powerpoint/2010/main" val="4110587187"/>
+              </p:ext>
+            </p:extLst>
+          </p:nvPr>
+        </p:nvGraphicFramePr>
+        <p:xfrm>
+          <a:off x="548067" y="935555"/>
+          <a:ext cx="11360800" cy="5486040"/>
+        </p:xfrm>
+        <a:graphic>
+          <a:graphicData uri="http://schemas.openxmlformats.org/drawingml/2006/table">
+            <a:tbl>
+              <a:tblPr>
+                <a:noFill/>
+              </a:tblPr>
+              <a:tblGrid>
+                <a:gridCol w="3762676">
+                  <a:extLst>
+                    <a:ext uri="{9D8B030D-6E8A-4147-A177-3AD203B41FA5}">
+                      <a16:colId xmlns:a16="http://schemas.microsoft.com/office/drawing/2014/main" val="20000"/>
+                    </a:ext>
+                  </a:extLst>
+                </a:gridCol>
+                <a:gridCol w="7598124">
+                  <a:extLst>
+                    <a:ext uri="{9D8B030D-6E8A-4147-A177-3AD203B41FA5}">
+                      <a16:colId xmlns:a16="http://schemas.microsoft.com/office/drawing/2014/main" val="20001"/>
+                    </a:ext>
+                  </a:extLst>
+                </a:gridCol>
+              </a:tblGrid>
+              <a:tr h="609560">
+                <a:tc>
+                  <a:txBody>
+                    <a:bodyPr/>
+                    <a:lstStyle/>
+                    <a:p>
+                      <a:pPr marL="0" lvl="0" indent="0" algn="l" rtl="0">
+                        <a:spcBef>
+                          <a:spcPts val="0"/>
+                        </a:spcBef>
+                        <a:spcAft>
+                          <a:spcPts val="0"/>
+                        </a:spcAft>
+                        <a:buNone/>
+                      </a:pPr>
+                      <a:r>
+                        <a:rPr lang="en" sz="2400" b="1" dirty="0"/>
+                        <a:t>Test Cases - input</a:t>
+                      </a:r>
+                      <a:endParaRPr sz="2400" b="1" dirty="0"/>
+                    </a:p>
+                  </a:txBody>
+                  <a:tcPr marL="121900" marR="121900" marT="121900" marB="121900">
+                    <a:solidFill>
+                      <a:srgbClr val="CCCCCC"/>
+                    </a:solidFill>
+                  </a:tcPr>
+                </a:tc>
+                <a:tc>
+                  <a:txBody>
+                    <a:bodyPr/>
+                    <a:lstStyle/>
+                    <a:p>
+                      <a:pPr marL="0" lvl="0" indent="0" algn="l" rtl="0">
+                        <a:spcBef>
+                          <a:spcPts val="0"/>
+                        </a:spcBef>
+                        <a:spcAft>
+                          <a:spcPts val="0"/>
+                        </a:spcAft>
+                        <a:buNone/>
+                      </a:pPr>
+                      <a:r>
+                        <a:rPr lang="en" sz="2400" b="1" dirty="0"/>
+                        <a:t>Expected output</a:t>
+                      </a:r>
+                      <a:endParaRPr sz="2400" b="1" dirty="0"/>
+                    </a:p>
+                  </a:txBody>
+                  <a:tcPr marL="121900" marR="121900" marT="121900" marB="121900">
+                    <a:solidFill>
+                      <a:srgbClr val="CCCCCC"/>
+                    </a:solidFill>
+                  </a:tcPr>
+                </a:tc>
+                <a:extLst>
+                  <a:ext uri="{0D108BD9-81ED-4DB2-BD59-A6C34878D82A}">
+                    <a16:rowId xmlns:a16="http://schemas.microsoft.com/office/drawing/2014/main" val="10000"/>
+                  </a:ext>
+                </a:extLst>
+              </a:tr>
+              <a:tr h="609560">
+                <a:tc>
+                  <a:txBody>
+                    <a:bodyPr/>
+                    <a:lstStyle/>
+                    <a:p>
+                      <a:pPr marL="0" lvl="0" indent="0" algn="l" rtl="0">
+                        <a:spcBef>
+                          <a:spcPts val="0"/>
+                        </a:spcBef>
+                        <a:spcAft>
+                          <a:spcPts val="0"/>
+                        </a:spcAft>
+                        <a:buNone/>
+                      </a:pPr>
+                      <a:r>
+                        <a:rPr lang="en-US" sz="2400" dirty="0"/>
+                        <a:t>“Option a”</a:t>
+                      </a:r>
+                    </a:p>
+                  </a:txBody>
+                  <a:tcPr marL="121900" marR="121900" marT="121900" marB="121900"/>
+                </a:tc>
+                <a:tc>
+                  <a:txBody>
+                    <a:bodyPr/>
+                    <a:lstStyle/>
+                    <a:p>
+                      <a:pPr marL="0" lvl="0" indent="0" algn="l" rtl="0">
+                        <a:spcBef>
+                          <a:spcPts val="0"/>
+                        </a:spcBef>
+                        <a:spcAft>
+                          <a:spcPts val="0"/>
+                        </a:spcAft>
+                        <a:buNone/>
+                      </a:pPr>
+                      <a:r>
+                        <a:rPr lang="en-US" sz="2400" dirty="0"/>
+                        <a:t>Please type a valid options ("A", "B", "C", or "D")</a:t>
+                      </a:r>
+                      <a:endParaRPr sz="2400" dirty="0"/>
+                    </a:p>
+                  </a:txBody>
+                  <a:tcPr marL="121900" marR="121900" marT="121900" marB="121900"/>
+                </a:tc>
+                <a:extLst>
+                  <a:ext uri="{0D108BD9-81ED-4DB2-BD59-A6C34878D82A}">
+                    <a16:rowId xmlns:a16="http://schemas.microsoft.com/office/drawing/2014/main" val="10001"/>
+                  </a:ext>
+                </a:extLst>
+              </a:tr>
+              <a:tr h="609560">
+                <a:tc>
+                  <a:txBody>
+                    <a:bodyPr/>
+                    <a:lstStyle/>
+                    <a:p>
+                      <a:pPr marL="0" lvl="0" indent="0" algn="l" rtl="0">
+                        <a:spcBef>
+                          <a:spcPts val="0"/>
+                        </a:spcBef>
+                        <a:spcAft>
+                          <a:spcPts val="0"/>
+                        </a:spcAft>
+                        <a:buNone/>
+                      </a:pPr>
+                      <a:r>
+                        <a:rPr lang="en-US" sz="2400" dirty="0"/>
+                        <a:t>“1”</a:t>
+                      </a:r>
+                    </a:p>
+                  </a:txBody>
+                  <a:tcPr marL="121900" marR="121900" marT="121900" marB="121900"/>
+                </a:tc>
+                <a:tc>
+                  <a:txBody>
+                    <a:bodyPr/>
+                    <a:lstStyle/>
+                    <a:p>
+                      <a:pPr marL="0" lvl="0" indent="0" algn="l" rtl="0">
+                        <a:spcBef>
+                          <a:spcPts val="0"/>
+                        </a:spcBef>
+                        <a:spcAft>
+                          <a:spcPts val="0"/>
+                        </a:spcAft>
+                        <a:buNone/>
+                      </a:pPr>
+                      <a:r>
+                        <a:rPr lang="en-US" sz="2400" dirty="0"/>
+                        <a:t>Please type a valid options ("A", "B", "C", or "D")</a:t>
+                      </a:r>
+                    </a:p>
+                  </a:txBody>
+                  <a:tcPr marL="121900" marR="121900" marT="121900" marB="121900"/>
+                </a:tc>
+                <a:extLst>
+                  <a:ext uri="{0D108BD9-81ED-4DB2-BD59-A6C34878D82A}">
+                    <a16:rowId xmlns:a16="http://schemas.microsoft.com/office/drawing/2014/main" val="1961748599"/>
+                  </a:ext>
+                </a:extLst>
+              </a:tr>
+              <a:tr h="609560">
+                <a:tc>
+                  <a:txBody>
+                    <a:bodyPr/>
+                    <a:lstStyle/>
+                    <a:p>
+                      <a:pPr marL="0" lvl="0" indent="0" algn="l" rtl="0">
+                        <a:spcBef>
+                          <a:spcPts val="0"/>
+                        </a:spcBef>
+                        <a:spcAft>
+                          <a:spcPts val="0"/>
+                        </a:spcAft>
+                        <a:buNone/>
+                      </a:pPr>
+                      <a:r>
+                        <a:rPr lang="en-US" sz="2400" dirty="0"/>
+                        <a:t>“Q”</a:t>
+                      </a:r>
+                    </a:p>
+                  </a:txBody>
+                  <a:tcPr marL="121900" marR="121900" marT="121900" marB="121900"/>
+                </a:tc>
+                <a:tc>
+                  <a:txBody>
+                    <a:bodyPr/>
+                    <a:lstStyle/>
+                    <a:p>
+                      <a:pPr marL="0" lvl="0" indent="0" algn="l" rtl="0">
+                        <a:spcBef>
+                          <a:spcPts val="0"/>
+                        </a:spcBef>
+                        <a:spcAft>
+                          <a:spcPts val="0"/>
+                        </a:spcAft>
+                        <a:buNone/>
+                      </a:pPr>
+                      <a:r>
+                        <a:rPr lang="en-US" sz="2400" dirty="0"/>
+                        <a:t>Please type a valid options ("A", "B", "C", or "D")</a:t>
+                      </a:r>
+                    </a:p>
+                  </a:txBody>
+                  <a:tcPr marL="121900" marR="121900" marT="121900" marB="121900"/>
+                </a:tc>
+                <a:extLst>
+                  <a:ext uri="{0D108BD9-81ED-4DB2-BD59-A6C34878D82A}">
+                    <a16:rowId xmlns:a16="http://schemas.microsoft.com/office/drawing/2014/main" val="694586827"/>
+                  </a:ext>
+                </a:extLst>
+              </a:tr>
+              <a:tr h="609560">
+                <a:tc>
+                  <a:txBody>
+                    <a:bodyPr/>
+                    <a:lstStyle/>
+                    <a:p>
+                      <a:pPr marL="0" lvl="0" indent="0" algn="l" rtl="0">
+                        <a:spcBef>
+                          <a:spcPts val="0"/>
+                        </a:spcBef>
+                        <a:spcAft>
+                          <a:spcPts val="0"/>
+                        </a:spcAft>
+                        <a:buNone/>
+                      </a:pPr>
+                      <a:r>
+                        <a:rPr lang="en-US" sz="2400" dirty="0"/>
+                        <a:t>“E”</a:t>
+                      </a:r>
+                    </a:p>
+                  </a:txBody>
+                  <a:tcPr marL="121900" marR="121900" marT="121900" marB="121900"/>
+                </a:tc>
+                <a:tc>
+                  <a:txBody>
+                    <a:bodyPr/>
+                    <a:lstStyle/>
+                    <a:p>
+                      <a:pPr marL="0" marR="0" lvl="0" indent="0" algn="l" defTabSz="914400" rtl="0" eaLnBrk="1" fontAlgn="auto" latinLnBrk="0" hangingPunct="1">
+                        <a:lnSpc>
+                          <a:spcPct val="100000"/>
+                        </a:lnSpc>
+                        <a:spcBef>
+                          <a:spcPts val="0"/>
+                        </a:spcBef>
+                        <a:spcAft>
+                          <a:spcPts val="0"/>
+                        </a:spcAft>
+                        <a:buClrTx/>
+                        <a:buSzTx/>
+                        <a:buFontTx/>
+                        <a:buNone/>
+                        <a:tabLst/>
+                        <a:defRPr/>
+                      </a:pPr>
+                      <a:r>
+                        <a:rPr lang="en-US" sz="2400" dirty="0"/>
+                        <a:t>Please type a valid options ("A", "B", "C", or "D")</a:t>
+                      </a:r>
+                      <a:endParaRPr sz="2400" dirty="0"/>
+                    </a:p>
+                  </a:txBody>
+                  <a:tcPr marL="121900" marR="121900" marT="121900" marB="121900"/>
+                </a:tc>
+                <a:extLst>
+                  <a:ext uri="{0D108BD9-81ED-4DB2-BD59-A6C34878D82A}">
+                    <a16:rowId xmlns:a16="http://schemas.microsoft.com/office/drawing/2014/main" val="998003276"/>
+                  </a:ext>
+                </a:extLst>
+              </a:tr>
+              <a:tr h="609560">
+                <a:tc>
+                  <a:txBody>
+                    <a:bodyPr/>
+                    <a:lstStyle/>
+                    <a:p>
+                      <a:pPr marL="0" lvl="0" indent="0" algn="l" rtl="0">
+                        <a:spcBef>
+                          <a:spcPts val="0"/>
+                        </a:spcBef>
+                        <a:spcAft>
+                          <a:spcPts val="0"/>
+                        </a:spcAft>
+                        <a:buNone/>
+                      </a:pPr>
+                      <a:r>
+                        <a:rPr lang="en-US" sz="2400" dirty="0"/>
+                        <a:t>A</a:t>
+                      </a:r>
+                    </a:p>
+                  </a:txBody>
+                  <a:tcPr marL="121900" marR="121900" marT="121900" marB="121900"/>
+                </a:tc>
+                <a:tc>
+                  <a:txBody>
+                    <a:bodyPr/>
+                    <a:lstStyle/>
+                    <a:p>
+                      <a:pPr marL="0" lvl="0" indent="0" algn="l" rtl="0">
+                        <a:spcBef>
+                          <a:spcPts val="0"/>
+                        </a:spcBef>
+                        <a:spcAft>
+                          <a:spcPts val="0"/>
+                        </a:spcAft>
+                        <a:buNone/>
+                      </a:pPr>
+                      <a:r>
+                        <a:rPr lang="en-US" sz="2400" dirty="0"/>
+                        <a:t>Program continues</a:t>
+                      </a:r>
+                      <a:endParaRPr sz="2400" dirty="0"/>
+                    </a:p>
+                  </a:txBody>
+                  <a:tcPr marL="121900" marR="121900" marT="121900" marB="121900"/>
+                </a:tc>
+                <a:extLst>
+                  <a:ext uri="{0D108BD9-81ED-4DB2-BD59-A6C34878D82A}">
+                    <a16:rowId xmlns:a16="http://schemas.microsoft.com/office/drawing/2014/main" val="827233708"/>
+                  </a:ext>
+                </a:extLst>
+              </a:tr>
+              <a:tr h="609560">
+                <a:tc>
+                  <a:txBody>
+                    <a:bodyPr/>
+                    <a:lstStyle/>
+                    <a:p>
+                      <a:pPr marL="0" lvl="0" indent="0" algn="l" rtl="0">
+                        <a:spcBef>
+                          <a:spcPts val="0"/>
+                        </a:spcBef>
+                        <a:spcAft>
+                          <a:spcPts val="0"/>
+                        </a:spcAft>
+                        <a:buNone/>
+                      </a:pPr>
+                      <a:r>
+                        <a:rPr lang="en-US" sz="2400" dirty="0"/>
+                        <a:t>b</a:t>
+                      </a:r>
+                    </a:p>
+                  </a:txBody>
+                  <a:tcPr marL="121900" marR="121900" marT="121900" marB="121900"/>
+                </a:tc>
+                <a:tc>
+                  <a:txBody>
+                    <a:bodyPr/>
+                    <a:lstStyle/>
+                    <a:p>
+                      <a:pPr marL="0" lvl="0" indent="0" algn="l" rtl="0">
+                        <a:spcBef>
+                          <a:spcPts val="0"/>
+                        </a:spcBef>
+                        <a:spcAft>
+                          <a:spcPts val="0"/>
+                        </a:spcAft>
+                        <a:buNone/>
+                      </a:pPr>
+                      <a:r>
+                        <a:rPr lang="en-US" sz="2400" dirty="0"/>
+                        <a:t>Program continues</a:t>
+                      </a:r>
+                      <a:endParaRPr sz="2400" dirty="0"/>
+                    </a:p>
+                  </a:txBody>
+                  <a:tcPr marL="121900" marR="121900" marT="121900" marB="121900"/>
+                </a:tc>
+                <a:extLst>
+                  <a:ext uri="{0D108BD9-81ED-4DB2-BD59-A6C34878D82A}">
+                    <a16:rowId xmlns:a16="http://schemas.microsoft.com/office/drawing/2014/main" val="2893372194"/>
+                  </a:ext>
+                </a:extLst>
+              </a:tr>
+              <a:tr h="609560">
+                <a:tc>
+                  <a:txBody>
+                    <a:bodyPr/>
+                    <a:lstStyle/>
+                    <a:p>
+                      <a:pPr marL="0" lvl="0" indent="0" algn="l" rtl="0">
+                        <a:spcBef>
+                          <a:spcPts val="0"/>
+                        </a:spcBef>
+                        <a:spcAft>
+                          <a:spcPts val="0"/>
+                        </a:spcAft>
+                        <a:buNone/>
+                      </a:pPr>
+                      <a:r>
+                        <a:rPr lang="en-US" sz="2400" dirty="0"/>
+                        <a:t>c</a:t>
+                      </a:r>
+                    </a:p>
+                  </a:txBody>
+                  <a:tcPr marL="121900" marR="121900" marT="121900" marB="121900"/>
+                </a:tc>
+                <a:tc>
+                  <a:txBody>
+                    <a:bodyPr/>
+                    <a:lstStyle/>
+                    <a:p>
+                      <a:pPr marL="0" marR="0" lvl="0" indent="0" algn="l" defTabSz="914400" rtl="0" eaLnBrk="1" fontAlgn="auto" latinLnBrk="0" hangingPunct="1">
+                        <a:lnSpc>
+                          <a:spcPct val="100000"/>
+                        </a:lnSpc>
+                        <a:spcBef>
+                          <a:spcPts val="0"/>
+                        </a:spcBef>
+                        <a:spcAft>
+                          <a:spcPts val="0"/>
+                        </a:spcAft>
+                        <a:buClrTx/>
+                        <a:buSzTx/>
+                        <a:buFontTx/>
+                        <a:buNone/>
+                        <a:tabLst/>
+                        <a:defRPr/>
+                      </a:pPr>
+                      <a:r>
+                        <a:rPr lang="en-US" sz="2400" dirty="0"/>
+                        <a:t>Program continues</a:t>
+                      </a:r>
+                    </a:p>
+                  </a:txBody>
+                  <a:tcPr marL="121900" marR="121900" marT="121900" marB="121900"/>
+                </a:tc>
+                <a:extLst>
+                  <a:ext uri="{0D108BD9-81ED-4DB2-BD59-A6C34878D82A}">
+                    <a16:rowId xmlns:a16="http://schemas.microsoft.com/office/drawing/2014/main" val="4157011004"/>
+                  </a:ext>
+                </a:extLst>
+              </a:tr>
+              <a:tr h="609560">
+                <a:tc>
+                  <a:txBody>
+                    <a:bodyPr/>
+                    <a:lstStyle/>
+                    <a:p>
+                      <a:pPr marL="0" lvl="0" indent="0" algn="l" rtl="0">
+                        <a:spcBef>
+                          <a:spcPts val="0"/>
+                        </a:spcBef>
+                        <a:spcAft>
+                          <a:spcPts val="0"/>
+                        </a:spcAft>
+                        <a:buNone/>
+                      </a:pPr>
+                      <a:r>
+                        <a:rPr lang="en-US" sz="2400" dirty="0"/>
+                        <a:t>D</a:t>
+                      </a:r>
+                    </a:p>
+                  </a:txBody>
+                  <a:tcPr marL="121900" marR="121900" marT="121900" marB="121900"/>
+                </a:tc>
+                <a:tc>
+                  <a:txBody>
+                    <a:bodyPr/>
+                    <a:lstStyle/>
+                    <a:p>
+                      <a:pPr marL="0" marR="0" lvl="0" indent="0" algn="l" defTabSz="914400" rtl="0" eaLnBrk="1" fontAlgn="auto" latinLnBrk="0" hangingPunct="1">
+                        <a:lnSpc>
+                          <a:spcPct val="100000"/>
+                        </a:lnSpc>
+                        <a:spcBef>
+                          <a:spcPts val="0"/>
+                        </a:spcBef>
+                        <a:spcAft>
+                          <a:spcPts val="0"/>
+                        </a:spcAft>
+                        <a:buClrTx/>
+                        <a:buSzTx/>
+                        <a:buFontTx/>
+                        <a:buNone/>
+                        <a:tabLst/>
+                        <a:defRPr/>
+                      </a:pPr>
+                      <a:r>
+                        <a:rPr lang="en-US" sz="2400" dirty="0"/>
+                        <a:t>Program continues</a:t>
+                      </a:r>
+                    </a:p>
+                  </a:txBody>
+                  <a:tcPr marL="121900" marR="121900" marT="121900" marB="121900"/>
+                </a:tc>
+                <a:extLst>
+                  <a:ext uri="{0D108BD9-81ED-4DB2-BD59-A6C34878D82A}">
+                    <a16:rowId xmlns:a16="http://schemas.microsoft.com/office/drawing/2014/main" val="6335443"/>
+                  </a:ext>
+                </a:extLst>
+              </a:tr>
+            </a:tbl>
+          </a:graphicData>
+        </a:graphic>
+      </p:graphicFrame>
+    </p:spTree>
+    <p:extLst>
+      <p:ext uri="{BB962C8B-B14F-4D97-AF65-F5344CB8AC3E}">
+        <p14:creationId xmlns:p14="http://schemas.microsoft.com/office/powerpoint/2010/main" val="1495764827"/>
+      </p:ext>
+    </p:extLst>
+  </p:cSld>
+  <p:clrMapOvr>
+    <a:masterClrMapping/>
+  </p:clrMapOvr>
+</p:sld>
+</file>
+
+<file path=ppt/slides/slide18.xml><?xml version="1.0" encoding="utf-8"?>
+<p:sld xmlns:a="http://schemas.openxmlformats.org/drawingml/2006/main" xmlns:r="http://schemas.openxmlformats.org/officeDocument/2006/relationships" xmlns:p="http://schemas.openxmlformats.org/presentationml/2006/main">
+  <p:cSld>
+    <p:spTree>
+      <p:nvGrpSpPr>
+        <p:cNvPr id="1" name="Shape 90"/>
+        <p:cNvGrpSpPr/>
+        <p:nvPr/>
+      </p:nvGrpSpPr>
+      <p:grpSpPr>
+        <a:xfrm>
+          <a:off x="0" y="0"/>
+          <a:ext cx="0" cy="0"/>
+          <a:chOff x="0" y="0"/>
+          <a:chExt cx="0" cy="0"/>
+        </a:xfrm>
+      </p:grpSpPr>
+      <p:sp>
+        <p:nvSpPr>
+          <p:cNvPr id="91" name="Google Shape;91;p19"/>
+          <p:cNvSpPr txBox="1">
+            <a:spLocks noGrp="1"/>
+          </p:cNvSpPr>
+          <p:nvPr>
+            <p:ph type="title"/>
+          </p:nvPr>
+        </p:nvSpPr>
         <p:spPr>
           <a:xfrm>
-            <a:off x="184086" y="2642019"/>
-            <a:ext cx="6042543" cy="2485364"/>
+            <a:off x="415600" y="217447"/>
+            <a:ext cx="11360800" cy="763600"/>
           </a:xfrm>
           <a:prstGeom prst="rect">
             <a:avLst/>
           </a:prstGeom>
         </p:spPr>
-      </p:pic>
-      <p:pic>
-        <p:nvPicPr>
-          <p:cNvPr id="5" name="Picture 4">
-            <a:extLst>
-              <a:ext uri="{FF2B5EF4-FFF2-40B4-BE49-F238E27FC236}">
-                <a16:creationId xmlns:a16="http://schemas.microsoft.com/office/drawing/2014/main" id="{5344551E-2CD0-4938-8DB8-1610DF95E52A}"/>
-              </a:ext>
-            </a:extLst>
-          </p:cNvPr>
-          <p:cNvPicPr>
-            <a:picLocks noChangeAspect="1"/>
-          </p:cNvPicPr>
-          <p:nvPr/>
-        </p:nvPicPr>
-        <p:blipFill>
-          <a:blip r:embed="rId4"/>
-          <a:stretch>
-            <a:fillRect/>
-          </a:stretch>
-        </p:blipFill>
-        <p:spPr>
-          <a:xfrm>
-            <a:off x="6980398" y="937482"/>
-            <a:ext cx="3847259" cy="3409074"/>
-          </a:xfrm>
-          <a:prstGeom prst="rect">
-            <a:avLst/>
-          </a:prstGeom>
-        </p:spPr>
-      </p:pic>
-      <p:pic>
-        <p:nvPicPr>
-          <p:cNvPr id="7" name="Picture 6">
-            <a:extLst>
-              <a:ext uri="{FF2B5EF4-FFF2-40B4-BE49-F238E27FC236}">
-                <a16:creationId xmlns:a16="http://schemas.microsoft.com/office/drawing/2014/main" id="{27212B1C-F446-462A-954E-27276F3C6C88}"/>
-              </a:ext>
-            </a:extLst>
-          </p:cNvPr>
-          <p:cNvPicPr>
-            <a:picLocks noChangeAspect="1"/>
-          </p:cNvPicPr>
-          <p:nvPr/>
-        </p:nvPicPr>
-        <p:blipFill>
-          <a:blip r:embed="rId5"/>
-          <a:stretch>
-            <a:fillRect/>
-          </a:stretch>
-        </p:blipFill>
-        <p:spPr>
-          <a:xfrm>
-            <a:off x="7265498" y="4737223"/>
-            <a:ext cx="3277057" cy="1476581"/>
-          </a:xfrm>
-          <a:prstGeom prst="rect">
-            <a:avLst/>
-          </a:prstGeom>
-        </p:spPr>
-      </p:pic>
+        <p:txBody>
+          <a:bodyPr spcFirstLastPara="1" vert="horz" wrap="square" lIns="121900" tIns="121900" rIns="121900" bIns="121900" rtlCol="0" anchor="t" anchorCtr="0">
+            <a:noAutofit/>
+          </a:bodyPr>
+          <a:lstStyle/>
+          <a:p>
+            <a:pPr algn="ctr"/>
+            <a:r>
+              <a:rPr lang="en" sz="4000" dirty="0"/>
+              <a:t>A/B/C/D checker - Test Results</a:t>
+            </a:r>
+            <a:endParaRPr sz="4000" dirty="0"/>
+          </a:p>
+        </p:txBody>
+      </p:sp>
       <mc:AlternateContent xmlns:mc="http://schemas.openxmlformats.org/markup-compatibility/2006" xmlns:p14="http://schemas.microsoft.com/office/powerpoint/2010/main">
         <mc:Choice Requires="p14">
-          <p:contentPart p14:bwMode="auto" r:id="rId6">
-            <p14:nvContentPartPr>
-              <p14:cNvPr id="8" name="Ink 7">
-                <a:extLst>
-                  <a:ext uri="{FF2B5EF4-FFF2-40B4-BE49-F238E27FC236}">
-                    <a16:creationId xmlns:a16="http://schemas.microsoft.com/office/drawing/2014/main" id="{87052391-E576-41A0-AF79-D9BE42B8B4B5}"/>
-                  </a:ext>
-                </a:extLst>
-              </p14:cNvPr>
-              <p14:cNvContentPartPr/>
-              <p14:nvPr/>
-            </p14:nvContentPartPr>
-            <p14:xfrm>
-              <a:off x="-30594" y="2871903"/>
-              <a:ext cx="6494400" cy="1585080"/>
-            </p14:xfrm>
-          </p:contentPart>
-        </mc:Choice>
-        <mc:Fallback xmlns="">
-          <p:pic>
-            <p:nvPicPr>
-              <p:cNvPr id="8" name="Ink 7">
-                <a:extLst>
-                  <a:ext uri="{FF2B5EF4-FFF2-40B4-BE49-F238E27FC236}">
-                    <a16:creationId xmlns:a16="http://schemas.microsoft.com/office/drawing/2014/main" id="{87052391-E576-41A0-AF79-D9BE42B8B4B5}"/>
-                  </a:ext>
-                </a:extLst>
-              </p:cNvPr>
-              <p:cNvPicPr/>
-              <p:nvPr/>
-            </p:nvPicPr>
-            <p:blipFill>
-              <a:blip r:embed="rId7"/>
-              <a:stretch>
-                <a:fillRect/>
-              </a:stretch>
-            </p:blipFill>
-            <p:spPr>
-              <a:xfrm>
-                <a:off x="-39234" y="2862903"/>
-                <a:ext cx="6512040" cy="1602720"/>
-              </a:xfrm>
-              <a:prstGeom prst="rect">
-                <a:avLst/>
-              </a:prstGeom>
-            </p:spPr>
-          </p:pic>
-        </mc:Fallback>
-      </mc:AlternateContent>
-      <p:grpSp>
-        <p:nvGrpSpPr>
-          <p:cNvPr id="11" name="Group 10">
-            <a:extLst>
-              <a:ext uri="{FF2B5EF4-FFF2-40B4-BE49-F238E27FC236}">
-                <a16:creationId xmlns:a16="http://schemas.microsoft.com/office/drawing/2014/main" id="{32CB23A6-3ACD-4A49-A2D5-87D362B3F17D}"/>
-              </a:ext>
-            </a:extLst>
-          </p:cNvPr>
-          <p:cNvGrpSpPr/>
-          <p:nvPr/>
-        </p:nvGrpSpPr>
-        <p:grpSpPr>
-          <a:xfrm>
-            <a:off x="6385686" y="300783"/>
-            <a:ext cx="4197600" cy="3953520"/>
-            <a:chOff x="6385686" y="300783"/>
-            <a:chExt cx="4197600" cy="3953520"/>
-          </a:xfrm>
-        </p:grpSpPr>
-        <mc:AlternateContent xmlns:mc="http://schemas.openxmlformats.org/markup-compatibility/2006" xmlns:p14="http://schemas.microsoft.com/office/powerpoint/2010/main">
-          <mc:Choice Requires="p14">
-            <p:contentPart p14:bwMode="auto" r:id="rId8">
-              <p14:nvContentPartPr>
-                <p14:cNvPr id="9" name="Ink 8">
-                  <a:extLst>
-                    <a:ext uri="{FF2B5EF4-FFF2-40B4-BE49-F238E27FC236}">
-                      <a16:creationId xmlns:a16="http://schemas.microsoft.com/office/drawing/2014/main" id="{1B9FA241-C09E-4F24-BCE5-A6BD880E1D02}"/>
-                    </a:ext>
-                  </a:extLst>
-                </p14:cNvPr>
-                <p14:cNvContentPartPr/>
-                <p14:nvPr/>
-              </p14:nvContentPartPr>
-              <p14:xfrm>
-                <a:off x="6617166" y="300783"/>
-                <a:ext cx="3966120" cy="3953520"/>
-              </p14:xfrm>
-            </p:contentPart>
-          </mc:Choice>
-          <mc:Fallback xmlns="">
-            <p:pic>
-              <p:nvPicPr>
-                <p:cNvPr id="9" name="Ink 8">
-                  <a:extLst>
-                    <a:ext uri="{FF2B5EF4-FFF2-40B4-BE49-F238E27FC236}">
-                      <a16:creationId xmlns:a16="http://schemas.microsoft.com/office/drawing/2014/main" id="{1B9FA241-C09E-4F24-BCE5-A6BD880E1D02}"/>
-                    </a:ext>
-                  </a:extLst>
-                </p:cNvPr>
-                <p:cNvPicPr/>
-                <p:nvPr/>
-              </p:nvPicPr>
-              <p:blipFill>
-                <a:blip r:embed="rId9"/>
-                <a:stretch>
-                  <a:fillRect/>
-                </a:stretch>
-              </p:blipFill>
-              <p:spPr>
-                <a:xfrm>
-                  <a:off x="6608166" y="291783"/>
-                  <a:ext cx="3983760" cy="3971160"/>
-                </a:xfrm>
-                <a:prstGeom prst="rect">
-                  <a:avLst/>
-                </a:prstGeom>
-              </p:spPr>
-            </p:pic>
-          </mc:Fallback>
-        </mc:AlternateContent>
-        <mc:AlternateContent xmlns:mc="http://schemas.openxmlformats.org/markup-compatibility/2006" xmlns:p14="http://schemas.microsoft.com/office/powerpoint/2010/main">
-          <mc:Choice Requires="p14">
-            <p:contentPart p14:bwMode="auto" r:id="rId10">
-              <p14:nvContentPartPr>
-                <p14:cNvPr id="10" name="Ink 9">
-                  <a:extLst>
-                    <a:ext uri="{FF2B5EF4-FFF2-40B4-BE49-F238E27FC236}">
-                      <a16:creationId xmlns:a16="http://schemas.microsoft.com/office/drawing/2014/main" id="{3C5A3B87-CB9D-4A12-B3C6-E18620F8F0E0}"/>
-                    </a:ext>
-                  </a:extLst>
-                </p14:cNvPr>
-                <p14:cNvContentPartPr/>
-                <p14:nvPr/>
-              </p14:nvContentPartPr>
-              <p14:xfrm>
-                <a:off x="6385686" y="3671103"/>
-                <a:ext cx="550800" cy="73800"/>
-              </p14:xfrm>
-            </p:contentPart>
-          </mc:Choice>
-          <mc:Fallback xmlns="">
-            <p:pic>
-              <p:nvPicPr>
-                <p:cNvPr id="10" name="Ink 9">
-                  <a:extLst>
-                    <a:ext uri="{FF2B5EF4-FFF2-40B4-BE49-F238E27FC236}">
-                      <a16:creationId xmlns:a16="http://schemas.microsoft.com/office/drawing/2014/main" id="{3C5A3B87-CB9D-4A12-B3C6-E18620F8F0E0}"/>
-                    </a:ext>
-                  </a:extLst>
-                </p:cNvPr>
-                <p:cNvPicPr/>
-                <p:nvPr/>
-              </p:nvPicPr>
-              <p:blipFill>
-                <a:blip r:embed="rId11"/>
-                <a:stretch>
-                  <a:fillRect/>
-                </a:stretch>
-              </p:blipFill>
-              <p:spPr>
-                <a:xfrm>
-                  <a:off x="6376686" y="3662103"/>
-                  <a:ext cx="568440" cy="91440"/>
-                </a:xfrm>
-                <a:prstGeom prst="rect">
-                  <a:avLst/>
-                </a:prstGeom>
-              </p:spPr>
-            </p:pic>
-          </mc:Fallback>
-        </mc:AlternateContent>
-      </p:grpSp>
-      <mc:AlternateContent xmlns:mc="http://schemas.openxmlformats.org/markup-compatibility/2006" xmlns:p14="http://schemas.microsoft.com/office/powerpoint/2010/main">
-        <mc:Choice Requires="p14">
-          <p:contentPart p14:bwMode="auto" r:id="rId12">
+          <p:contentPart p14:bwMode="auto" r:id="rId3">
             <p14:nvContentPartPr>
               <p14:cNvPr id="12" name="Ink 11">
                 <a:extLst>
@@ -14314,431 +14646,840 @@
           </p:pic>
         </mc:Fallback>
       </mc:AlternateContent>
-      <mc:AlternateContent xmlns:mc="http://schemas.openxmlformats.org/markup-compatibility/2006" xmlns:p14="http://schemas.microsoft.com/office/powerpoint/2010/main">
-        <mc:Choice Requires="p14">
-          <p:contentPart p14:bwMode="auto" r:id="rId14">
-            <p14:nvContentPartPr>
-              <p14:cNvPr id="13" name="Ink 12">
-                <a:extLst>
-                  <a:ext uri="{FF2B5EF4-FFF2-40B4-BE49-F238E27FC236}">
-                    <a16:creationId xmlns:a16="http://schemas.microsoft.com/office/drawing/2014/main" id="{0BCA063C-B321-486B-9887-778B48750497}"/>
-                  </a:ext>
-                </a:extLst>
-              </p14:cNvPr>
-              <p14:cNvContentPartPr/>
-              <p14:nvPr/>
-            </p14:nvContentPartPr>
-            <p14:xfrm>
-              <a:off x="-1434" y="4324863"/>
-              <a:ext cx="4129560" cy="1105200"/>
-            </p14:xfrm>
-          </p:contentPart>
-        </mc:Choice>
-        <mc:Fallback xmlns="">
-          <p:pic>
-            <p:nvPicPr>
-              <p:cNvPr id="13" name="Ink 12">
-                <a:extLst>
-                  <a:ext uri="{FF2B5EF4-FFF2-40B4-BE49-F238E27FC236}">
-                    <a16:creationId xmlns:a16="http://schemas.microsoft.com/office/drawing/2014/main" id="{0BCA063C-B321-486B-9887-778B48750497}"/>
-                  </a:ext>
-                </a:extLst>
-              </p:cNvPr>
-              <p:cNvPicPr/>
-              <p:nvPr/>
-            </p:nvPicPr>
-            <p:blipFill>
-              <a:blip r:embed="rId15"/>
-              <a:stretch>
-                <a:fillRect/>
-              </a:stretch>
-            </p:blipFill>
-            <p:spPr>
-              <a:xfrm>
-                <a:off x="-10434" y="4316223"/>
-                <a:ext cx="4147200" cy="1122840"/>
-              </a:xfrm>
-              <a:prstGeom prst="rect">
-                <a:avLst/>
-              </a:prstGeom>
-            </p:spPr>
-          </p:pic>
-        </mc:Fallback>
-      </mc:AlternateContent>
-      <p:grpSp>
-        <p:nvGrpSpPr>
-          <p:cNvPr id="16" name="Group 15">
+      <p:pic>
+        <p:nvPicPr>
+          <p:cNvPr id="4" name="Picture 3">
             <a:extLst>
               <a:ext uri="{FF2B5EF4-FFF2-40B4-BE49-F238E27FC236}">
-                <a16:creationId xmlns:a16="http://schemas.microsoft.com/office/drawing/2014/main" id="{3D100484-01BD-4074-9CC1-688E2B06BC77}"/>
+                <a16:creationId xmlns:a16="http://schemas.microsoft.com/office/drawing/2014/main" id="{30BE1D6A-14EE-0EEA-C209-6BBF64EFF7C3}"/>
               </a:ext>
             </a:extLst>
           </p:cNvPr>
-          <p:cNvGrpSpPr/>
+          <p:cNvPicPr>
+            <a:picLocks noChangeAspect="1"/>
+          </p:cNvPicPr>
           <p:nvPr/>
-        </p:nvGrpSpPr>
-        <p:grpSpPr>
+        </p:nvPicPr>
+        <p:blipFill>
+          <a:blip r:embed="rId14"/>
+          <a:stretch>
+            <a:fillRect/>
+          </a:stretch>
+        </p:blipFill>
+        <p:spPr>
           <a:xfrm>
-            <a:off x="4020126" y="4616103"/>
-            <a:ext cx="6459120" cy="1652040"/>
-            <a:chOff x="4020126" y="4616103"/>
-            <a:chExt cx="6459120" cy="1652040"/>
+            <a:off x="7258583" y="1546908"/>
+            <a:ext cx="4518177" cy="4492795"/>
           </a:xfrm>
-        </p:grpSpPr>
-        <mc:AlternateContent xmlns:mc="http://schemas.openxmlformats.org/markup-compatibility/2006" xmlns:p14="http://schemas.microsoft.com/office/powerpoint/2010/main">
-          <mc:Choice Requires="p14">
-            <p:contentPart p14:bwMode="auto" r:id="rId16">
-              <p14:nvContentPartPr>
-                <p14:cNvPr id="14" name="Ink 13">
-                  <a:extLst>
-                    <a:ext uri="{FF2B5EF4-FFF2-40B4-BE49-F238E27FC236}">
-                      <a16:creationId xmlns:a16="http://schemas.microsoft.com/office/drawing/2014/main" id="{986C5894-4F77-477C-A37E-84A0AF002DD2}"/>
-                    </a:ext>
-                  </a:extLst>
-                </p14:cNvPr>
-                <p14:cNvContentPartPr/>
-                <p14:nvPr/>
-              </p14:nvContentPartPr>
-              <p14:xfrm>
-                <a:off x="7050966" y="4616103"/>
-                <a:ext cx="3428280" cy="1652040"/>
-              </p14:xfrm>
-            </p:contentPart>
-          </mc:Choice>
-          <mc:Fallback xmlns="">
-            <p:pic>
-              <p:nvPicPr>
-                <p:cNvPr id="14" name="Ink 13">
-                  <a:extLst>
-                    <a:ext uri="{FF2B5EF4-FFF2-40B4-BE49-F238E27FC236}">
-                      <a16:creationId xmlns:a16="http://schemas.microsoft.com/office/drawing/2014/main" id="{986C5894-4F77-477C-A37E-84A0AF002DD2}"/>
-                    </a:ext>
-                  </a:extLst>
-                </p:cNvPr>
-                <p:cNvPicPr/>
-                <p:nvPr/>
-              </p:nvPicPr>
-              <p:blipFill>
-                <a:blip r:embed="rId17"/>
-                <a:stretch>
-                  <a:fillRect/>
-                </a:stretch>
-              </p:blipFill>
-              <p:spPr>
-                <a:xfrm>
-                  <a:off x="7042326" y="4607103"/>
-                  <a:ext cx="3445920" cy="1669680"/>
-                </a:xfrm>
-                <a:prstGeom prst="rect">
-                  <a:avLst/>
-                </a:prstGeom>
-              </p:spPr>
-            </p:pic>
-          </mc:Fallback>
-        </mc:AlternateContent>
-        <mc:AlternateContent xmlns:mc="http://schemas.openxmlformats.org/markup-compatibility/2006" xmlns:p14="http://schemas.microsoft.com/office/powerpoint/2010/main">
-          <mc:Choice Requires="p14">
-            <p:contentPart p14:bwMode="auto" r:id="rId18">
-              <p14:nvContentPartPr>
-                <p14:cNvPr id="15" name="Ink 14">
-                  <a:extLst>
-                    <a:ext uri="{FF2B5EF4-FFF2-40B4-BE49-F238E27FC236}">
-                      <a16:creationId xmlns:a16="http://schemas.microsoft.com/office/drawing/2014/main" id="{CCB121B6-D340-4BAC-9715-A7F7AB5427C5}"/>
-                    </a:ext>
-                  </a:extLst>
-                </p14:cNvPr>
-                <p14:cNvContentPartPr/>
-                <p14:nvPr/>
-              </p14:nvContentPartPr>
-              <p14:xfrm>
-                <a:off x="4020126" y="5065023"/>
-                <a:ext cx="3078720" cy="728280"/>
-              </p14:xfrm>
-            </p:contentPart>
-          </mc:Choice>
-          <mc:Fallback xmlns="">
-            <p:pic>
-              <p:nvPicPr>
-                <p:cNvPr id="15" name="Ink 14">
-                  <a:extLst>
-                    <a:ext uri="{FF2B5EF4-FFF2-40B4-BE49-F238E27FC236}">
-                      <a16:creationId xmlns:a16="http://schemas.microsoft.com/office/drawing/2014/main" id="{CCB121B6-D340-4BAC-9715-A7F7AB5427C5}"/>
-                    </a:ext>
-                  </a:extLst>
-                </p:cNvPr>
-                <p:cNvPicPr/>
-                <p:nvPr/>
-              </p:nvPicPr>
-              <p:blipFill>
-                <a:blip r:embed="rId19"/>
-                <a:stretch>
-                  <a:fillRect/>
-                </a:stretch>
-              </p:blipFill>
-              <p:spPr>
-                <a:xfrm>
-                  <a:off x="4011486" y="5056023"/>
-                  <a:ext cx="3096360" cy="745920"/>
-                </a:xfrm>
-                <a:prstGeom prst="rect">
-                  <a:avLst/>
-                </a:prstGeom>
-              </p:spPr>
-            </p:pic>
-          </mc:Fallback>
-        </mc:AlternateContent>
-      </p:grpSp>
+          <a:prstGeom prst="rect">
+            <a:avLst/>
+          </a:prstGeom>
+        </p:spPr>
+      </p:pic>
+      <p:pic>
+        <p:nvPicPr>
+          <p:cNvPr id="18" name="Picture 17">
+            <a:extLst>
+              <a:ext uri="{FF2B5EF4-FFF2-40B4-BE49-F238E27FC236}">
+                <a16:creationId xmlns:a16="http://schemas.microsoft.com/office/drawing/2014/main" id="{5C3C3EEF-C556-AF8C-BE80-50BE1C4AA1D7}"/>
+              </a:ext>
+            </a:extLst>
+          </p:cNvPr>
+          <p:cNvPicPr>
+            <a:picLocks noChangeAspect="1"/>
+          </p:cNvPicPr>
+          <p:nvPr/>
+        </p:nvPicPr>
+        <p:blipFill>
+          <a:blip r:embed="rId15"/>
+          <a:stretch>
+            <a:fillRect/>
+          </a:stretch>
+        </p:blipFill>
+        <p:spPr>
+          <a:xfrm>
+            <a:off x="183011" y="2047266"/>
+            <a:ext cx="6493560" cy="3157270"/>
+          </a:xfrm>
+          <a:prstGeom prst="rect">
+            <a:avLst/>
+          </a:prstGeom>
+        </p:spPr>
+      </p:pic>
+      <p:cxnSp>
+        <p:nvCxnSpPr>
+          <p:cNvPr id="20" name="Straight Connector 19">
+            <a:extLst>
+              <a:ext uri="{FF2B5EF4-FFF2-40B4-BE49-F238E27FC236}">
+                <a16:creationId xmlns:a16="http://schemas.microsoft.com/office/drawing/2014/main" id="{7A33561A-F8F9-E5E8-BC63-70F6B3B586F5}"/>
+              </a:ext>
+            </a:extLst>
+          </p:cNvPr>
+          <p:cNvCxnSpPr>
+            <a:cxnSpLocks/>
+          </p:cNvCxnSpPr>
+          <p:nvPr/>
+        </p:nvCxnSpPr>
+        <p:spPr>
+          <a:xfrm flipV="1">
+            <a:off x="6429829" y="1814286"/>
+            <a:ext cx="828754" cy="783771"/>
+          </a:xfrm>
+          <a:prstGeom prst="line">
+            <a:avLst/>
+          </a:prstGeom>
+          <a:ln w="76200">
+            <a:solidFill>
+              <a:srgbClr val="C00000"/>
+            </a:solidFill>
+          </a:ln>
+        </p:spPr>
+        <p:style>
+          <a:lnRef idx="1">
+            <a:schemeClr val="accent1"/>
+          </a:lnRef>
+          <a:fillRef idx="0">
+            <a:schemeClr val="accent1"/>
+          </a:fillRef>
+          <a:effectRef idx="0">
+            <a:schemeClr val="accent1"/>
+          </a:effectRef>
+          <a:fontRef idx="minor">
+            <a:schemeClr val="tx1"/>
+          </a:fontRef>
+        </p:style>
+      </p:cxnSp>
+      <p:cxnSp>
+        <p:nvCxnSpPr>
+          <p:cNvPr id="23" name="Straight Connector 22">
+            <a:extLst>
+              <a:ext uri="{FF2B5EF4-FFF2-40B4-BE49-F238E27FC236}">
+                <a16:creationId xmlns:a16="http://schemas.microsoft.com/office/drawing/2014/main" id="{30FE448C-D987-D0A3-06CA-E4181EF5F958}"/>
+              </a:ext>
+            </a:extLst>
+          </p:cNvPr>
+          <p:cNvCxnSpPr>
+            <a:cxnSpLocks/>
+          </p:cNvCxnSpPr>
+          <p:nvPr/>
+        </p:nvCxnSpPr>
+        <p:spPr>
+          <a:xfrm flipV="1">
+            <a:off x="6474092" y="2309984"/>
+            <a:ext cx="784491" cy="679958"/>
+          </a:xfrm>
+          <a:prstGeom prst="line">
+            <a:avLst/>
+          </a:prstGeom>
+          <a:ln w="76200">
+            <a:solidFill>
+              <a:schemeClr val="accent2"/>
+            </a:solidFill>
+          </a:ln>
+        </p:spPr>
+        <p:style>
+          <a:lnRef idx="1">
+            <a:schemeClr val="accent1"/>
+          </a:lnRef>
+          <a:fillRef idx="0">
+            <a:schemeClr val="accent1"/>
+          </a:fillRef>
+          <a:effectRef idx="0">
+            <a:schemeClr val="accent1"/>
+          </a:effectRef>
+          <a:fontRef idx="minor">
+            <a:schemeClr val="tx1"/>
+          </a:fontRef>
+        </p:style>
+      </p:cxnSp>
+      <p:cxnSp>
+        <p:nvCxnSpPr>
+          <p:cNvPr id="25" name="Straight Connector 24">
+            <a:extLst>
+              <a:ext uri="{FF2B5EF4-FFF2-40B4-BE49-F238E27FC236}">
+                <a16:creationId xmlns:a16="http://schemas.microsoft.com/office/drawing/2014/main" id="{44D91E13-F992-A37F-5444-D9EBC0F29B66}"/>
+              </a:ext>
+            </a:extLst>
+          </p:cNvPr>
+          <p:cNvCxnSpPr>
+            <a:cxnSpLocks/>
+          </p:cNvCxnSpPr>
+          <p:nvPr/>
+        </p:nvCxnSpPr>
+        <p:spPr>
+          <a:xfrm flipV="1">
+            <a:off x="6429829" y="2860775"/>
+            <a:ext cx="873017" cy="391885"/>
+          </a:xfrm>
+          <a:prstGeom prst="line">
+            <a:avLst/>
+          </a:prstGeom>
+          <a:ln w="76200">
+            <a:solidFill>
+              <a:srgbClr val="FFFF00"/>
+            </a:solidFill>
+          </a:ln>
+        </p:spPr>
+        <p:style>
+          <a:lnRef idx="1">
+            <a:schemeClr val="accent1"/>
+          </a:lnRef>
+          <a:fillRef idx="0">
+            <a:schemeClr val="accent1"/>
+          </a:fillRef>
+          <a:effectRef idx="0">
+            <a:schemeClr val="accent1"/>
+          </a:effectRef>
+          <a:fontRef idx="minor">
+            <a:schemeClr val="tx1"/>
+          </a:fontRef>
+        </p:style>
+      </p:cxnSp>
+      <p:cxnSp>
+        <p:nvCxnSpPr>
+          <p:cNvPr id="29" name="Straight Connector 28">
+            <a:extLst>
+              <a:ext uri="{FF2B5EF4-FFF2-40B4-BE49-F238E27FC236}">
+                <a16:creationId xmlns:a16="http://schemas.microsoft.com/office/drawing/2014/main" id="{6CCEEE92-FE14-B1FC-6689-0DD58BAB2BAB}"/>
+              </a:ext>
+            </a:extLst>
+          </p:cNvPr>
+          <p:cNvCxnSpPr>
+            <a:cxnSpLocks/>
+          </p:cNvCxnSpPr>
+          <p:nvPr/>
+        </p:nvCxnSpPr>
+        <p:spPr>
+          <a:xfrm flipV="1">
+            <a:off x="6429828" y="3378052"/>
+            <a:ext cx="873018" cy="228749"/>
+          </a:xfrm>
+          <a:prstGeom prst="line">
+            <a:avLst/>
+          </a:prstGeom>
+          <a:ln w="76200">
+            <a:solidFill>
+              <a:schemeClr val="accent5"/>
+            </a:solidFill>
+          </a:ln>
+        </p:spPr>
+        <p:style>
+          <a:lnRef idx="1">
+            <a:schemeClr val="accent1"/>
+          </a:lnRef>
+          <a:fillRef idx="0">
+            <a:schemeClr val="accent1"/>
+          </a:fillRef>
+          <a:effectRef idx="0">
+            <a:schemeClr val="accent1"/>
+          </a:effectRef>
+          <a:fontRef idx="minor">
+            <a:schemeClr val="tx1"/>
+          </a:fontRef>
+        </p:style>
+      </p:cxnSp>
+      <p:sp>
+        <p:nvSpPr>
+          <p:cNvPr id="33" name="Rectangle 32">
+            <a:extLst>
+              <a:ext uri="{FF2B5EF4-FFF2-40B4-BE49-F238E27FC236}">
+                <a16:creationId xmlns:a16="http://schemas.microsoft.com/office/drawing/2014/main" id="{90BD2A9D-1E99-A818-EE5F-783BB18013FF}"/>
+              </a:ext>
+            </a:extLst>
+          </p:cNvPr>
+          <p:cNvSpPr/>
+          <p:nvPr/>
+        </p:nvSpPr>
+        <p:spPr>
+          <a:xfrm>
+            <a:off x="183010" y="3764276"/>
+            <a:ext cx="6493560" cy="1440260"/>
+          </a:xfrm>
+          <a:prstGeom prst="rect">
+            <a:avLst/>
+          </a:prstGeom>
+          <a:noFill/>
+          <a:ln w="76200">
+            <a:solidFill>
+              <a:srgbClr val="7030A0"/>
+            </a:solidFill>
+          </a:ln>
+        </p:spPr>
+        <p:style>
+          <a:lnRef idx="2">
+            <a:schemeClr val="accent1">
+              <a:shade val="50000"/>
+            </a:schemeClr>
+          </a:lnRef>
+          <a:fillRef idx="1">
+            <a:schemeClr val="accent1"/>
+          </a:fillRef>
+          <a:effectRef idx="0">
+            <a:schemeClr val="accent1"/>
+          </a:effectRef>
+          <a:fontRef idx="minor">
+            <a:schemeClr val="lt1"/>
+          </a:fontRef>
+        </p:style>
+        <p:txBody>
+          <a:bodyPr rtlCol="0" anchor="ctr"/>
+          <a:lstStyle/>
+          <a:p>
+            <a:pPr algn="ctr"/>
+            <a:endParaRPr lang="en-NZ"/>
+          </a:p>
+        </p:txBody>
+      </p:sp>
+      <p:sp>
+        <p:nvSpPr>
+          <p:cNvPr id="35" name="Rectangle 34">
+            <a:extLst>
+              <a:ext uri="{FF2B5EF4-FFF2-40B4-BE49-F238E27FC236}">
+                <a16:creationId xmlns:a16="http://schemas.microsoft.com/office/drawing/2014/main" id="{09F804AC-02F3-753D-76DF-11BF868F8F84}"/>
+              </a:ext>
+            </a:extLst>
+          </p:cNvPr>
+          <p:cNvSpPr/>
+          <p:nvPr/>
+        </p:nvSpPr>
+        <p:spPr>
+          <a:xfrm>
+            <a:off x="7258583" y="3753243"/>
+            <a:ext cx="4517817" cy="2286460"/>
+          </a:xfrm>
+          <a:prstGeom prst="rect">
+            <a:avLst/>
+          </a:prstGeom>
+          <a:noFill/>
+          <a:ln w="76200">
+            <a:solidFill>
+              <a:srgbClr val="7030A0"/>
+            </a:solidFill>
+          </a:ln>
+        </p:spPr>
+        <p:style>
+          <a:lnRef idx="2">
+            <a:schemeClr val="accent1">
+              <a:shade val="50000"/>
+            </a:schemeClr>
+          </a:lnRef>
+          <a:fillRef idx="1">
+            <a:schemeClr val="accent1"/>
+          </a:fillRef>
+          <a:effectRef idx="0">
+            <a:schemeClr val="accent1"/>
+          </a:effectRef>
+          <a:fontRef idx="minor">
+            <a:schemeClr val="lt1"/>
+          </a:fontRef>
+        </p:style>
+        <p:txBody>
+          <a:bodyPr rtlCol="0" anchor="ctr"/>
+          <a:lstStyle/>
+          <a:p>
+            <a:pPr algn="ctr"/>
+            <a:endParaRPr lang="en-NZ"/>
+          </a:p>
+        </p:txBody>
+      </p:sp>
+      <p:sp>
+        <p:nvSpPr>
+          <p:cNvPr id="36" name="Rectangle 35">
+            <a:extLst>
+              <a:ext uri="{FF2B5EF4-FFF2-40B4-BE49-F238E27FC236}">
+                <a16:creationId xmlns:a16="http://schemas.microsoft.com/office/drawing/2014/main" id="{5761F43B-D8F3-0D7E-7F4B-F83CB5C72E9D}"/>
+              </a:ext>
+            </a:extLst>
+          </p:cNvPr>
+          <p:cNvSpPr/>
+          <p:nvPr/>
+        </p:nvSpPr>
+        <p:spPr>
+          <a:xfrm>
+            <a:off x="248326" y="3466733"/>
+            <a:ext cx="6493560" cy="228749"/>
+          </a:xfrm>
+          <a:prstGeom prst="rect">
+            <a:avLst/>
+          </a:prstGeom>
+          <a:noFill/>
+          <a:ln w="28575">
+            <a:solidFill>
+              <a:srgbClr val="0070C0"/>
+            </a:solidFill>
+          </a:ln>
+        </p:spPr>
+        <p:style>
+          <a:lnRef idx="2">
+            <a:schemeClr val="accent1">
+              <a:shade val="50000"/>
+            </a:schemeClr>
+          </a:lnRef>
+          <a:fillRef idx="1">
+            <a:schemeClr val="accent1"/>
+          </a:fillRef>
+          <a:effectRef idx="0">
+            <a:schemeClr val="accent1"/>
+          </a:effectRef>
+          <a:fontRef idx="minor">
+            <a:schemeClr val="lt1"/>
+          </a:fontRef>
+        </p:style>
+        <p:txBody>
+          <a:bodyPr rtlCol="0" anchor="ctr"/>
+          <a:lstStyle/>
+          <a:p>
+            <a:pPr algn="ctr"/>
+            <a:endParaRPr lang="en-NZ"/>
+          </a:p>
+        </p:txBody>
+      </p:sp>
+      <p:sp>
+        <p:nvSpPr>
+          <p:cNvPr id="37" name="Rectangle 36">
+            <a:extLst>
+              <a:ext uri="{FF2B5EF4-FFF2-40B4-BE49-F238E27FC236}">
+                <a16:creationId xmlns:a16="http://schemas.microsoft.com/office/drawing/2014/main" id="{2D8BE697-B566-5B97-3D58-456E504BCA60}"/>
+              </a:ext>
+            </a:extLst>
+          </p:cNvPr>
+          <p:cNvSpPr/>
+          <p:nvPr/>
+        </p:nvSpPr>
+        <p:spPr>
+          <a:xfrm>
+            <a:off x="226553" y="3169191"/>
+            <a:ext cx="6493560" cy="228749"/>
+          </a:xfrm>
+          <a:prstGeom prst="rect">
+            <a:avLst/>
+          </a:prstGeom>
+          <a:noFill/>
+          <a:ln w="28575">
+            <a:solidFill>
+              <a:srgbClr val="FFFF00"/>
+            </a:solidFill>
+          </a:ln>
+        </p:spPr>
+        <p:style>
+          <a:lnRef idx="2">
+            <a:schemeClr val="accent1">
+              <a:shade val="50000"/>
+            </a:schemeClr>
+          </a:lnRef>
+          <a:fillRef idx="1">
+            <a:schemeClr val="accent1"/>
+          </a:fillRef>
+          <a:effectRef idx="0">
+            <a:schemeClr val="accent1"/>
+          </a:effectRef>
+          <a:fontRef idx="minor">
+            <a:schemeClr val="lt1"/>
+          </a:fontRef>
+        </p:style>
+        <p:txBody>
+          <a:bodyPr rtlCol="0" anchor="ctr"/>
+          <a:lstStyle/>
+          <a:p>
+            <a:pPr algn="ctr"/>
+            <a:endParaRPr lang="en-NZ"/>
+          </a:p>
+        </p:txBody>
+      </p:sp>
+      <p:sp>
+        <p:nvSpPr>
+          <p:cNvPr id="38" name="Rectangle 37">
+            <a:extLst>
+              <a:ext uri="{FF2B5EF4-FFF2-40B4-BE49-F238E27FC236}">
+                <a16:creationId xmlns:a16="http://schemas.microsoft.com/office/drawing/2014/main" id="{201B81A2-982E-3713-4CAE-61B88A4FA73F}"/>
+              </a:ext>
+            </a:extLst>
+          </p:cNvPr>
+          <p:cNvSpPr/>
+          <p:nvPr/>
+        </p:nvSpPr>
+        <p:spPr>
+          <a:xfrm>
+            <a:off x="248324" y="2828106"/>
+            <a:ext cx="6493560" cy="228749"/>
+          </a:xfrm>
+          <a:prstGeom prst="rect">
+            <a:avLst/>
+          </a:prstGeom>
+          <a:noFill/>
+          <a:ln w="28575">
+            <a:solidFill>
+              <a:schemeClr val="accent2"/>
+            </a:solidFill>
+          </a:ln>
+        </p:spPr>
+        <p:style>
+          <a:lnRef idx="2">
+            <a:schemeClr val="accent1">
+              <a:shade val="50000"/>
+            </a:schemeClr>
+          </a:lnRef>
+          <a:fillRef idx="1">
+            <a:schemeClr val="accent1"/>
+          </a:fillRef>
+          <a:effectRef idx="0">
+            <a:schemeClr val="accent1"/>
+          </a:effectRef>
+          <a:fontRef idx="minor">
+            <a:schemeClr val="lt1"/>
+          </a:fontRef>
+        </p:style>
+        <p:txBody>
+          <a:bodyPr rtlCol="0" anchor="ctr"/>
+          <a:lstStyle/>
+          <a:p>
+            <a:pPr algn="ctr"/>
+            <a:endParaRPr lang="en-NZ"/>
+          </a:p>
+        </p:txBody>
+      </p:sp>
+      <p:sp>
+        <p:nvSpPr>
+          <p:cNvPr id="39" name="Rectangle 38">
+            <a:extLst>
+              <a:ext uri="{FF2B5EF4-FFF2-40B4-BE49-F238E27FC236}">
+                <a16:creationId xmlns:a16="http://schemas.microsoft.com/office/drawing/2014/main" id="{3050306E-4F9D-88E1-7D26-9ECD992D7463}"/>
+              </a:ext>
+            </a:extLst>
+          </p:cNvPr>
+          <p:cNvSpPr/>
+          <p:nvPr/>
+        </p:nvSpPr>
+        <p:spPr>
+          <a:xfrm>
+            <a:off x="299124" y="2487019"/>
+            <a:ext cx="6493560" cy="228749"/>
+          </a:xfrm>
+          <a:prstGeom prst="rect">
+            <a:avLst/>
+          </a:prstGeom>
+          <a:noFill/>
+          <a:ln w="28575">
+            <a:solidFill>
+              <a:srgbClr val="C00000"/>
+            </a:solidFill>
+          </a:ln>
+        </p:spPr>
+        <p:style>
+          <a:lnRef idx="2">
+            <a:schemeClr val="accent1">
+              <a:shade val="50000"/>
+            </a:schemeClr>
+          </a:lnRef>
+          <a:fillRef idx="1">
+            <a:schemeClr val="accent1"/>
+          </a:fillRef>
+          <a:effectRef idx="0">
+            <a:schemeClr val="accent1"/>
+          </a:effectRef>
+          <a:fontRef idx="minor">
+            <a:schemeClr val="lt1"/>
+          </a:fontRef>
+        </p:style>
+        <p:txBody>
+          <a:bodyPr rtlCol="0" anchor="ctr"/>
+          <a:lstStyle/>
+          <a:p>
+            <a:pPr algn="ctr"/>
+            <a:endParaRPr lang="en-NZ"/>
+          </a:p>
+        </p:txBody>
+      </p:sp>
+      <p:sp>
+        <p:nvSpPr>
+          <p:cNvPr id="40" name="Rectangle 39">
+            <a:extLst>
+              <a:ext uri="{FF2B5EF4-FFF2-40B4-BE49-F238E27FC236}">
+                <a16:creationId xmlns:a16="http://schemas.microsoft.com/office/drawing/2014/main" id="{89C01790-183D-D3F0-95FB-CF3BC9C499EC}"/>
+              </a:ext>
+            </a:extLst>
+          </p:cNvPr>
+          <p:cNvSpPr/>
+          <p:nvPr/>
+        </p:nvSpPr>
+        <p:spPr>
+          <a:xfrm>
+            <a:off x="7280356" y="3224675"/>
+            <a:ext cx="4517817" cy="483237"/>
+          </a:xfrm>
+          <a:prstGeom prst="rect">
+            <a:avLst/>
+          </a:prstGeom>
+          <a:noFill/>
+          <a:ln w="28575">
+            <a:solidFill>
+              <a:srgbClr val="0070C0"/>
+            </a:solidFill>
+          </a:ln>
+        </p:spPr>
+        <p:style>
+          <a:lnRef idx="2">
+            <a:schemeClr val="accent1">
+              <a:shade val="50000"/>
+            </a:schemeClr>
+          </a:lnRef>
+          <a:fillRef idx="1">
+            <a:schemeClr val="accent1"/>
+          </a:fillRef>
+          <a:effectRef idx="0">
+            <a:schemeClr val="accent1"/>
+          </a:effectRef>
+          <a:fontRef idx="minor">
+            <a:schemeClr val="lt1"/>
+          </a:fontRef>
+        </p:style>
+        <p:txBody>
+          <a:bodyPr rtlCol="0" anchor="ctr"/>
+          <a:lstStyle/>
+          <a:p>
+            <a:pPr algn="ctr"/>
+            <a:endParaRPr lang="en-NZ"/>
+          </a:p>
+        </p:txBody>
+      </p:sp>
+      <p:sp>
+        <p:nvSpPr>
+          <p:cNvPr id="41" name="Rectangle 40">
+            <a:extLst>
+              <a:ext uri="{FF2B5EF4-FFF2-40B4-BE49-F238E27FC236}">
+                <a16:creationId xmlns:a16="http://schemas.microsoft.com/office/drawing/2014/main" id="{FD00E08C-6D9A-951E-4376-F300A4AFFC64}"/>
+              </a:ext>
+            </a:extLst>
+          </p:cNvPr>
+          <p:cNvSpPr/>
+          <p:nvPr/>
+        </p:nvSpPr>
+        <p:spPr>
+          <a:xfrm>
+            <a:off x="7269649" y="2635545"/>
+            <a:ext cx="4517817" cy="526292"/>
+          </a:xfrm>
+          <a:prstGeom prst="rect">
+            <a:avLst/>
+          </a:prstGeom>
+          <a:noFill/>
+          <a:ln w="28575">
+            <a:solidFill>
+              <a:srgbClr val="FFFF00"/>
+            </a:solidFill>
+          </a:ln>
+        </p:spPr>
+        <p:style>
+          <a:lnRef idx="2">
+            <a:schemeClr val="accent1">
+              <a:shade val="50000"/>
+            </a:schemeClr>
+          </a:lnRef>
+          <a:fillRef idx="1">
+            <a:schemeClr val="accent1"/>
+          </a:fillRef>
+          <a:effectRef idx="0">
+            <a:schemeClr val="accent1"/>
+          </a:effectRef>
+          <a:fontRef idx="minor">
+            <a:schemeClr val="lt1"/>
+          </a:fontRef>
+        </p:style>
+        <p:txBody>
+          <a:bodyPr rtlCol="0" anchor="ctr"/>
+          <a:lstStyle/>
+          <a:p>
+            <a:pPr algn="ctr"/>
+            <a:endParaRPr lang="en-NZ"/>
+          </a:p>
+        </p:txBody>
+      </p:sp>
+      <p:sp>
+        <p:nvSpPr>
+          <p:cNvPr id="42" name="Rectangle 41">
+            <a:extLst>
+              <a:ext uri="{FF2B5EF4-FFF2-40B4-BE49-F238E27FC236}">
+                <a16:creationId xmlns:a16="http://schemas.microsoft.com/office/drawing/2014/main" id="{CE26A189-3AD7-757E-D619-B68D39ED16A5}"/>
+              </a:ext>
+            </a:extLst>
+          </p:cNvPr>
+          <p:cNvSpPr/>
+          <p:nvPr/>
+        </p:nvSpPr>
+        <p:spPr>
+          <a:xfrm>
+            <a:off x="7262391" y="2106978"/>
+            <a:ext cx="4517817" cy="526292"/>
+          </a:xfrm>
+          <a:prstGeom prst="rect">
+            <a:avLst/>
+          </a:prstGeom>
+          <a:noFill/>
+          <a:ln w="28575">
+            <a:solidFill>
+              <a:schemeClr val="accent2"/>
+            </a:solidFill>
+          </a:ln>
+        </p:spPr>
+        <p:style>
+          <a:lnRef idx="2">
+            <a:schemeClr val="accent1">
+              <a:shade val="50000"/>
+            </a:schemeClr>
+          </a:lnRef>
+          <a:fillRef idx="1">
+            <a:schemeClr val="accent1"/>
+          </a:fillRef>
+          <a:effectRef idx="0">
+            <a:schemeClr val="accent1"/>
+          </a:effectRef>
+          <a:fontRef idx="minor">
+            <a:schemeClr val="lt1"/>
+          </a:fontRef>
+        </p:style>
+        <p:txBody>
+          <a:bodyPr rtlCol="0" anchor="ctr"/>
+          <a:lstStyle/>
+          <a:p>
+            <a:pPr algn="ctr"/>
+            <a:endParaRPr lang="en-NZ"/>
+          </a:p>
+        </p:txBody>
+      </p:sp>
+      <p:sp>
+        <p:nvSpPr>
+          <p:cNvPr id="43" name="Rectangle 42">
+            <a:extLst>
+              <a:ext uri="{FF2B5EF4-FFF2-40B4-BE49-F238E27FC236}">
+                <a16:creationId xmlns:a16="http://schemas.microsoft.com/office/drawing/2014/main" id="{40A4E50A-2E59-5E06-CF8F-91B125A5D73D}"/>
+              </a:ext>
+            </a:extLst>
+          </p:cNvPr>
+          <p:cNvSpPr/>
+          <p:nvPr/>
+        </p:nvSpPr>
+        <p:spPr>
+          <a:xfrm>
+            <a:off x="7150086" y="1476745"/>
+            <a:ext cx="4693573" cy="557012"/>
+          </a:xfrm>
+          <a:prstGeom prst="rect">
+            <a:avLst/>
+          </a:prstGeom>
+          <a:noFill/>
+          <a:ln w="28575">
+            <a:solidFill>
+              <a:srgbClr val="C00000"/>
+            </a:solidFill>
+          </a:ln>
+        </p:spPr>
+        <p:style>
+          <a:lnRef idx="2">
+            <a:schemeClr val="accent1">
+              <a:shade val="50000"/>
+            </a:schemeClr>
+          </a:lnRef>
+          <a:fillRef idx="1">
+            <a:schemeClr val="accent1"/>
+          </a:fillRef>
+          <a:effectRef idx="0">
+            <a:schemeClr val="accent1"/>
+          </a:effectRef>
+          <a:fontRef idx="minor">
+            <a:schemeClr val="lt1"/>
+          </a:fontRef>
+        </p:style>
+        <p:txBody>
+          <a:bodyPr rtlCol="0" anchor="ctr"/>
+          <a:lstStyle/>
+          <a:p>
+            <a:pPr algn="ctr"/>
+            <a:endParaRPr lang="en-NZ"/>
+          </a:p>
+        </p:txBody>
+      </p:sp>
+      <p:cxnSp>
+        <p:nvCxnSpPr>
+          <p:cNvPr id="44" name="Straight Connector 43">
+            <a:extLst>
+              <a:ext uri="{FF2B5EF4-FFF2-40B4-BE49-F238E27FC236}">
+                <a16:creationId xmlns:a16="http://schemas.microsoft.com/office/drawing/2014/main" id="{B7D5C335-DD64-780E-74C4-A022A1D4889D}"/>
+              </a:ext>
+            </a:extLst>
+          </p:cNvPr>
+          <p:cNvCxnSpPr>
+            <a:cxnSpLocks/>
+          </p:cNvCxnSpPr>
+          <p:nvPr/>
+        </p:nvCxnSpPr>
+        <p:spPr>
+          <a:xfrm flipV="1">
+            <a:off x="6474092" y="4240361"/>
+            <a:ext cx="828754" cy="113925"/>
+          </a:xfrm>
+          <a:prstGeom prst="line">
+            <a:avLst/>
+          </a:prstGeom>
+          <a:ln w="76200">
+            <a:solidFill>
+              <a:srgbClr val="7030A0"/>
+            </a:solidFill>
+          </a:ln>
+        </p:spPr>
+        <p:style>
+          <a:lnRef idx="1">
+            <a:schemeClr val="accent1"/>
+          </a:lnRef>
+          <a:fillRef idx="0">
+            <a:schemeClr val="accent1"/>
+          </a:fillRef>
+          <a:effectRef idx="0">
+            <a:schemeClr val="accent1"/>
+          </a:effectRef>
+          <a:fontRef idx="minor">
+            <a:schemeClr val="tx1"/>
+          </a:fontRef>
+        </p:style>
+      </p:cxnSp>
+      <p:sp>
+        <p:nvSpPr>
+          <p:cNvPr id="45" name="TextBox 44">
+            <a:extLst>
+              <a:ext uri="{FF2B5EF4-FFF2-40B4-BE49-F238E27FC236}">
+                <a16:creationId xmlns:a16="http://schemas.microsoft.com/office/drawing/2014/main" id="{48E298AC-B3D0-620B-86C0-07C3F207570E}"/>
+              </a:ext>
+            </a:extLst>
+          </p:cNvPr>
+          <p:cNvSpPr txBox="1"/>
+          <p:nvPr/>
+        </p:nvSpPr>
+        <p:spPr>
+          <a:xfrm>
+            <a:off x="1059542" y="5723766"/>
+            <a:ext cx="5218160" cy="523220"/>
+          </a:xfrm>
+          <a:prstGeom prst="rect">
+            <a:avLst/>
+          </a:prstGeom>
+          <a:noFill/>
+        </p:spPr>
+        <p:txBody>
+          <a:bodyPr wrap="none" rtlCol="0">
+            <a:spAutoFit/>
+          </a:bodyPr>
+          <a:lstStyle/>
+          <a:p>
+            <a:r>
+              <a:rPr lang="en-NZ" sz="2800" dirty="0"/>
+              <a:t>All test results worked as expected</a:t>
+            </a:r>
+          </a:p>
+        </p:txBody>
+      </p:sp>
     </p:spTree>
     <p:extLst>
       <p:ext uri="{BB962C8B-B14F-4D97-AF65-F5344CB8AC3E}">
         <p14:creationId xmlns:p14="http://schemas.microsoft.com/office/powerpoint/2010/main" val="1484285873"/>
-      </p:ext>
-    </p:extLst>
-  </p:cSld>
-  <p:clrMapOvr>
-    <a:masterClrMapping/>
-  </p:clrMapOvr>
-</p:sld>
-</file>
-
-<file path=ppt/slides/slide18.xml><?xml version="1.0" encoding="utf-8"?>
-<p:sld xmlns:a="http://schemas.openxmlformats.org/drawingml/2006/main" xmlns:r="http://schemas.openxmlformats.org/officeDocument/2006/relationships" xmlns:p="http://schemas.openxmlformats.org/presentationml/2006/main">
-  <p:cSld>
-    <p:spTree>
-      <p:nvGrpSpPr>
-        <p:cNvPr id="1" name=""/>
-        <p:cNvGrpSpPr/>
-        <p:nvPr/>
-      </p:nvGrpSpPr>
-      <p:grpSpPr>
-        <a:xfrm>
-          <a:off x="0" y="0"/>
-          <a:ext cx="0" cy="0"/>
-          <a:chOff x="0" y="0"/>
-          <a:chExt cx="0" cy="0"/>
-        </a:xfrm>
-      </p:grpSpPr>
-      <p:sp>
-        <p:nvSpPr>
-          <p:cNvPr id="2" name="Title 1">
-            <a:extLst>
-              <a:ext uri="{FF2B5EF4-FFF2-40B4-BE49-F238E27FC236}">
-                <a16:creationId xmlns:a16="http://schemas.microsoft.com/office/drawing/2014/main" id="{1CC5D32F-7C18-4D00-8D54-2FB046F0A206}"/>
-              </a:ext>
-            </a:extLst>
-          </p:cNvPr>
-          <p:cNvSpPr>
-            <a:spLocks noGrp="1"/>
-          </p:cNvSpPr>
-          <p:nvPr>
-            <p:ph type="title"/>
-          </p:nvPr>
-        </p:nvSpPr>
-        <p:spPr>
-          <a:xfrm>
-            <a:off x="749300" y="223520"/>
-            <a:ext cx="10515600" cy="806768"/>
-          </a:xfrm>
-        </p:spPr>
-        <p:txBody>
-          <a:bodyPr>
-            <a:normAutofit/>
-          </a:bodyPr>
-          <a:lstStyle/>
-          <a:p>
-            <a:r>
-              <a:rPr lang="en-NZ" sz="4000" dirty="0"/>
-              <a:t>Number checker (how much)- Trialling </a:t>
-            </a:r>
-          </a:p>
-        </p:txBody>
-      </p:sp>
-      <p:graphicFrame>
-        <p:nvGraphicFramePr>
-          <p:cNvPr id="5" name="Google Shape;92;p19">
-            <a:extLst>
-              <a:ext uri="{FF2B5EF4-FFF2-40B4-BE49-F238E27FC236}">
-                <a16:creationId xmlns:a16="http://schemas.microsoft.com/office/drawing/2014/main" id="{98F4BDB5-BB58-4AC0-837B-0A3E74266B65}"/>
-              </a:ext>
-            </a:extLst>
-          </p:cNvPr>
-          <p:cNvGraphicFramePr/>
-          <p:nvPr>
-            <p:extLst>
-              <p:ext uri="{D42A27DB-BD31-4B8C-83A1-F6EECF244321}">
-                <p14:modId xmlns:p14="http://schemas.microsoft.com/office/powerpoint/2010/main" val="1355733881"/>
-              </p:ext>
-            </p:extLst>
-          </p:nvPr>
-        </p:nvGraphicFramePr>
-        <p:xfrm>
-          <a:off x="415600" y="1284849"/>
-          <a:ext cx="11360800" cy="4510960"/>
-        </p:xfrm>
-        <a:graphic>
-          <a:graphicData uri="http://schemas.openxmlformats.org/drawingml/2006/table">
-            <a:tbl>
-              <a:tblPr>
-                <a:noFill/>
-              </a:tblPr>
-              <a:tblGrid>
-                <a:gridCol w="5680400">
-                  <a:extLst>
-                    <a:ext uri="{9D8B030D-6E8A-4147-A177-3AD203B41FA5}">
-                      <a16:colId xmlns:a16="http://schemas.microsoft.com/office/drawing/2014/main" val="20000"/>
-                    </a:ext>
-                  </a:extLst>
-                </a:gridCol>
-                <a:gridCol w="5680400">
-                  <a:extLst>
-                    <a:ext uri="{9D8B030D-6E8A-4147-A177-3AD203B41FA5}">
-                      <a16:colId xmlns:a16="http://schemas.microsoft.com/office/drawing/2014/main" val="20001"/>
-                    </a:ext>
-                  </a:extLst>
-                </a:gridCol>
-              </a:tblGrid>
-              <a:tr h="609560">
-                <a:tc>
-                  <a:txBody>
-                    <a:bodyPr/>
-                    <a:lstStyle/>
-                    <a:p>
-                      <a:pPr marL="0" lvl="0" indent="0" algn="l" rtl="0">
-                        <a:spcBef>
-                          <a:spcPts val="0"/>
-                        </a:spcBef>
-                        <a:spcAft>
-                          <a:spcPts val="0"/>
-                        </a:spcAft>
-                        <a:buNone/>
-                      </a:pPr>
-                      <a:r>
-                        <a:rPr lang="en-US" sz="2400" dirty="0"/>
-                        <a:t>Trial 1</a:t>
-                      </a:r>
-                    </a:p>
-                    <a:p>
-                      <a:pPr marL="0" lvl="0" indent="0" algn="l" rtl="0">
-                        <a:spcBef>
-                          <a:spcPts val="0"/>
-                        </a:spcBef>
-                        <a:spcAft>
-                          <a:spcPts val="0"/>
-                        </a:spcAft>
-                        <a:buNone/>
-                      </a:pPr>
-                      <a:r>
-                        <a:rPr lang="en-US" sz="2400" dirty="0"/>
-                        <a:t>04_how_much_v1.py</a:t>
-                      </a:r>
-                    </a:p>
-                  </a:txBody>
-                  <a:tcPr marL="121900" marR="121900" marT="121900" marB="121900"/>
-                </a:tc>
-                <a:tc>
-                  <a:txBody>
-                    <a:bodyPr/>
-                    <a:lstStyle/>
-                    <a:p>
-                      <a:pPr marL="0" lvl="0" indent="0" algn="l" rtl="0">
-                        <a:spcBef>
-                          <a:spcPts val="0"/>
-                        </a:spcBef>
-                        <a:spcAft>
-                          <a:spcPts val="0"/>
-                        </a:spcAft>
-                        <a:buNone/>
-                      </a:pPr>
-                      <a:r>
-                        <a:rPr lang="en-US" sz="2200" dirty="0"/>
-                        <a:t>Trialed having the input inside the main routine and having most of the variables in the function including the question written out in full each time it was used this version didn’t return any input but I didn’t see this at the time.</a:t>
-                      </a:r>
-                      <a:endParaRPr sz="2200" dirty="0"/>
-                    </a:p>
-                  </a:txBody>
-                  <a:tcPr marL="121900" marR="121900" marT="121900" marB="121900"/>
-                </a:tc>
-                <a:extLst>
-                  <a:ext uri="{0D108BD9-81ED-4DB2-BD59-A6C34878D82A}">
-                    <a16:rowId xmlns:a16="http://schemas.microsoft.com/office/drawing/2014/main" val="10001"/>
-                  </a:ext>
-                </a:extLst>
-              </a:tr>
-              <a:tr h="609560">
-                <a:tc>
-                  <a:txBody>
-                    <a:bodyPr/>
-                    <a:lstStyle/>
-                    <a:p>
-                      <a:pPr marL="0" lvl="0" indent="0" algn="l" rtl="0">
-                        <a:spcBef>
-                          <a:spcPts val="0"/>
-                        </a:spcBef>
-                        <a:spcAft>
-                          <a:spcPts val="0"/>
-                        </a:spcAft>
-                        <a:buNone/>
-                      </a:pPr>
-                      <a:r>
-                        <a:rPr lang="en-US" sz="2400" dirty="0"/>
-                        <a:t>Trial 2</a:t>
-                      </a:r>
-                    </a:p>
-                    <a:p>
-                      <a:pPr marL="0" lvl="0" indent="0" algn="l" rtl="0">
-                        <a:spcBef>
-                          <a:spcPts val="0"/>
-                        </a:spcBef>
-                        <a:spcAft>
-                          <a:spcPts val="0"/>
-                        </a:spcAft>
-                        <a:buNone/>
-                      </a:pPr>
-                      <a:r>
-                        <a:rPr lang="en-US" sz="2400" dirty="0"/>
-                        <a:t>04_how_much_v2.py</a:t>
-                      </a:r>
-                    </a:p>
-                  </a:txBody>
-                  <a:tcPr marL="121900" marR="121900" marT="121900" marB="121900"/>
-                </a:tc>
-                <a:tc>
-                  <a:txBody>
-                    <a:bodyPr/>
-                    <a:lstStyle/>
-                    <a:p>
-                      <a:pPr marL="0" lvl="0" indent="0" algn="l" rtl="0">
-                        <a:spcBef>
-                          <a:spcPts val="0"/>
-                        </a:spcBef>
-                        <a:spcAft>
-                          <a:spcPts val="0"/>
-                        </a:spcAft>
-                        <a:buNone/>
-                      </a:pPr>
-                      <a:r>
-                        <a:rPr lang="en-US" sz="2200" dirty="0"/>
-                        <a:t>I moved most of the variables inside the function code so the variables were defined in the main routine but given a name in the function. This version was following the teachers example and returned the amount of money they had as a variable in the main routine.</a:t>
-                      </a:r>
-                      <a:endParaRPr sz="2200" dirty="0"/>
-                    </a:p>
-                  </a:txBody>
-                  <a:tcPr marL="121900" marR="121900" marT="121900" marB="121900"/>
-                </a:tc>
-                <a:extLst>
-                  <a:ext uri="{0D108BD9-81ED-4DB2-BD59-A6C34878D82A}">
-                    <a16:rowId xmlns:a16="http://schemas.microsoft.com/office/drawing/2014/main" val="1961748599"/>
-                  </a:ext>
-                </a:extLst>
-              </a:tr>
-            </a:tbl>
-          </a:graphicData>
-        </a:graphic>
-      </p:graphicFrame>
-    </p:spTree>
-    <p:extLst>
-      <p:ext uri="{BB962C8B-B14F-4D97-AF65-F5344CB8AC3E}">
-        <p14:creationId xmlns:p14="http://schemas.microsoft.com/office/powerpoint/2010/main" val="1978771168"/>
       </p:ext>
     </p:extLst>
   </p:cSld>

</xml_diff>